<commit_message>
Deployed af2e6e9 with MkDocs version: 1.1.2
</commit_message>
<xml_diff>
--- a/presentations/Robot_Figures.pptx
+++ b/presentations/Robot_Figures.pptx
@@ -105,6 +105,11 @@
       </a:defRPr>
     </a:lvl9pPr>
   </p:defaultTextStyle>
+  <p:extLst>
+    <p:ext uri="{EFAFB233-063F-42B5-8137-9DF3F51BA10A}">
+      <p15:sldGuideLst xmlns:p15="http://schemas.microsoft.com/office/powerpoint/2012/main"/>
+    </p:ext>
+  </p:extLst>
 </p:presentation>
 </file>
 
@@ -255,7 +260,7 @@
           <a:p>
             <a:fld id="{25B7C100-6DA6-7E47-AB86-E17959480C67}" type="datetimeFigureOut">
               <a:rPr lang="en-US" smtClean="0"/>
-              <a:t>5/23/21</a:t>
+              <a:t>5/25/21</a:t>
             </a:fld>
             <a:endParaRPr lang="en-US"/>
           </a:p>
@@ -453,7 +458,7 @@
           <a:p>
             <a:fld id="{25B7C100-6DA6-7E47-AB86-E17959480C67}" type="datetimeFigureOut">
               <a:rPr lang="en-US" smtClean="0"/>
-              <a:t>5/23/21</a:t>
+              <a:t>5/25/21</a:t>
             </a:fld>
             <a:endParaRPr lang="en-US"/>
           </a:p>
@@ -661,7 +666,7 @@
           <a:p>
             <a:fld id="{25B7C100-6DA6-7E47-AB86-E17959480C67}" type="datetimeFigureOut">
               <a:rPr lang="en-US" smtClean="0"/>
-              <a:t>5/23/21</a:t>
+              <a:t>5/25/21</a:t>
             </a:fld>
             <a:endParaRPr lang="en-US"/>
           </a:p>
@@ -859,7 +864,7 @@
           <a:p>
             <a:fld id="{25B7C100-6DA6-7E47-AB86-E17959480C67}" type="datetimeFigureOut">
               <a:rPr lang="en-US" smtClean="0"/>
-              <a:t>5/23/21</a:t>
+              <a:t>5/25/21</a:t>
             </a:fld>
             <a:endParaRPr lang="en-US"/>
           </a:p>
@@ -1134,7 +1139,7 @@
           <a:p>
             <a:fld id="{25B7C100-6DA6-7E47-AB86-E17959480C67}" type="datetimeFigureOut">
               <a:rPr lang="en-US" smtClean="0"/>
-              <a:t>5/23/21</a:t>
+              <a:t>5/25/21</a:t>
             </a:fld>
             <a:endParaRPr lang="en-US"/>
           </a:p>
@@ -1399,7 +1404,7 @@
           <a:p>
             <a:fld id="{25B7C100-6DA6-7E47-AB86-E17959480C67}" type="datetimeFigureOut">
               <a:rPr lang="en-US" smtClean="0"/>
-              <a:t>5/23/21</a:t>
+              <a:t>5/25/21</a:t>
             </a:fld>
             <a:endParaRPr lang="en-US"/>
           </a:p>
@@ -1811,7 +1816,7 @@
           <a:p>
             <a:fld id="{25B7C100-6DA6-7E47-AB86-E17959480C67}" type="datetimeFigureOut">
               <a:rPr lang="en-US" smtClean="0"/>
-              <a:t>5/23/21</a:t>
+              <a:t>5/25/21</a:t>
             </a:fld>
             <a:endParaRPr lang="en-US"/>
           </a:p>
@@ -1952,7 +1957,7 @@
           <a:p>
             <a:fld id="{25B7C100-6DA6-7E47-AB86-E17959480C67}" type="datetimeFigureOut">
               <a:rPr lang="en-US" smtClean="0"/>
-              <a:t>5/23/21</a:t>
+              <a:t>5/25/21</a:t>
             </a:fld>
             <a:endParaRPr lang="en-US"/>
           </a:p>
@@ -2065,7 +2070,7 @@
           <a:p>
             <a:fld id="{25B7C100-6DA6-7E47-AB86-E17959480C67}" type="datetimeFigureOut">
               <a:rPr lang="en-US" smtClean="0"/>
-              <a:t>5/23/21</a:t>
+              <a:t>5/25/21</a:t>
             </a:fld>
             <a:endParaRPr lang="en-US"/>
           </a:p>
@@ -2376,7 +2381,7 @@
           <a:p>
             <a:fld id="{25B7C100-6DA6-7E47-AB86-E17959480C67}" type="datetimeFigureOut">
               <a:rPr lang="en-US" smtClean="0"/>
-              <a:t>5/23/21</a:t>
+              <a:t>5/25/21</a:t>
             </a:fld>
             <a:endParaRPr lang="en-US"/>
           </a:p>
@@ -2664,7 +2669,7 @@
           <a:p>
             <a:fld id="{25B7C100-6DA6-7E47-AB86-E17959480C67}" type="datetimeFigureOut">
               <a:rPr lang="en-US" smtClean="0"/>
-              <a:t>5/23/21</a:t>
+              <a:t>5/25/21</a:t>
             </a:fld>
             <a:endParaRPr lang="en-US"/>
           </a:p>
@@ -2905,7 +2910,7 @@
           <a:p>
             <a:fld id="{25B7C100-6DA6-7E47-AB86-E17959480C67}" type="datetimeFigureOut">
               <a:rPr lang="en-US" smtClean="0"/>
-              <a:t>5/23/21</a:t>
+              <a:t>5/25/21</a:t>
             </a:fld>
             <a:endParaRPr lang="en-US"/>
           </a:p>
@@ -3407,23 +3412,22 @@
       </p:grpSpPr>
       <p:cxnSp>
         <p:nvCxnSpPr>
-          <p:cNvPr id="48" name="Straight Arrow Connector 47">
-            <a:extLst>
-              <a:ext uri="{FF2B5EF4-FFF2-40B4-BE49-F238E27FC236}">
-                <a16:creationId xmlns:a16="http://schemas.microsoft.com/office/drawing/2014/main" id="{04D8B626-0916-8447-9610-B7B3C8AFFD34}"/>
+          <p:cNvPr id="53" name="Straight Arrow Connector 52">
+            <a:extLst>
+              <a:ext uri="{FF2B5EF4-FFF2-40B4-BE49-F238E27FC236}">
+                <a16:creationId xmlns:a16="http://schemas.microsoft.com/office/drawing/2014/main" id="{8CEBB08F-3871-964A-9B41-62D1492A8EDC}"/>
               </a:ext>
             </a:extLst>
           </p:cNvPr>
           <p:cNvCxnSpPr>
             <a:cxnSpLocks/>
-            <a:endCxn id="40" idx="2"/>
           </p:cNvCxnSpPr>
           <p:nvPr/>
         </p:nvCxnSpPr>
         <p:spPr>
-          <a:xfrm flipH="1" flipV="1">
-            <a:off x="2982801" y="3542568"/>
-            <a:ext cx="609349" cy="426802"/>
+          <a:xfrm flipV="1">
+            <a:off x="9141145" y="3568547"/>
+            <a:ext cx="0" cy="428205"/>
           </a:xfrm>
           <a:prstGeom prst="straightConnector1">
             <a:avLst/>
@@ -3450,6 +3454,51 @@
           </a:fontRef>
         </p:style>
       </p:cxnSp>
+      <p:cxnSp>
+        <p:nvCxnSpPr>
+          <p:cNvPr id="48" name="Straight Arrow Connector 47">
+            <a:extLst>
+              <a:ext uri="{FF2B5EF4-FFF2-40B4-BE49-F238E27FC236}">
+                <a16:creationId xmlns:a16="http://schemas.microsoft.com/office/drawing/2014/main" id="{04D8B626-0916-8447-9610-B7B3C8AFFD34}"/>
+              </a:ext>
+            </a:extLst>
+          </p:cNvPr>
+          <p:cNvCxnSpPr>
+            <a:cxnSpLocks/>
+            <a:endCxn id="40" idx="2"/>
+          </p:cNvCxnSpPr>
+          <p:nvPr/>
+        </p:nvCxnSpPr>
+        <p:spPr>
+          <a:xfrm flipH="1" flipV="1">
+            <a:off x="3420146" y="3540259"/>
+            <a:ext cx="10034" cy="452950"/>
+          </a:xfrm>
+          <a:prstGeom prst="straightConnector1">
+            <a:avLst/>
+          </a:prstGeom>
+          <a:ln w="57150">
+            <a:solidFill>
+              <a:schemeClr val="tx1"/>
+            </a:solidFill>
+            <a:tailEnd type="triangle"/>
+          </a:ln>
+        </p:spPr>
+        <p:style>
+          <a:lnRef idx="1">
+            <a:schemeClr val="accent1"/>
+          </a:lnRef>
+          <a:fillRef idx="0">
+            <a:schemeClr val="accent1"/>
+          </a:fillRef>
+          <a:effectRef idx="0">
+            <a:schemeClr val="accent1"/>
+          </a:effectRef>
+          <a:fontRef idx="minor">
+            <a:schemeClr val="tx1"/>
+          </a:fontRef>
+        </p:style>
+      </p:cxnSp>
       <p:sp>
         <p:nvSpPr>
           <p:cNvPr id="39" name="Rectangle 38">
@@ -3464,15 +3513,15 @@
         </p:nvSpPr>
         <p:spPr>
           <a:xfrm>
-            <a:off x="7870371" y="909707"/>
-            <a:ext cx="3439886" cy="1860345"/>
+            <a:off x="8056625" y="781298"/>
+            <a:ext cx="3835687" cy="1860345"/>
           </a:xfrm>
           <a:prstGeom prst="rect">
             <a:avLst/>
           </a:prstGeom>
           <a:solidFill>
             <a:schemeClr val="bg1">
-              <a:lumMod val="50000"/>
+              <a:lumMod val="75000"/>
             </a:schemeClr>
           </a:solidFill>
         </p:spPr>
@@ -3517,9 +3566,9 @@
           <p:nvPr/>
         </p:nvCxnSpPr>
         <p:spPr>
-          <a:xfrm flipV="1">
-            <a:off x="4384588" y="3542568"/>
-            <a:ext cx="295269" cy="414763"/>
+          <a:xfrm flipH="1" flipV="1">
+            <a:off x="5117182" y="3543802"/>
+            <a:ext cx="16535" cy="422054"/>
           </a:xfrm>
           <a:prstGeom prst="straightConnector1">
             <a:avLst/>
@@ -3564,8 +3613,8 @@
         </p:nvCxnSpPr>
         <p:spPr>
           <a:xfrm flipV="1">
-            <a:off x="4679857" y="2511721"/>
-            <a:ext cx="417512" cy="371899"/>
+            <a:off x="5117182" y="2511721"/>
+            <a:ext cx="156162" cy="373133"/>
           </a:xfrm>
           <a:prstGeom prst="straightConnector1">
             <a:avLst/>
@@ -3610,8 +3659,8 @@
         </p:nvCxnSpPr>
         <p:spPr>
           <a:xfrm flipV="1">
-            <a:off x="5921828" y="1560130"/>
-            <a:ext cx="781587" cy="622117"/>
+            <a:off x="6273778" y="1615593"/>
+            <a:ext cx="429637" cy="566654"/>
           </a:xfrm>
           <a:prstGeom prst="straightConnector1">
             <a:avLst/>
@@ -3655,8 +3704,8 @@
         </p:nvCxnSpPr>
         <p:spPr>
           <a:xfrm flipV="1">
-            <a:off x="5863403" y="3559421"/>
-            <a:ext cx="309905" cy="446459"/>
+            <a:off x="6594098" y="3560655"/>
+            <a:ext cx="16535" cy="390917"/>
           </a:xfrm>
           <a:prstGeom prst="straightConnector1">
             <a:avLst/>
@@ -3699,8 +3748,8 @@
         </p:nvCxnSpPr>
         <p:spPr>
           <a:xfrm flipV="1">
-            <a:off x="7154207" y="3559421"/>
-            <a:ext cx="309905" cy="446459"/>
+            <a:off x="7870371" y="3537651"/>
+            <a:ext cx="0" cy="428205"/>
           </a:xfrm>
           <a:prstGeom prst="straightConnector1">
             <a:avLst/>
@@ -3776,8 +3825,8 @@
         </p:nvSpPr>
         <p:spPr>
           <a:xfrm>
-            <a:off x="2732103" y="3965856"/>
-            <a:ext cx="4795771" cy="1470398"/>
+            <a:off x="2713604" y="3944618"/>
+            <a:ext cx="7024052" cy="1508709"/>
           </a:xfrm>
           <a:prstGeom prst="rect">
             <a:avLst/>
@@ -3825,14 +3874,14 @@
         </p:nvSpPr>
         <p:spPr>
           <a:xfrm>
-            <a:off x="3866172" y="2883620"/>
+            <a:off x="4303497" y="2884854"/>
             <a:ext cx="1627369" cy="658948"/>
           </a:xfrm>
           <a:prstGeom prst="rect">
             <a:avLst/>
           </a:prstGeom>
           <a:solidFill>
-            <a:srgbClr val="00B050"/>
+            <a:srgbClr val="77AF90"/>
           </a:solidFill>
         </p:spPr>
         <p:style>
@@ -3877,11 +3926,14 @@
         <p:spPr>
           <a:xfrm>
             <a:off x="4272909" y="1852773"/>
-            <a:ext cx="1648919" cy="658948"/>
+            <a:ext cx="2000869" cy="658948"/>
           </a:xfrm>
           <a:prstGeom prst="rect">
             <a:avLst/>
           </a:prstGeom>
+          <a:solidFill>
+            <a:srgbClr val="9DDF56"/>
+          </a:solidFill>
         </p:spPr>
         <p:style>
           <a:lnRef idx="2">
@@ -3905,7 +3957,7 @@
           <a:p>
             <a:r>
               <a:rPr lang="en-US" dirty="0"/>
-              <a:t>Param Bot</a:t>
+              <a:t>Adjusta Bot</a:t>
             </a:r>
           </a:p>
         </p:txBody>
@@ -3924,16 +3976,14 @@
         </p:nvSpPr>
         <p:spPr>
           <a:xfrm>
-            <a:off x="5591190" y="2900473"/>
+            <a:off x="6028515" y="2901707"/>
             <a:ext cx="1164235" cy="658948"/>
           </a:xfrm>
           <a:prstGeom prst="rect">
             <a:avLst/>
           </a:prstGeom>
           <a:solidFill>
-            <a:schemeClr val="accent6">
-              <a:lumMod val="50000"/>
-            </a:schemeClr>
+            <a:srgbClr val="71AF48"/>
           </a:solidFill>
         </p:spPr>
         <p:style>
@@ -3977,7 +4027,7 @@
         </p:nvSpPr>
         <p:spPr>
           <a:xfrm>
-            <a:off x="5878955" y="901182"/>
+            <a:off x="5878955" y="956645"/>
             <a:ext cx="1648919" cy="658948"/>
           </a:xfrm>
           <a:prstGeom prst="rect">
@@ -4131,18 +4181,18 @@
         </p:nvSpPr>
         <p:spPr>
           <a:xfrm>
-            <a:off x="565937" y="4169272"/>
-            <a:ext cx="1870822" cy="1810400"/>
+            <a:off x="565938" y="4161713"/>
+            <a:ext cx="1650412" cy="1785299"/>
           </a:xfrm>
           <a:custGeom>
             <a:avLst/>
             <a:gdLst>
-              <a:gd name="connsiteX0" fmla="*/ 0 w 1870822"/>
-              <a:gd name="connsiteY0" fmla="*/ 46914 h 1810400"/>
-              <a:gd name="connsiteX1" fmla="*/ 1325311 w 1870822"/>
-              <a:gd name="connsiteY1" fmla="*/ 264628 h 1810400"/>
-              <a:gd name="connsiteX2" fmla="*/ 1706839 w 1870822"/>
-              <a:gd name="connsiteY2" fmla="*/ 1810400 h 1810400"/>
+              <a:gd name="connsiteX0" fmla="*/ 0 w 1650412"/>
+              <a:gd name="connsiteY0" fmla="*/ 54470 h 1785299"/>
+              <a:gd name="connsiteX1" fmla="*/ 1445054 w 1650412"/>
+              <a:gd name="connsiteY1" fmla="*/ 457241 h 1785299"/>
+              <a:gd name="connsiteX2" fmla="*/ 1532668 w 1650412"/>
+              <a:gd name="connsiteY2" fmla="*/ 1785299 h 1785299"/>
             </a:gdLst>
             <a:ahLst/>
             <a:cxnLst>
@@ -4158,19 +4208,19 @@
             </a:cxnLst>
             <a:rect l="l" t="t" r="r" b="b"/>
             <a:pathLst>
-              <a:path w="1870822" h="1810400" extrusionOk="0">
+              <a:path w="1650412" h="1785299" extrusionOk="0">
                 <a:moveTo>
-                  <a:pt x="0" y="46914"/>
+                  <a:pt x="0" y="54470"/>
                 </a:moveTo>
                 <a:cubicBezTo>
-                  <a:pt x="634326" y="-830"/>
-                  <a:pt x="486308" y="-96068"/>
-                  <a:pt x="1325311" y="264628"/>
+                  <a:pt x="203688" y="-166426"/>
+                  <a:pt x="1114219" y="229727"/>
+                  <a:pt x="1445054" y="457241"/>
                 </a:cubicBezTo>
                 <a:cubicBezTo>
-                  <a:pt x="2249970" y="795872"/>
-                  <a:pt x="1630636" y="1220380"/>
-                  <a:pt x="1706839" y="1810400"/>
+                  <a:pt x="1875899" y="943534"/>
+                  <a:pt x="1541874" y="1569824"/>
+                  <a:pt x="1532668" y="1785299"/>
                 </a:cubicBezTo>
               </a:path>
             </a:pathLst>
@@ -4187,18 +4237,18 @@
                   <a:custGeom>
                     <a:avLst/>
                     <a:gdLst>
-                      <a:gd name="connsiteX0" fmla="*/ 0 w 1992230"/>
-                      <a:gd name="connsiteY0" fmla="*/ 59492 h 1822978"/>
-                      <a:gd name="connsiteX1" fmla="*/ 1436915 w 1992230"/>
-                      <a:gd name="connsiteY1" fmla="*/ 277206 h 1822978"/>
-                      <a:gd name="connsiteX2" fmla="*/ 1850571 w 1992230"/>
-                      <a:gd name="connsiteY2" fmla="*/ 1822978 h 1822978"/>
-                      <a:gd name="connsiteX0" fmla="*/ 0 w 2028362"/>
-                      <a:gd name="connsiteY0" fmla="*/ 46914 h 1810400"/>
-                      <a:gd name="connsiteX1" fmla="*/ 1436915 w 2028362"/>
-                      <a:gd name="connsiteY1" fmla="*/ 264628 h 1810400"/>
-                      <a:gd name="connsiteX2" fmla="*/ 1850571 w 2028362"/>
-                      <a:gd name="connsiteY2" fmla="*/ 1810400 h 1810400"/>
+                      <a:gd name="connsiteX0" fmla="*/ 0 w 1564227"/>
+                      <a:gd name="connsiteY0" fmla="*/ 35240 h 1766069"/>
+                      <a:gd name="connsiteX1" fmla="*/ 1445054 w 1564227"/>
+                      <a:gd name="connsiteY1" fmla="*/ 438011 h 1766069"/>
+                      <a:gd name="connsiteX2" fmla="*/ 1532668 w 1564227"/>
+                      <a:gd name="connsiteY2" fmla="*/ 1766069 h 1766069"/>
+                      <a:gd name="connsiteX0" fmla="*/ 0 w 1650412"/>
+                      <a:gd name="connsiteY0" fmla="*/ 54470 h 1785299"/>
+                      <a:gd name="connsiteX1" fmla="*/ 1445054 w 1650412"/>
+                      <a:gd name="connsiteY1" fmla="*/ 457241 h 1785299"/>
+                      <a:gd name="connsiteX2" fmla="*/ 1532668 w 1650412"/>
+                      <a:gd name="connsiteY2" fmla="*/ 1785299 h 1785299"/>
                     </a:gdLst>
                     <a:ahLst/>
                     <a:cxnLst>
@@ -4214,19 +4264,19 @@
                     </a:cxnLst>
                     <a:rect l="l" t="t" r="r" b="b"/>
                     <a:pathLst>
-                      <a:path w="2028362" h="1810400" extrusionOk="0">
+                      <a:path w="1650412" h="1785299" extrusionOk="0">
                         <a:moveTo>
-                          <a:pt x="0" y="46914"/>
+                          <a:pt x="0" y="54470"/>
                         </a:moveTo>
                         <a:cubicBezTo>
-                          <a:pt x="710949" y="12372"/>
-                          <a:pt x="568550" y="-110361"/>
-                          <a:pt x="1436915" y="264628"/>
+                          <a:pt x="253610" y="-135633"/>
+                          <a:pt x="1156333" y="213921"/>
+                          <a:pt x="1445054" y="457241"/>
                         </a:cubicBezTo>
                         <a:cubicBezTo>
-                          <a:pt x="2376060" y="783566"/>
-                          <a:pt x="1936920" y="1215425"/>
-                          <a:pt x="1850571" y="1810400"/>
+                          <a:pt x="1822807" y="932357"/>
+                          <a:pt x="1571262" y="1568890"/>
+                          <a:pt x="1532668" y="1785299"/>
                         </a:cubicBezTo>
                       </a:path>
                     </a:pathLst>
@@ -4318,7 +4368,7 @@
           <p:nvPr/>
         </p:nvSpPr>
         <p:spPr>
-          <a:xfrm rot="394061">
+          <a:xfrm rot="1051187">
             <a:off x="470451" y="3891934"/>
             <a:ext cx="1427057" cy="276999"/>
           </a:xfrm>
@@ -4354,8 +4404,8 @@
         </p:nvSpPr>
         <p:spPr>
           <a:xfrm>
-            <a:off x="2403148" y="5453003"/>
-            <a:ext cx="1027012" cy="461665"/>
+            <a:off x="2258988" y="5585520"/>
+            <a:ext cx="1506374" cy="276999"/>
           </a:xfrm>
           <a:prstGeom prst="rect">
             <a:avLst/>
@@ -4370,13 +4420,7 @@
           <a:p>
             <a:r>
               <a:rPr lang="en-US" sz="1200" dirty="0"/>
-              <a:t>Python</a:t>
-            </a:r>
-          </a:p>
-          <a:p>
-            <a:r>
-              <a:rPr lang="en-US" sz="1200" dirty="0"/>
-              <a:t>Programming</a:t>
+              <a:t>Python Programming</a:t>
             </a:r>
           </a:p>
         </p:txBody>
@@ -4395,7 +4439,7 @@
         </p:nvSpPr>
         <p:spPr>
           <a:xfrm>
-            <a:off x="3689200" y="5008191"/>
+            <a:off x="8136423" y="4890214"/>
             <a:ext cx="1492268" cy="369332"/>
           </a:xfrm>
           <a:prstGeom prst="rect">
@@ -4430,8 +4474,8 @@
         </p:nvSpPr>
         <p:spPr>
           <a:xfrm>
-            <a:off x="2713604" y="3951572"/>
-            <a:ext cx="1002197" cy="369332"/>
+            <a:off x="2748919" y="3992729"/>
+            <a:ext cx="1547218" cy="369332"/>
           </a:xfrm>
           <a:prstGeom prst="rect">
             <a:avLst/>
@@ -4443,24 +4487,23 @@
           </a:bodyPr>
           <a:lstStyle/>
           <a:p>
-            <a:pPr algn="ctr"/>
             <a:r>
               <a:rPr lang="en-US" dirty="0">
                 <a:solidFill>
                   <a:schemeClr val="bg1"/>
                 </a:solidFill>
               </a:rPr>
-              <a:t>Base Bot</a:t>
-            </a:r>
-          </a:p>
-        </p:txBody>
-      </p:sp>
-      <p:sp>
-        <p:nvSpPr>
-          <p:cNvPr id="19" name="TextBox 18">
-            <a:extLst>
-              <a:ext uri="{FF2B5EF4-FFF2-40B4-BE49-F238E27FC236}">
-                <a16:creationId xmlns:a16="http://schemas.microsoft.com/office/drawing/2014/main" id="{24EAB73A-9ADA-D64B-935D-5634E0117321}"/>
+              <a:t>Base Bot ($25)</a:t>
+            </a:r>
+          </a:p>
+        </p:txBody>
+      </p:sp>
+      <p:sp>
+        <p:nvSpPr>
+          <p:cNvPr id="20" name="TextBox 19">
+            <a:extLst>
+              <a:ext uri="{FF2B5EF4-FFF2-40B4-BE49-F238E27FC236}">
+                <a16:creationId xmlns:a16="http://schemas.microsoft.com/office/drawing/2014/main" id="{F89B6E15-89F0-8647-86CC-2E7D87DEF692}"/>
               </a:ext>
             </a:extLst>
           </p:cNvPr>
@@ -4469,8 +4512,8 @@
         </p:nvSpPr>
         <p:spPr>
           <a:xfrm>
-            <a:off x="2916654" y="5033316"/>
-            <a:ext cx="819455" cy="369332"/>
+            <a:off x="6839929" y="4859613"/>
+            <a:ext cx="705642" cy="369332"/>
           </a:xfrm>
           <a:prstGeom prst="rect">
             <a:avLst/>
@@ -4485,17 +4528,17 @@
           <a:p>
             <a:r>
               <a:rPr lang="en-US" dirty="0"/>
-              <a:t>Sensor</a:t>
-            </a:r>
-          </a:p>
-        </p:txBody>
-      </p:sp>
-      <p:sp>
-        <p:nvSpPr>
-          <p:cNvPr id="20" name="TextBox 19">
-            <a:extLst>
-              <a:ext uri="{FF2B5EF4-FFF2-40B4-BE49-F238E27FC236}">
-                <a16:creationId xmlns:a16="http://schemas.microsoft.com/office/drawing/2014/main" id="{F89B6E15-89F0-8647-86CC-2E7D87DEF692}"/>
+              <a:t>PWM</a:t>
+            </a:r>
+          </a:p>
+        </p:txBody>
+      </p:sp>
+      <p:sp>
+        <p:nvSpPr>
+          <p:cNvPr id="21" name="TextBox 20">
+            <a:extLst>
+              <a:ext uri="{FF2B5EF4-FFF2-40B4-BE49-F238E27FC236}">
+                <a16:creationId xmlns:a16="http://schemas.microsoft.com/office/drawing/2014/main" id="{DDD0DD98-2E3B-F740-9EDA-85DC229CF020}"/>
               </a:ext>
             </a:extLst>
           </p:cNvPr>
@@ -4504,8 +4547,8 @@
         </p:nvSpPr>
         <p:spPr>
           <a:xfrm>
-            <a:off x="5084198" y="5023193"/>
-            <a:ext cx="705642" cy="369332"/>
+            <a:off x="4436242" y="3158728"/>
+            <a:ext cx="1539973" cy="369332"/>
           </a:xfrm>
           <a:prstGeom prst="rect">
             <a:avLst/>
@@ -4520,17 +4563,17 @@
           <a:p>
             <a:r>
               <a:rPr lang="en-US" dirty="0"/>
-              <a:t>PWM</a:t>
-            </a:r>
-          </a:p>
-        </p:txBody>
-      </p:sp>
-      <p:sp>
-        <p:nvSpPr>
-          <p:cNvPr id="21" name="TextBox 20">
-            <a:extLst>
-              <a:ext uri="{FF2B5EF4-FFF2-40B4-BE49-F238E27FC236}">
-                <a16:creationId xmlns:a16="http://schemas.microsoft.com/office/drawing/2014/main" id="{DDD0DD98-2E3B-F740-9EDA-85DC229CF020}"/>
+              <a:t>OLED, Speaker</a:t>
+            </a:r>
+          </a:p>
+        </p:txBody>
+      </p:sp>
+      <p:sp>
+        <p:nvSpPr>
+          <p:cNvPr id="25" name="TextBox 24">
+            <a:extLst>
+              <a:ext uri="{FF2B5EF4-FFF2-40B4-BE49-F238E27FC236}">
+                <a16:creationId xmlns:a16="http://schemas.microsoft.com/office/drawing/2014/main" id="{03D47F35-9989-8848-8038-304276384654}"/>
               </a:ext>
             </a:extLst>
           </p:cNvPr>
@@ -4539,42 +4582,7 @@
         </p:nvSpPr>
         <p:spPr>
           <a:xfrm>
-            <a:off x="4747407" y="3141539"/>
-            <a:ext cx="689612" cy="369332"/>
-          </a:xfrm>
-          <a:prstGeom prst="rect">
-            <a:avLst/>
-          </a:prstGeom>
-          <a:noFill/>
-        </p:spPr>
-        <p:txBody>
-          <a:bodyPr wrap="none" rtlCol="0">
-            <a:spAutoFit/>
-          </a:bodyPr>
-          <a:lstStyle/>
-          <a:p>
-            <a:r>
-              <a:rPr lang="en-US" dirty="0"/>
-              <a:t>OLED</a:t>
-            </a:r>
-          </a:p>
-        </p:txBody>
-      </p:sp>
-      <p:sp>
-        <p:nvSpPr>
-          <p:cNvPr id="25" name="TextBox 24">
-            <a:extLst>
-              <a:ext uri="{FF2B5EF4-FFF2-40B4-BE49-F238E27FC236}">
-                <a16:creationId xmlns:a16="http://schemas.microsoft.com/office/drawing/2014/main" id="{03D47F35-9989-8848-8038-304276384654}"/>
-              </a:ext>
-            </a:extLst>
-          </p:cNvPr>
-          <p:cNvSpPr txBox="1"/>
-          <p:nvPr/>
-        </p:nvSpPr>
-        <p:spPr>
-          <a:xfrm>
-            <a:off x="3748283" y="4380619"/>
+            <a:off x="4272909" y="3991557"/>
             <a:ext cx="2000869" cy="369332"/>
           </a:xfrm>
           <a:prstGeom prst="rect">
@@ -4611,6 +4619,16 @@
         </p:nvPicPr>
         <p:blipFill>
           <a:blip r:embed="rId3">
+            <a:clrChange>
+              <a:clrFrom>
+                <a:srgbClr val="FFFFFF"/>
+              </a:clrFrom>
+              <a:clrTo>
+                <a:srgbClr val="FFFFFF">
+                  <a:alpha val="0"/>
+                </a:srgbClr>
+              </a:clrTo>
+            </a:clrChange>
             <a:extLst>
               <a:ext uri="{28A0092B-C50C-407E-A947-70E740481C1C}">
                 <a14:useLocalDpi xmlns:a14="http://schemas.microsoft.com/office/drawing/2010/main" val="0"/>
@@ -4624,8 +4642,8 @@
         </p:blipFill>
         <p:spPr bwMode="auto">
           <a:xfrm>
-            <a:off x="8070830" y="1109145"/>
-            <a:ext cx="1248000" cy="1111850"/>
+            <a:off x="8085984" y="869731"/>
+            <a:ext cx="1103219" cy="982864"/>
           </a:xfrm>
           <a:prstGeom prst="rect">
             <a:avLst/>
@@ -4656,7 +4674,7 @@
         </p:nvSpPr>
         <p:spPr>
           <a:xfrm>
-            <a:off x="8070830" y="2216636"/>
+            <a:off x="8071502" y="1766107"/>
             <a:ext cx="1200072" cy="369332"/>
           </a:xfrm>
           <a:prstGeom prst="rect">
@@ -4691,16 +4709,14 @@
         </p:nvSpPr>
         <p:spPr>
           <a:xfrm>
-            <a:off x="6869217" y="2905391"/>
+            <a:off x="7306542" y="2906625"/>
             <a:ext cx="1164235" cy="658948"/>
           </a:xfrm>
           <a:prstGeom prst="rect">
             <a:avLst/>
           </a:prstGeom>
           <a:solidFill>
-            <a:schemeClr val="accent6">
-              <a:lumMod val="50000"/>
-            </a:schemeClr>
+            <a:srgbClr val="6285C4"/>
           </a:solidFill>
         </p:spPr>
         <p:style>
@@ -4744,10 +4760,10 @@
         </p:nvGrpSpPr>
         <p:grpSpPr>
           <a:xfrm>
-            <a:off x="2276279" y="2883620"/>
-            <a:ext cx="1402744" cy="658948"/>
-            <a:chOff x="7601599" y="4507803"/>
-            <a:chExt cx="1414643" cy="736600"/>
+            <a:off x="2678575" y="2809945"/>
+            <a:ext cx="1437795" cy="730312"/>
+            <a:chOff x="7566251" y="4428029"/>
+            <a:chExt cx="1449991" cy="816374"/>
           </a:xfrm>
         </p:grpSpPr>
         <p:pic>
@@ -4794,8 +4810,8 @@
           </p:nvSpPr>
           <p:spPr>
             <a:xfrm>
-              <a:off x="7601599" y="4524325"/>
-              <a:ext cx="1404257" cy="369332"/>
+              <a:off x="7566251" y="4428029"/>
+              <a:ext cx="1404257" cy="412855"/>
             </a:xfrm>
             <a:prstGeom prst="rect">
               <a:avLst/>
@@ -4809,13 +4825,824 @@
             <a:lstStyle/>
             <a:p>
               <a:r>
-                <a:rPr lang="en-US" dirty="0"/>
+                <a:rPr lang="en-US" dirty="0">
+                  <a:solidFill>
+                    <a:schemeClr val="bg1"/>
+                  </a:solidFill>
+                </a:rPr>
                 <a:t>Rainbow Bot</a:t>
               </a:r>
             </a:p>
           </p:txBody>
         </p:sp>
       </p:grpSp>
+      <p:sp>
+        <p:nvSpPr>
+          <p:cNvPr id="51" name="Rectangle 50">
+            <a:extLst>
+              <a:ext uri="{FF2B5EF4-FFF2-40B4-BE49-F238E27FC236}">
+                <a16:creationId xmlns:a16="http://schemas.microsoft.com/office/drawing/2014/main" id="{8D708229-632A-E943-9DF3-DD17AA73B77D}"/>
+              </a:ext>
+            </a:extLst>
+          </p:cNvPr>
+          <p:cNvSpPr/>
+          <p:nvPr/>
+        </p:nvSpPr>
+        <p:spPr>
+          <a:xfrm>
+            <a:off x="8591920" y="2909599"/>
+            <a:ext cx="1164235" cy="658948"/>
+          </a:xfrm>
+          <a:prstGeom prst="rect">
+            <a:avLst/>
+          </a:prstGeom>
+          <a:solidFill>
+            <a:schemeClr val="accent4"/>
+          </a:solidFill>
+        </p:spPr>
+        <p:style>
+          <a:lnRef idx="2">
+            <a:schemeClr val="accent1">
+              <a:shade val="50000"/>
+            </a:schemeClr>
+          </a:lnRef>
+          <a:fillRef idx="1">
+            <a:schemeClr val="accent1"/>
+          </a:fillRef>
+          <a:effectRef idx="0">
+            <a:schemeClr val="accent1"/>
+          </a:effectRef>
+          <a:fontRef idx="minor">
+            <a:schemeClr val="lt1"/>
+          </a:fontRef>
+        </p:style>
+        <p:txBody>
+          <a:bodyPr rtlCol="0" anchor="t"/>
+          <a:lstStyle/>
+          <a:p>
+            <a:r>
+              <a:rPr lang="en-US" dirty="0"/>
+              <a:t>IR Bot</a:t>
+            </a:r>
+          </a:p>
+        </p:txBody>
+      </p:sp>
+      <p:sp>
+        <p:nvSpPr>
+          <p:cNvPr id="59" name="TextBox 58">
+            <a:extLst>
+              <a:ext uri="{FF2B5EF4-FFF2-40B4-BE49-F238E27FC236}">
+                <a16:creationId xmlns:a16="http://schemas.microsoft.com/office/drawing/2014/main" id="{CCEBDDE2-E7FB-D642-8159-04A1786DDC14}"/>
+              </a:ext>
+            </a:extLst>
+          </p:cNvPr>
+          <p:cNvSpPr txBox="1"/>
+          <p:nvPr/>
+        </p:nvSpPr>
+        <p:spPr>
+          <a:xfrm>
+            <a:off x="9274203" y="941453"/>
+            <a:ext cx="678391" cy="369332"/>
+          </a:xfrm>
+          <a:prstGeom prst="rect">
+            <a:avLst/>
+          </a:prstGeom>
+          <a:noFill/>
+        </p:spPr>
+        <p:txBody>
+          <a:bodyPr wrap="none" rtlCol="0">
+            <a:spAutoFit/>
+          </a:bodyPr>
+          <a:lstStyle/>
+          <a:p>
+            <a:r>
+              <a:rPr lang="en-US" dirty="0"/>
+              <a:t>Linux</a:t>
+            </a:r>
+          </a:p>
+        </p:txBody>
+      </p:sp>
+      <p:sp>
+        <p:nvSpPr>
+          <p:cNvPr id="62" name="TextBox 61">
+            <a:extLst>
+              <a:ext uri="{FF2B5EF4-FFF2-40B4-BE49-F238E27FC236}">
+                <a16:creationId xmlns:a16="http://schemas.microsoft.com/office/drawing/2014/main" id="{CF42DB76-30C5-514B-85F9-F2E17318276C}"/>
+              </a:ext>
+            </a:extLst>
+          </p:cNvPr>
+          <p:cNvSpPr txBox="1"/>
+          <p:nvPr/>
+        </p:nvSpPr>
+        <p:spPr>
+          <a:xfrm>
+            <a:off x="9942348" y="945015"/>
+            <a:ext cx="1160895" cy="369332"/>
+          </a:xfrm>
+          <a:prstGeom prst="rect">
+            <a:avLst/>
+          </a:prstGeom>
+          <a:noFill/>
+        </p:spPr>
+        <p:txBody>
+          <a:bodyPr wrap="none" rtlCol="0">
+            <a:spAutoFit/>
+          </a:bodyPr>
+          <a:lstStyle/>
+          <a:p>
+            <a:r>
+              <a:rPr lang="en-US" dirty="0"/>
+              <a:t>UNIX Shell</a:t>
+            </a:r>
+          </a:p>
+        </p:txBody>
+      </p:sp>
+      <p:sp>
+        <p:nvSpPr>
+          <p:cNvPr id="63" name="TextBox 62">
+            <a:extLst>
+              <a:ext uri="{FF2B5EF4-FFF2-40B4-BE49-F238E27FC236}">
+                <a16:creationId xmlns:a16="http://schemas.microsoft.com/office/drawing/2014/main" id="{F059A1AF-AFCA-2341-96D8-B8BAD231A0F0}"/>
+              </a:ext>
+            </a:extLst>
+          </p:cNvPr>
+          <p:cNvSpPr txBox="1"/>
+          <p:nvPr/>
+        </p:nvSpPr>
+        <p:spPr>
+          <a:xfrm>
+            <a:off x="9300844" y="1317909"/>
+            <a:ext cx="994247" cy="369332"/>
+          </a:xfrm>
+          <a:prstGeom prst="rect">
+            <a:avLst/>
+          </a:prstGeom>
+          <a:noFill/>
+        </p:spPr>
+        <p:txBody>
+          <a:bodyPr wrap="none" rtlCol="0">
+            <a:spAutoFit/>
+          </a:bodyPr>
+          <a:lstStyle/>
+          <a:p>
+            <a:r>
+              <a:rPr lang="en-US" dirty="0"/>
+              <a:t>Cameras</a:t>
+            </a:r>
+          </a:p>
+        </p:txBody>
+      </p:sp>
+      <p:sp>
+        <p:nvSpPr>
+          <p:cNvPr id="64" name="TextBox 63">
+            <a:extLst>
+              <a:ext uri="{FF2B5EF4-FFF2-40B4-BE49-F238E27FC236}">
+                <a16:creationId xmlns:a16="http://schemas.microsoft.com/office/drawing/2014/main" id="{BA2521E5-2EF5-3E43-868B-0029163CED60}"/>
+              </a:ext>
+            </a:extLst>
+          </p:cNvPr>
+          <p:cNvSpPr txBox="1"/>
+          <p:nvPr/>
+        </p:nvSpPr>
+        <p:spPr>
+          <a:xfrm>
+            <a:off x="9818912" y="1599969"/>
+            <a:ext cx="1751505" cy="369332"/>
+          </a:xfrm>
+          <a:prstGeom prst="rect">
+            <a:avLst/>
+          </a:prstGeom>
+          <a:noFill/>
+        </p:spPr>
+        <p:txBody>
+          <a:bodyPr wrap="none" rtlCol="0">
+            <a:spAutoFit/>
+          </a:bodyPr>
+          <a:lstStyle/>
+          <a:p>
+            <a:r>
+              <a:rPr lang="en-US" dirty="0"/>
+              <a:t>Computer Vision</a:t>
+            </a:r>
+          </a:p>
+        </p:txBody>
+      </p:sp>
+      <p:sp>
+        <p:nvSpPr>
+          <p:cNvPr id="65" name="TextBox 64">
+            <a:extLst>
+              <a:ext uri="{FF2B5EF4-FFF2-40B4-BE49-F238E27FC236}">
+                <a16:creationId xmlns:a16="http://schemas.microsoft.com/office/drawing/2014/main" id="{6A11D078-6C68-B745-83D1-ED0BC0E2FBB0}"/>
+              </a:ext>
+            </a:extLst>
+          </p:cNvPr>
+          <p:cNvSpPr txBox="1"/>
+          <p:nvPr/>
+        </p:nvSpPr>
+        <p:spPr>
+          <a:xfrm>
+            <a:off x="8850688" y="486757"/>
+            <a:ext cx="1774845" cy="369332"/>
+          </a:xfrm>
+          <a:prstGeom prst="rect">
+            <a:avLst/>
+          </a:prstGeom>
+          <a:noFill/>
+        </p:spPr>
+        <p:txBody>
+          <a:bodyPr wrap="none" rtlCol="0">
+            <a:spAutoFit/>
+          </a:bodyPr>
+          <a:lstStyle/>
+          <a:p>
+            <a:r>
+              <a:rPr lang="en-US" dirty="0"/>
+              <a:t>AI Racine League</a:t>
+            </a:r>
+          </a:p>
+        </p:txBody>
+      </p:sp>
+      <p:cxnSp>
+        <p:nvCxnSpPr>
+          <p:cNvPr id="66" name="Straight Arrow Connector 65">
+            <a:extLst>
+              <a:ext uri="{FF2B5EF4-FFF2-40B4-BE49-F238E27FC236}">
+                <a16:creationId xmlns:a16="http://schemas.microsoft.com/office/drawing/2014/main" id="{45390349-30F6-E144-917E-F71BAB3D1BFF}"/>
+              </a:ext>
+            </a:extLst>
+          </p:cNvPr>
+          <p:cNvCxnSpPr>
+            <a:cxnSpLocks/>
+            <a:stCxn id="8" idx="3"/>
+            <a:endCxn id="39" idx="1"/>
+          </p:cNvCxnSpPr>
+          <p:nvPr/>
+        </p:nvCxnSpPr>
+        <p:spPr>
+          <a:xfrm>
+            <a:off x="7527874" y="1286119"/>
+            <a:ext cx="528751" cy="425352"/>
+          </a:xfrm>
+          <a:prstGeom prst="straightConnector1">
+            <a:avLst/>
+          </a:prstGeom>
+          <a:ln w="57150">
+            <a:solidFill>
+              <a:schemeClr val="tx1"/>
+            </a:solidFill>
+            <a:tailEnd type="triangle"/>
+          </a:ln>
+        </p:spPr>
+        <p:style>
+          <a:lnRef idx="1">
+            <a:schemeClr val="accent1"/>
+          </a:lnRef>
+          <a:fillRef idx="0">
+            <a:schemeClr val="accent1"/>
+          </a:fillRef>
+          <a:effectRef idx="0">
+            <a:schemeClr val="accent1"/>
+          </a:effectRef>
+          <a:fontRef idx="minor">
+            <a:schemeClr val="tx1"/>
+          </a:fontRef>
+        </p:style>
+      </p:cxnSp>
+      <p:sp>
+        <p:nvSpPr>
+          <p:cNvPr id="69" name="TextBox 68">
+            <a:extLst>
+              <a:ext uri="{FF2B5EF4-FFF2-40B4-BE49-F238E27FC236}">
+                <a16:creationId xmlns:a16="http://schemas.microsoft.com/office/drawing/2014/main" id="{9927D69B-E593-6D45-88AB-BA0428DA8B43}"/>
+              </a:ext>
+            </a:extLst>
+          </p:cNvPr>
+          <p:cNvSpPr txBox="1"/>
+          <p:nvPr/>
+        </p:nvSpPr>
+        <p:spPr>
+          <a:xfrm>
+            <a:off x="7779912" y="4436236"/>
+            <a:ext cx="1760675" cy="369332"/>
+          </a:xfrm>
+          <a:prstGeom prst="rect">
+            <a:avLst/>
+          </a:prstGeom>
+          <a:noFill/>
+        </p:spPr>
+        <p:txBody>
+          <a:bodyPr wrap="none" rtlCol="0">
+            <a:spAutoFit/>
+          </a:bodyPr>
+          <a:lstStyle/>
+          <a:p>
+            <a:r>
+              <a:rPr lang="en-US" dirty="0"/>
+              <a:t>Distance Sensors</a:t>
+            </a:r>
+          </a:p>
+        </p:txBody>
+      </p:sp>
+      <p:sp>
+        <p:nvSpPr>
+          <p:cNvPr id="70" name="TextBox 69">
+            <a:extLst>
+              <a:ext uri="{FF2B5EF4-FFF2-40B4-BE49-F238E27FC236}">
+                <a16:creationId xmlns:a16="http://schemas.microsoft.com/office/drawing/2014/main" id="{FF6DA885-9D96-0443-8F66-DBA2F68AB14E}"/>
+              </a:ext>
+            </a:extLst>
+          </p:cNvPr>
+          <p:cNvSpPr txBox="1"/>
+          <p:nvPr/>
+        </p:nvSpPr>
+        <p:spPr>
+          <a:xfrm>
+            <a:off x="7289877" y="4009504"/>
+            <a:ext cx="2361800" cy="369332"/>
+          </a:xfrm>
+          <a:prstGeom prst="rect">
+            <a:avLst/>
+          </a:prstGeom>
+          <a:noFill/>
+        </p:spPr>
+        <p:txBody>
+          <a:bodyPr wrap="none" rtlCol="0">
+            <a:spAutoFit/>
+          </a:bodyPr>
+          <a:lstStyle/>
+          <a:p>
+            <a:r>
+              <a:rPr lang="en-US" dirty="0"/>
+              <a:t>Python Drive Functions</a:t>
+            </a:r>
+          </a:p>
+        </p:txBody>
+      </p:sp>
+      <p:sp>
+        <p:nvSpPr>
+          <p:cNvPr id="71" name="TextBox 70">
+            <a:extLst>
+              <a:ext uri="{FF2B5EF4-FFF2-40B4-BE49-F238E27FC236}">
+                <a16:creationId xmlns:a16="http://schemas.microsoft.com/office/drawing/2014/main" id="{EAC1D75E-99F2-814C-AFA4-D807BA0A693F}"/>
+              </a:ext>
+            </a:extLst>
+          </p:cNvPr>
+          <p:cNvSpPr txBox="1"/>
+          <p:nvPr/>
+        </p:nvSpPr>
+        <p:spPr>
+          <a:xfrm>
+            <a:off x="4126456" y="4870659"/>
+            <a:ext cx="2620717" cy="369332"/>
+          </a:xfrm>
+          <a:prstGeom prst="rect">
+            <a:avLst/>
+          </a:prstGeom>
+          <a:noFill/>
+        </p:spPr>
+        <p:txBody>
+          <a:bodyPr wrap="none" rtlCol="0">
+            <a:spAutoFit/>
+          </a:bodyPr>
+          <a:lstStyle/>
+          <a:p>
+            <a:r>
+              <a:rPr lang="en-US" dirty="0"/>
+              <a:t>Breadboards and Jumpers</a:t>
+            </a:r>
+          </a:p>
+        </p:txBody>
+      </p:sp>
+      <p:sp>
+        <p:nvSpPr>
+          <p:cNvPr id="72" name="TextBox 71">
+            <a:extLst>
+              <a:ext uri="{FF2B5EF4-FFF2-40B4-BE49-F238E27FC236}">
+                <a16:creationId xmlns:a16="http://schemas.microsoft.com/office/drawing/2014/main" id="{A6131FE8-BEE3-9148-AD1D-306F968634EF}"/>
+              </a:ext>
+            </a:extLst>
+          </p:cNvPr>
+          <p:cNvSpPr txBox="1"/>
+          <p:nvPr/>
+        </p:nvSpPr>
+        <p:spPr>
+          <a:xfrm>
+            <a:off x="5645686" y="4436236"/>
+            <a:ext cx="2073581" cy="369332"/>
+          </a:xfrm>
+          <a:prstGeom prst="rect">
+            <a:avLst/>
+          </a:prstGeom>
+          <a:noFill/>
+        </p:spPr>
+        <p:txBody>
+          <a:bodyPr wrap="none" rtlCol="0">
+            <a:spAutoFit/>
+          </a:bodyPr>
+          <a:lstStyle/>
+          <a:p>
+            <a:r>
+              <a:rPr lang="en-US" dirty="0"/>
+              <a:t>Batteries and Power</a:t>
+            </a:r>
+          </a:p>
+        </p:txBody>
+      </p:sp>
+      <p:sp>
+        <p:nvSpPr>
+          <p:cNvPr id="76" name="TextBox 75">
+            <a:extLst>
+              <a:ext uri="{FF2B5EF4-FFF2-40B4-BE49-F238E27FC236}">
+                <a16:creationId xmlns:a16="http://schemas.microsoft.com/office/drawing/2014/main" id="{F6B8F67E-7FD8-3940-92D9-CC03CAF6921E}"/>
+              </a:ext>
+            </a:extLst>
+          </p:cNvPr>
+          <p:cNvSpPr txBox="1"/>
+          <p:nvPr/>
+        </p:nvSpPr>
+        <p:spPr>
+          <a:xfrm>
+            <a:off x="9163346" y="1894510"/>
+            <a:ext cx="1864613" cy="369332"/>
+          </a:xfrm>
+          <a:prstGeom prst="rect">
+            <a:avLst/>
+          </a:prstGeom>
+          <a:noFill/>
+        </p:spPr>
+        <p:txBody>
+          <a:bodyPr wrap="none" rtlCol="0">
+            <a:spAutoFit/>
+          </a:bodyPr>
+          <a:lstStyle/>
+          <a:p>
+            <a:r>
+              <a:rPr lang="en-US" dirty="0"/>
+              <a:t>Machine Learning</a:t>
+            </a:r>
+          </a:p>
+        </p:txBody>
+      </p:sp>
+      <p:sp>
+        <p:nvSpPr>
+          <p:cNvPr id="77" name="TextBox 76">
+            <a:extLst>
+              <a:ext uri="{FF2B5EF4-FFF2-40B4-BE49-F238E27FC236}">
+                <a16:creationId xmlns:a16="http://schemas.microsoft.com/office/drawing/2014/main" id="{28AA9D13-D90B-F546-A8D7-C9982C092F08}"/>
+              </a:ext>
+            </a:extLst>
+          </p:cNvPr>
+          <p:cNvSpPr txBox="1"/>
+          <p:nvPr/>
+        </p:nvSpPr>
+        <p:spPr>
+          <a:xfrm>
+            <a:off x="11074107" y="2176465"/>
+            <a:ext cx="686406" cy="369332"/>
+          </a:xfrm>
+          <a:prstGeom prst="rect">
+            <a:avLst/>
+          </a:prstGeom>
+          <a:noFill/>
+        </p:spPr>
+        <p:txBody>
+          <a:bodyPr wrap="none" rtlCol="0">
+            <a:spAutoFit/>
+          </a:bodyPr>
+          <a:lstStyle/>
+          <a:p>
+            <a:r>
+              <a:rPr lang="en-US" dirty="0"/>
+              <a:t>GPUs</a:t>
+            </a:r>
+          </a:p>
+        </p:txBody>
+      </p:sp>
+      <p:sp>
+        <p:nvSpPr>
+          <p:cNvPr id="78" name="TextBox 77">
+            <a:extLst>
+              <a:ext uri="{FF2B5EF4-FFF2-40B4-BE49-F238E27FC236}">
+                <a16:creationId xmlns:a16="http://schemas.microsoft.com/office/drawing/2014/main" id="{2D973E69-C2A8-C142-9389-9EBCEC8799F4}"/>
+              </a:ext>
+            </a:extLst>
+          </p:cNvPr>
+          <p:cNvSpPr txBox="1"/>
+          <p:nvPr/>
+        </p:nvSpPr>
+        <p:spPr>
+          <a:xfrm>
+            <a:off x="8136423" y="2135439"/>
+            <a:ext cx="883960" cy="369332"/>
+          </a:xfrm>
+          <a:prstGeom prst="rect">
+            <a:avLst/>
+          </a:prstGeom>
+          <a:noFill/>
+        </p:spPr>
+        <p:txBody>
+          <a:bodyPr wrap="none" rtlCol="0">
+            <a:spAutoFit/>
+          </a:bodyPr>
+          <a:lstStyle/>
+          <a:p>
+            <a:r>
+              <a:rPr lang="en-US" dirty="0"/>
+              <a:t>RC Cars</a:t>
+            </a:r>
+          </a:p>
+        </p:txBody>
+      </p:sp>
+      <p:cxnSp>
+        <p:nvCxnSpPr>
+          <p:cNvPr id="79" name="Straight Arrow Connector 78">
+            <a:extLst>
+              <a:ext uri="{FF2B5EF4-FFF2-40B4-BE49-F238E27FC236}">
+                <a16:creationId xmlns:a16="http://schemas.microsoft.com/office/drawing/2014/main" id="{2B61C965-3D34-B94B-9F12-37413C51899F}"/>
+              </a:ext>
+            </a:extLst>
+          </p:cNvPr>
+          <p:cNvCxnSpPr>
+            <a:cxnSpLocks/>
+            <a:endCxn id="4" idx="1"/>
+          </p:cNvCxnSpPr>
+          <p:nvPr/>
+        </p:nvCxnSpPr>
+        <p:spPr>
+          <a:xfrm flipV="1">
+            <a:off x="2131817" y="4698973"/>
+            <a:ext cx="581787" cy="145880"/>
+          </a:xfrm>
+          <a:prstGeom prst="straightConnector1">
+            <a:avLst/>
+          </a:prstGeom>
+          <a:ln w="57150">
+            <a:solidFill>
+              <a:schemeClr val="tx1"/>
+            </a:solidFill>
+            <a:tailEnd type="triangle"/>
+          </a:ln>
+        </p:spPr>
+        <p:style>
+          <a:lnRef idx="1">
+            <a:schemeClr val="accent1"/>
+          </a:lnRef>
+          <a:fillRef idx="0">
+            <a:schemeClr val="accent1"/>
+          </a:fillRef>
+          <a:effectRef idx="0">
+            <a:schemeClr val="accent1"/>
+          </a:effectRef>
+          <a:fontRef idx="minor">
+            <a:schemeClr val="tx1"/>
+          </a:fontRef>
+        </p:style>
+      </p:cxnSp>
+      <p:sp>
+        <p:nvSpPr>
+          <p:cNvPr id="81" name="TextBox 80">
+            <a:extLst>
+              <a:ext uri="{FF2B5EF4-FFF2-40B4-BE49-F238E27FC236}">
+                <a16:creationId xmlns:a16="http://schemas.microsoft.com/office/drawing/2014/main" id="{A7D7E5BD-78B2-CC42-B485-3348CAB4B30F}"/>
+              </a:ext>
+            </a:extLst>
+          </p:cNvPr>
+          <p:cNvSpPr txBox="1"/>
+          <p:nvPr/>
+        </p:nvSpPr>
+        <p:spPr>
+          <a:xfrm>
+            <a:off x="1747896" y="2448859"/>
+            <a:ext cx="1743426" cy="369332"/>
+          </a:xfrm>
+          <a:prstGeom prst="rect">
+            <a:avLst/>
+          </a:prstGeom>
+          <a:noFill/>
+        </p:spPr>
+        <p:txBody>
+          <a:bodyPr wrap="none" rtlCol="0">
+            <a:spAutoFit/>
+          </a:bodyPr>
+          <a:lstStyle/>
+          <a:p>
+            <a:r>
+              <a:rPr lang="en-US" dirty="0"/>
+              <a:t>Fancy Color Labs</a:t>
+            </a:r>
+          </a:p>
+        </p:txBody>
+      </p:sp>
+      <p:sp>
+        <p:nvSpPr>
+          <p:cNvPr id="84" name="TextBox 83">
+            <a:extLst>
+              <a:ext uri="{FF2B5EF4-FFF2-40B4-BE49-F238E27FC236}">
+                <a16:creationId xmlns:a16="http://schemas.microsoft.com/office/drawing/2014/main" id="{867683BD-0C18-B144-A642-A93CB37348AA}"/>
+              </a:ext>
+            </a:extLst>
+          </p:cNvPr>
+          <p:cNvSpPr txBox="1"/>
+          <p:nvPr/>
+        </p:nvSpPr>
+        <p:spPr>
+          <a:xfrm>
+            <a:off x="3056756" y="1425941"/>
+            <a:ext cx="2554289" cy="369332"/>
+          </a:xfrm>
+          <a:prstGeom prst="rect">
+            <a:avLst/>
+          </a:prstGeom>
+          <a:noFill/>
+        </p:spPr>
+        <p:txBody>
+          <a:bodyPr wrap="none" rtlCol="0">
+            <a:spAutoFit/>
+          </a:bodyPr>
+          <a:lstStyle/>
+          <a:p>
+            <a:r>
+              <a:rPr lang="en-US" dirty="0"/>
+              <a:t>Tune Parameters Quickly </a:t>
+            </a:r>
+          </a:p>
+        </p:txBody>
+      </p:sp>
+      <p:sp>
+        <p:nvSpPr>
+          <p:cNvPr id="85" name="TextBox 84">
+            <a:extLst>
+              <a:ext uri="{FF2B5EF4-FFF2-40B4-BE49-F238E27FC236}">
+                <a16:creationId xmlns:a16="http://schemas.microsoft.com/office/drawing/2014/main" id="{EA645720-C9A9-844A-82DB-5CBD9EA05892}"/>
+              </a:ext>
+            </a:extLst>
+          </p:cNvPr>
+          <p:cNvSpPr txBox="1"/>
+          <p:nvPr/>
+        </p:nvSpPr>
+        <p:spPr>
+          <a:xfrm>
+            <a:off x="4296137" y="2141917"/>
+            <a:ext cx="1878848" cy="369332"/>
+          </a:xfrm>
+          <a:prstGeom prst="rect">
+            <a:avLst/>
+          </a:prstGeom>
+          <a:noFill/>
+        </p:spPr>
+        <p:txBody>
+          <a:bodyPr wrap="none" rtlCol="0">
+            <a:spAutoFit/>
+          </a:bodyPr>
+          <a:lstStyle/>
+          <a:p>
+            <a:r>
+              <a:rPr lang="en-US" dirty="0"/>
+              <a:t>Buttons, Encoders</a:t>
+            </a:r>
+          </a:p>
+        </p:txBody>
+      </p:sp>
+      <p:sp>
+        <p:nvSpPr>
+          <p:cNvPr id="88" name="TextBox 87">
+            <a:extLst>
+              <a:ext uri="{FF2B5EF4-FFF2-40B4-BE49-F238E27FC236}">
+                <a16:creationId xmlns:a16="http://schemas.microsoft.com/office/drawing/2014/main" id="{0800FA3F-92B5-3E4F-803A-B512AF76A6B6}"/>
+              </a:ext>
+            </a:extLst>
+          </p:cNvPr>
+          <p:cNvSpPr txBox="1"/>
+          <p:nvPr/>
+        </p:nvSpPr>
+        <p:spPr>
+          <a:xfrm>
+            <a:off x="7411142" y="3182329"/>
+            <a:ext cx="1115755" cy="369332"/>
+          </a:xfrm>
+          <a:prstGeom prst="rect">
+            <a:avLst/>
+          </a:prstGeom>
+          <a:noFill/>
+        </p:spPr>
+        <p:txBody>
+          <a:bodyPr wrap="none" rtlCol="0">
+            <a:spAutoFit/>
+          </a:bodyPr>
+          <a:lstStyle/>
+          <a:p>
+            <a:r>
+              <a:rPr lang="en-US" dirty="0"/>
+              <a:t>Bluetooth</a:t>
+            </a:r>
+          </a:p>
+        </p:txBody>
+      </p:sp>
+      <p:sp>
+        <p:nvSpPr>
+          <p:cNvPr id="89" name="TextBox 88">
+            <a:extLst>
+              <a:ext uri="{FF2B5EF4-FFF2-40B4-BE49-F238E27FC236}">
+                <a16:creationId xmlns:a16="http://schemas.microsoft.com/office/drawing/2014/main" id="{550DEE7A-0317-424B-9025-DF49DEF100D1}"/>
+              </a:ext>
+            </a:extLst>
+          </p:cNvPr>
+          <p:cNvSpPr txBox="1"/>
+          <p:nvPr/>
+        </p:nvSpPr>
+        <p:spPr>
+          <a:xfrm>
+            <a:off x="6473345" y="3163413"/>
+            <a:ext cx="712054" cy="369332"/>
+          </a:xfrm>
+          <a:prstGeom prst="rect">
+            <a:avLst/>
+          </a:prstGeom>
+          <a:noFill/>
+        </p:spPr>
+        <p:txBody>
+          <a:bodyPr wrap="none" rtlCol="0">
+            <a:spAutoFit/>
+          </a:bodyPr>
+          <a:lstStyle/>
+          <a:p>
+            <a:r>
+              <a:rPr lang="en-US" dirty="0"/>
+              <a:t>Servo</a:t>
+            </a:r>
+          </a:p>
+        </p:txBody>
+      </p:sp>
+      <p:sp>
+        <p:nvSpPr>
+          <p:cNvPr id="90" name="TextBox 89">
+            <a:extLst>
+              <a:ext uri="{FF2B5EF4-FFF2-40B4-BE49-F238E27FC236}">
+                <a16:creationId xmlns:a16="http://schemas.microsoft.com/office/drawing/2014/main" id="{E02A3F7E-CC2B-484E-B9E8-3E62235B9098}"/>
+              </a:ext>
+            </a:extLst>
+          </p:cNvPr>
+          <p:cNvSpPr txBox="1"/>
+          <p:nvPr/>
+        </p:nvSpPr>
+        <p:spPr>
+          <a:xfrm>
+            <a:off x="3492750" y="3121189"/>
+            <a:ext cx="627095" cy="369332"/>
+          </a:xfrm>
+          <a:prstGeom prst="rect">
+            <a:avLst/>
+          </a:prstGeom>
+          <a:noFill/>
+        </p:spPr>
+        <p:txBody>
+          <a:bodyPr wrap="none" rtlCol="0">
+            <a:spAutoFit/>
+          </a:bodyPr>
+          <a:lstStyle/>
+          <a:p>
+            <a:r>
+              <a:rPr lang="en-US" dirty="0"/>
+              <a:t>LEDs</a:t>
+            </a:r>
+          </a:p>
+        </p:txBody>
+      </p:sp>
+      <p:sp>
+        <p:nvSpPr>
+          <p:cNvPr id="93" name="TextBox 92">
+            <a:extLst>
+              <a:ext uri="{FF2B5EF4-FFF2-40B4-BE49-F238E27FC236}">
+                <a16:creationId xmlns:a16="http://schemas.microsoft.com/office/drawing/2014/main" id="{F3B9BCDD-2D6C-3444-963C-92B12182D30E}"/>
+              </a:ext>
+            </a:extLst>
+          </p:cNvPr>
+          <p:cNvSpPr txBox="1"/>
+          <p:nvPr/>
+        </p:nvSpPr>
+        <p:spPr>
+          <a:xfrm>
+            <a:off x="9919037" y="3059668"/>
+            <a:ext cx="1454885" cy="369332"/>
+          </a:xfrm>
+          <a:prstGeom prst="rect">
+            <a:avLst/>
+          </a:prstGeom>
+          <a:noFill/>
+        </p:spPr>
+        <p:txBody>
+          <a:bodyPr wrap="none" rtlCol="0">
+            <a:spAutoFit/>
+          </a:bodyPr>
+          <a:lstStyle/>
+          <a:p>
+            <a:r>
+              <a:rPr lang="en-US" dirty="0"/>
+              <a:t>Wireless Labs</a:t>
+            </a:r>
+          </a:p>
+        </p:txBody>
+      </p:sp>
     </p:spTree>
     <p:extLst>
       <p:ext uri="{BB962C8B-B14F-4D97-AF65-F5344CB8AC3E}">

</xml_diff>

<commit_message>
Deployed a2a0534 with MkDocs version: 1.1.2
</commit_message>
<xml_diff>
--- a/presentations/Robot_Figures.pptx
+++ b/presentations/Robot_Figures.pptx
@@ -7,6 +7,7 @@
   <p:sldIdLst>
     <p:sldId id="256" r:id="rId2"/>
     <p:sldId id="257" r:id="rId3"/>
+    <p:sldId id="258" r:id="rId4"/>
   </p:sldIdLst>
   <p:sldSz cx="12192000" cy="6858000"/>
   <p:notesSz cx="6858000" cy="9144000"/>
@@ -4404,7 +4405,7 @@
         </p:nvSpPr>
         <p:spPr>
           <a:xfrm>
-            <a:off x="2258988" y="5585520"/>
+            <a:off x="2216350" y="5670013"/>
             <a:ext cx="1506374" cy="276999"/>
           </a:xfrm>
           <a:prstGeom prst="rect">
@@ -5647,6 +5648,466 @@
     <p:extLst>
       <p:ext uri="{BB962C8B-B14F-4D97-AF65-F5344CB8AC3E}">
         <p14:creationId xmlns:p14="http://schemas.microsoft.com/office/powerpoint/2010/main" val="721564607"/>
+      </p:ext>
+    </p:extLst>
+  </p:cSld>
+  <p:clrMapOvr>
+    <a:masterClrMapping/>
+  </p:clrMapOvr>
+</p:sld>
+</file>
+
+<file path=ppt/slides/slide3.xml><?xml version="1.0" encoding="utf-8"?>
+<p:sld xmlns:a="http://schemas.openxmlformats.org/drawingml/2006/main" xmlns:r="http://schemas.openxmlformats.org/officeDocument/2006/relationships" xmlns:p="http://schemas.openxmlformats.org/presentationml/2006/main">
+  <p:cSld>
+    <p:spTree>
+      <p:nvGrpSpPr>
+        <p:cNvPr id="1" name=""/>
+        <p:cNvGrpSpPr/>
+        <p:nvPr/>
+      </p:nvGrpSpPr>
+      <p:grpSpPr>
+        <a:xfrm>
+          <a:off x="0" y="0"/>
+          <a:ext cx="0" cy="0"/>
+          <a:chOff x="0" y="0"/>
+          <a:chExt cx="0" cy="0"/>
+        </a:xfrm>
+      </p:grpSpPr>
+      <p:sp>
+        <p:nvSpPr>
+          <p:cNvPr id="2" name="Title 1">
+            <a:extLst>
+              <a:ext uri="{FF2B5EF4-FFF2-40B4-BE49-F238E27FC236}">
+                <a16:creationId xmlns:a16="http://schemas.microsoft.com/office/drawing/2014/main" id="{E4D8777E-F39A-5840-90B5-C444944BC841}"/>
+              </a:ext>
+            </a:extLst>
+          </p:cNvPr>
+          <p:cNvSpPr>
+            <a:spLocks noGrp="1"/>
+          </p:cNvSpPr>
+          <p:nvPr>
+            <p:ph type="title"/>
+          </p:nvPr>
+        </p:nvSpPr>
+        <p:spPr>
+          <a:xfrm>
+            <a:off x="518711" y="111738"/>
+            <a:ext cx="10515600" cy="538258"/>
+          </a:xfrm>
+        </p:spPr>
+        <p:txBody>
+          <a:bodyPr>
+            <a:normAutofit fontScale="90000"/>
+          </a:bodyPr>
+          <a:lstStyle/>
+          <a:p>
+            <a:r>
+              <a:rPr lang="en-US" dirty="0"/>
+              <a:t>Pico Robot Parts List</a:t>
+            </a:r>
+          </a:p>
+        </p:txBody>
+      </p:sp>
+      <p:graphicFrame>
+        <p:nvGraphicFramePr>
+          <p:cNvPr id="6" name="Table 6">
+            <a:extLst>
+              <a:ext uri="{FF2B5EF4-FFF2-40B4-BE49-F238E27FC236}">
+                <a16:creationId xmlns:a16="http://schemas.microsoft.com/office/drawing/2014/main" id="{3398BE0A-58EA-1E4E-926C-81645AC5D6F7}"/>
+              </a:ext>
+            </a:extLst>
+          </p:cNvPr>
+          <p:cNvGraphicFramePr>
+            <a:graphicFrameLocks noGrp="1"/>
+          </p:cNvGraphicFramePr>
+          <p:nvPr>
+            <p:ph idx="1"/>
+            <p:extLst>
+              <p:ext uri="{D42A27DB-BD31-4B8C-83A1-F6EECF244321}">
+                <p14:modId xmlns:p14="http://schemas.microsoft.com/office/powerpoint/2010/main" val="1168719325"/>
+              </p:ext>
+            </p:extLst>
+          </p:nvPr>
+        </p:nvGraphicFramePr>
+        <p:xfrm>
+          <a:off x="771181" y="1825625"/>
+          <a:ext cx="10582616" cy="3677920"/>
+        </p:xfrm>
+        <a:graphic>
+          <a:graphicData uri="http://schemas.openxmlformats.org/drawingml/2006/table">
+            <a:tbl>
+              <a:tblPr firstRow="1" bandRow="1">
+                <a:tableStyleId>{5C22544A-7EE6-4342-B048-85BDC9FD1C3A}</a:tableStyleId>
+              </a:tblPr>
+              <a:tblGrid>
+                <a:gridCol w="3007605">
+                  <a:extLst>
+                    <a:ext uri="{9D8B030D-6E8A-4147-A177-3AD203B41FA5}">
+                      <a16:colId xmlns:a16="http://schemas.microsoft.com/office/drawing/2014/main" val="1316812929"/>
+                    </a:ext>
+                  </a:extLst>
+                </a:gridCol>
+                <a:gridCol w="6092327">
+                  <a:extLst>
+                    <a:ext uri="{9D8B030D-6E8A-4147-A177-3AD203B41FA5}">
+                      <a16:colId xmlns:a16="http://schemas.microsoft.com/office/drawing/2014/main" val="849467549"/>
+                    </a:ext>
+                  </a:extLst>
+                </a:gridCol>
+                <a:gridCol w="1482684">
+                  <a:extLst>
+                    <a:ext uri="{9D8B030D-6E8A-4147-A177-3AD203B41FA5}">
+                      <a16:colId xmlns:a16="http://schemas.microsoft.com/office/drawing/2014/main" val="1417310283"/>
+                    </a:ext>
+                  </a:extLst>
+                </a:gridCol>
+              </a:tblGrid>
+              <a:tr h="370840">
+                <a:tc>
+                  <a:txBody>
+                    <a:bodyPr/>
+                    <a:lstStyle/>
+                    <a:p>
+                      <a:r>
+                        <a:rPr lang="en-US" dirty="0"/>
+                        <a:t>Part Name</a:t>
+                      </a:r>
+                    </a:p>
+                  </a:txBody>
+                  <a:tcPr/>
+                </a:tc>
+                <a:tc>
+                  <a:txBody>
+                    <a:bodyPr/>
+                    <a:lstStyle/>
+                    <a:p>
+                      <a:r>
+                        <a:rPr lang="en-US" dirty="0"/>
+                        <a:t>Description</a:t>
+                      </a:r>
+                    </a:p>
+                  </a:txBody>
+                  <a:tcPr/>
+                </a:tc>
+                <a:tc>
+                  <a:txBody>
+                    <a:bodyPr/>
+                    <a:lstStyle/>
+                    <a:p>
+                      <a:r>
+                        <a:rPr lang="en-US" dirty="0"/>
+                        <a:t>Price</a:t>
+                      </a:r>
+                    </a:p>
+                  </a:txBody>
+                  <a:tcPr/>
+                </a:tc>
+                <a:extLst>
+                  <a:ext uri="{0D108BD9-81ED-4DB2-BD59-A6C34878D82A}">
+                    <a16:rowId xmlns:a16="http://schemas.microsoft.com/office/drawing/2014/main" val="814732166"/>
+                  </a:ext>
+                </a:extLst>
+              </a:tr>
+              <a:tr h="370840">
+                <a:tc>
+                  <a:txBody>
+                    <a:bodyPr/>
+                    <a:lstStyle/>
+                    <a:p>
+                      <a:r>
+                        <a:rPr lang="en-US" dirty="0"/>
+                        <a:t>Smart Car Chassis</a:t>
+                      </a:r>
+                    </a:p>
+                  </a:txBody>
+                  <a:tcPr/>
+                </a:tc>
+                <a:tc>
+                  <a:txBody>
+                    <a:bodyPr/>
+                    <a:lstStyle/>
+                    <a:p>
+                      <a:r>
+                        <a:rPr lang="en-US" dirty="0"/>
+                        <a:t>Includes two 1:48 geared DC hobby motors, wheels, body, power switch and 4 AA cell battery pack.  It does require soldering four wires to the motors and two to the switch.</a:t>
+                      </a:r>
+                    </a:p>
+                  </a:txBody>
+                  <a:tcPr/>
+                </a:tc>
+                <a:tc>
+                  <a:txBody>
+                    <a:bodyPr/>
+                    <a:lstStyle/>
+                    <a:p>
+                      <a:r>
+                        <a:rPr lang="en-US" dirty="0"/>
+                        <a:t>$11</a:t>
+                      </a:r>
+                    </a:p>
+                  </a:txBody>
+                  <a:tcPr/>
+                </a:tc>
+                <a:extLst>
+                  <a:ext uri="{0D108BD9-81ED-4DB2-BD59-A6C34878D82A}">
+                    <a16:rowId xmlns:a16="http://schemas.microsoft.com/office/drawing/2014/main" val="4235589932"/>
+                  </a:ext>
+                </a:extLst>
+              </a:tr>
+              <a:tr h="370840">
+                <a:tc>
+                  <a:txBody>
+                    <a:bodyPr/>
+                    <a:lstStyle/>
+                    <a:p>
+                      <a:r>
+                        <a:rPr lang="en-US" dirty="0"/>
+                        <a:t>Raspberry Pi Pico</a:t>
+                      </a:r>
+                    </a:p>
+                  </a:txBody>
+                  <a:tcPr/>
+                </a:tc>
+                <a:tc>
+                  <a:txBody>
+                    <a:bodyPr/>
+                    <a:lstStyle/>
+                    <a:p>
+                      <a:r>
+                        <a:rPr lang="en-US" dirty="0"/>
+                        <a:t>40 pin package with headers.  We solder our own headers, but you can also purchase them pre-soldered.</a:t>
+                      </a:r>
+                    </a:p>
+                  </a:txBody>
+                  <a:tcPr/>
+                </a:tc>
+                <a:tc>
+                  <a:txBody>
+                    <a:bodyPr/>
+                    <a:lstStyle/>
+                    <a:p>
+                      <a:r>
+                        <a:rPr lang="en-US" dirty="0"/>
+                        <a:t>$4</a:t>
+                      </a:r>
+                    </a:p>
+                  </a:txBody>
+                  <a:tcPr/>
+                </a:tc>
+                <a:extLst>
+                  <a:ext uri="{0D108BD9-81ED-4DB2-BD59-A6C34878D82A}">
+                    <a16:rowId xmlns:a16="http://schemas.microsoft.com/office/drawing/2014/main" val="471647470"/>
+                  </a:ext>
+                </a:extLst>
+              </a:tr>
+              <a:tr h="370840">
+                <a:tc>
+                  <a:txBody>
+                    <a:bodyPr/>
+                    <a:lstStyle/>
+                    <a:p>
+                      <a:r>
+                        <a:rPr lang="en-US" dirty="0"/>
+                        <a:t>Breadboard</a:t>
+                      </a:r>
+                    </a:p>
+                  </a:txBody>
+                  <a:tcPr/>
+                </a:tc>
+                <a:tc>
+                  <a:txBody>
+                    <a:bodyPr/>
+                    <a:lstStyle/>
+                    <a:p>
+                      <a:pPr marL="0" marR="0" lvl="0" indent="0" algn="l" defTabSz="914400" rtl="0" eaLnBrk="1" fontAlgn="auto" latinLnBrk="0" hangingPunct="1">
+                        <a:lnSpc>
+                          <a:spcPct val="100000"/>
+                        </a:lnSpc>
+                        <a:spcBef>
+                          <a:spcPts val="0"/>
+                        </a:spcBef>
+                        <a:spcAft>
+                          <a:spcPts val="0"/>
+                        </a:spcAft>
+                        <a:buClrTx/>
+                        <a:buSzTx/>
+                        <a:buFontTx/>
+                        <a:buNone/>
+                        <a:tabLst/>
+                        <a:defRPr/>
+                      </a:pPr>
+                      <a:r>
+                        <a:rPr lang="en-US" dirty="0"/>
+                        <a:t>½ size 400 tie solderless breadboard with power rails (5v and 3.3v)</a:t>
+                      </a:r>
+                    </a:p>
+                  </a:txBody>
+                  <a:tcPr/>
+                </a:tc>
+                <a:tc>
+                  <a:txBody>
+                    <a:bodyPr/>
+                    <a:lstStyle/>
+                    <a:p>
+                      <a:r>
+                        <a:rPr lang="en-US" dirty="0"/>
+                        <a:t>$2</a:t>
+                      </a:r>
+                    </a:p>
+                  </a:txBody>
+                  <a:tcPr/>
+                </a:tc>
+                <a:extLst>
+                  <a:ext uri="{0D108BD9-81ED-4DB2-BD59-A6C34878D82A}">
+                    <a16:rowId xmlns:a16="http://schemas.microsoft.com/office/drawing/2014/main" val="3395312848"/>
+                  </a:ext>
+                </a:extLst>
+              </a:tr>
+              <a:tr h="370840">
+                <a:tc>
+                  <a:txBody>
+                    <a:bodyPr/>
+                    <a:lstStyle/>
+                    <a:p>
+                      <a:r>
+                        <a:rPr lang="en-US" dirty="0"/>
+                        <a:t>Time of Flight Distance Sensor</a:t>
+                      </a:r>
+                    </a:p>
+                  </a:txBody>
+                  <a:tcPr/>
+                </a:tc>
+                <a:tc>
+                  <a:txBody>
+                    <a:bodyPr/>
+                    <a:lstStyle/>
+                    <a:p>
+                      <a:r>
+                        <a:rPr lang="en-US" dirty="0"/>
+                        <a:t>GYUL530K sensor with I2C interface</a:t>
+                      </a:r>
+                    </a:p>
+                  </a:txBody>
+                  <a:tcPr/>
+                </a:tc>
+                <a:tc>
+                  <a:txBody>
+                    <a:bodyPr/>
+                    <a:lstStyle/>
+                    <a:p>
+                      <a:r>
+                        <a:rPr lang="en-US" dirty="0"/>
+                        <a:t>$4</a:t>
+                      </a:r>
+                    </a:p>
+                  </a:txBody>
+                  <a:tcPr/>
+                </a:tc>
+                <a:extLst>
+                  <a:ext uri="{0D108BD9-81ED-4DB2-BD59-A6C34878D82A}">
+                    <a16:rowId xmlns:a16="http://schemas.microsoft.com/office/drawing/2014/main" val="128521788"/>
+                  </a:ext>
+                </a:extLst>
+              </a:tr>
+              <a:tr h="370840">
+                <a:tc>
+                  <a:txBody>
+                    <a:bodyPr/>
+                    <a:lstStyle/>
+                    <a:p>
+                      <a:r>
+                        <a:rPr lang="en-US" dirty="0"/>
+                        <a:t>Motor Driver</a:t>
+                      </a:r>
+                    </a:p>
+                  </a:txBody>
+                  <a:tcPr/>
+                </a:tc>
+                <a:tc>
+                  <a:txBody>
+                    <a:bodyPr/>
+                    <a:lstStyle/>
+                    <a:p>
+                      <a:r>
+                        <a:rPr lang="en-US" dirty="0"/>
+                        <a:t>L293 C motor driver board with 5-volt voltage regulator.</a:t>
+                      </a:r>
+                    </a:p>
+                  </a:txBody>
+                  <a:tcPr/>
+                </a:tc>
+                <a:tc>
+                  <a:txBody>
+                    <a:bodyPr/>
+                    <a:lstStyle/>
+                    <a:p>
+                      <a:r>
+                        <a:rPr lang="en-US" dirty="0"/>
+                        <a:t>$2</a:t>
+                      </a:r>
+                    </a:p>
+                  </a:txBody>
+                  <a:tcPr/>
+                </a:tc>
+                <a:extLst>
+                  <a:ext uri="{0D108BD9-81ED-4DB2-BD59-A6C34878D82A}">
+                    <a16:rowId xmlns:a16="http://schemas.microsoft.com/office/drawing/2014/main" val="3458296256"/>
+                  </a:ext>
+                </a:extLst>
+              </a:tr>
+              <a:tr h="370840">
+                <a:tc>
+                  <a:txBody>
+                    <a:bodyPr/>
+                    <a:lstStyle/>
+                    <a:p>
+                      <a:endParaRPr lang="en-US" dirty="0"/>
+                    </a:p>
+                  </a:txBody>
+                  <a:tcPr/>
+                </a:tc>
+                <a:tc>
+                  <a:txBody>
+                    <a:bodyPr/>
+                    <a:lstStyle/>
+                    <a:p>
+                      <a:pPr algn="r"/>
+                      <a:r>
+                        <a:rPr lang="en-US" b="1" dirty="0"/>
+                        <a:t>Total:</a:t>
+                      </a:r>
+                    </a:p>
+                  </a:txBody>
+                  <a:tcPr/>
+                </a:tc>
+                <a:tc>
+                  <a:txBody>
+                    <a:bodyPr/>
+                    <a:lstStyle/>
+                    <a:p>
+                      <a:r>
+                        <a:rPr lang="en-US" dirty="0"/>
+                        <a:t>$23.00</a:t>
+                      </a:r>
+                    </a:p>
+                  </a:txBody>
+                  <a:tcPr/>
+                </a:tc>
+                <a:extLst>
+                  <a:ext uri="{0D108BD9-81ED-4DB2-BD59-A6C34878D82A}">
+                    <a16:rowId xmlns:a16="http://schemas.microsoft.com/office/drawing/2014/main" val="4121464980"/>
+                  </a:ext>
+                </a:extLst>
+              </a:tr>
+            </a:tbl>
+          </a:graphicData>
+        </a:graphic>
+      </p:graphicFrame>
+    </p:spTree>
+    <p:extLst>
+      <p:ext uri="{BB962C8B-B14F-4D97-AF65-F5344CB8AC3E}">
+        <p14:creationId xmlns:p14="http://schemas.microsoft.com/office/powerpoint/2010/main" val="1699076770"/>
       </p:ext>
     </p:extLst>
   </p:cSld>

</xml_diff>

<commit_message>
Deployed c17d01c with MkDocs version: 1.1.2
</commit_message>
<xml_diff>
--- a/presentations/Robot_Figures.pptx
+++ b/presentations/Robot_Figures.pptx
@@ -8,6 +8,12 @@
     <p:sldId id="256" r:id="rId2"/>
     <p:sldId id="257" r:id="rId3"/>
     <p:sldId id="258" r:id="rId4"/>
+    <p:sldId id="259" r:id="rId5"/>
+    <p:sldId id="261" r:id="rId6"/>
+    <p:sldId id="260" r:id="rId7"/>
+    <p:sldId id="262" r:id="rId8"/>
+    <p:sldId id="263" r:id="rId9"/>
+    <p:sldId id="264" r:id="rId10"/>
   </p:sldIdLst>
   <p:sldSz cx="12192000" cy="6858000"/>
   <p:notesSz cx="6858000" cy="9144000"/>
@@ -261,7 +267,7 @@
           <a:p>
             <a:fld id="{25B7C100-6DA6-7E47-AB86-E17959480C67}" type="datetimeFigureOut">
               <a:rPr lang="en-US" smtClean="0"/>
-              <a:t>5/25/21</a:t>
+              <a:t>6/12/21</a:t>
             </a:fld>
             <a:endParaRPr lang="en-US"/>
           </a:p>
@@ -459,7 +465,7 @@
           <a:p>
             <a:fld id="{25B7C100-6DA6-7E47-AB86-E17959480C67}" type="datetimeFigureOut">
               <a:rPr lang="en-US" smtClean="0"/>
-              <a:t>5/25/21</a:t>
+              <a:t>6/12/21</a:t>
             </a:fld>
             <a:endParaRPr lang="en-US"/>
           </a:p>
@@ -667,7 +673,7 @@
           <a:p>
             <a:fld id="{25B7C100-6DA6-7E47-AB86-E17959480C67}" type="datetimeFigureOut">
               <a:rPr lang="en-US" smtClean="0"/>
-              <a:t>5/25/21</a:t>
+              <a:t>6/12/21</a:t>
             </a:fld>
             <a:endParaRPr lang="en-US"/>
           </a:p>
@@ -865,7 +871,7 @@
           <a:p>
             <a:fld id="{25B7C100-6DA6-7E47-AB86-E17959480C67}" type="datetimeFigureOut">
               <a:rPr lang="en-US" smtClean="0"/>
-              <a:t>5/25/21</a:t>
+              <a:t>6/12/21</a:t>
             </a:fld>
             <a:endParaRPr lang="en-US"/>
           </a:p>
@@ -1140,7 +1146,7 @@
           <a:p>
             <a:fld id="{25B7C100-6DA6-7E47-AB86-E17959480C67}" type="datetimeFigureOut">
               <a:rPr lang="en-US" smtClean="0"/>
-              <a:t>5/25/21</a:t>
+              <a:t>6/12/21</a:t>
             </a:fld>
             <a:endParaRPr lang="en-US"/>
           </a:p>
@@ -1405,7 +1411,7 @@
           <a:p>
             <a:fld id="{25B7C100-6DA6-7E47-AB86-E17959480C67}" type="datetimeFigureOut">
               <a:rPr lang="en-US" smtClean="0"/>
-              <a:t>5/25/21</a:t>
+              <a:t>6/12/21</a:t>
             </a:fld>
             <a:endParaRPr lang="en-US"/>
           </a:p>
@@ -1817,7 +1823,7 @@
           <a:p>
             <a:fld id="{25B7C100-6DA6-7E47-AB86-E17959480C67}" type="datetimeFigureOut">
               <a:rPr lang="en-US" smtClean="0"/>
-              <a:t>5/25/21</a:t>
+              <a:t>6/12/21</a:t>
             </a:fld>
             <a:endParaRPr lang="en-US"/>
           </a:p>
@@ -1958,7 +1964,7 @@
           <a:p>
             <a:fld id="{25B7C100-6DA6-7E47-AB86-E17959480C67}" type="datetimeFigureOut">
               <a:rPr lang="en-US" smtClean="0"/>
-              <a:t>5/25/21</a:t>
+              <a:t>6/12/21</a:t>
             </a:fld>
             <a:endParaRPr lang="en-US"/>
           </a:p>
@@ -2071,7 +2077,7 @@
           <a:p>
             <a:fld id="{25B7C100-6DA6-7E47-AB86-E17959480C67}" type="datetimeFigureOut">
               <a:rPr lang="en-US" smtClean="0"/>
-              <a:t>5/25/21</a:t>
+              <a:t>6/12/21</a:t>
             </a:fld>
             <a:endParaRPr lang="en-US"/>
           </a:p>
@@ -2382,7 +2388,7 @@
           <a:p>
             <a:fld id="{25B7C100-6DA6-7E47-AB86-E17959480C67}" type="datetimeFigureOut">
               <a:rPr lang="en-US" smtClean="0"/>
-              <a:t>5/25/21</a:t>
+              <a:t>6/12/21</a:t>
             </a:fld>
             <a:endParaRPr lang="en-US"/>
           </a:p>
@@ -2670,7 +2676,7 @@
           <a:p>
             <a:fld id="{25B7C100-6DA6-7E47-AB86-E17959480C67}" type="datetimeFigureOut">
               <a:rPr lang="en-US" smtClean="0"/>
-              <a:t>5/25/21</a:t>
+              <a:t>6/12/21</a:t>
             </a:fld>
             <a:endParaRPr lang="en-US"/>
           </a:p>
@@ -2911,7 +2917,7 @@
           <a:p>
             <a:fld id="{25B7C100-6DA6-7E47-AB86-E17959480C67}" type="datetimeFigureOut">
               <a:rPr lang="en-US" smtClean="0"/>
-              <a:t>5/25/21</a:t>
+              <a:t>6/12/21</a:t>
             </a:fld>
             <a:endParaRPr lang="en-US"/>
           </a:p>
@@ -6117,6 +6123,4676 @@
 </p:sld>
 </file>
 
+<file path=ppt/slides/slide4.xml><?xml version="1.0" encoding="utf-8"?>
+<p:sld xmlns:a="http://schemas.openxmlformats.org/drawingml/2006/main" xmlns:r="http://schemas.openxmlformats.org/officeDocument/2006/relationships" xmlns:p="http://schemas.openxmlformats.org/presentationml/2006/main">
+  <p:cSld>
+    <p:spTree>
+      <p:nvGrpSpPr>
+        <p:cNvPr id="1" name=""/>
+        <p:cNvGrpSpPr/>
+        <p:nvPr/>
+      </p:nvGrpSpPr>
+      <p:grpSpPr>
+        <a:xfrm>
+          <a:off x="0" y="0"/>
+          <a:ext cx="0" cy="0"/>
+          <a:chOff x="0" y="0"/>
+          <a:chExt cx="0" cy="0"/>
+        </a:xfrm>
+      </p:grpSpPr>
+      <p:sp>
+        <p:nvSpPr>
+          <p:cNvPr id="2" name="Title 1">
+            <a:extLst>
+              <a:ext uri="{FF2B5EF4-FFF2-40B4-BE49-F238E27FC236}">
+                <a16:creationId xmlns:a16="http://schemas.microsoft.com/office/drawing/2014/main" id="{C8BAA211-6167-C74B-ACCF-0A2761FF56C9}"/>
+              </a:ext>
+            </a:extLst>
+          </p:cNvPr>
+          <p:cNvSpPr>
+            <a:spLocks noGrp="1"/>
+          </p:cNvSpPr>
+          <p:nvPr>
+            <p:ph type="title"/>
+          </p:nvPr>
+        </p:nvSpPr>
+        <p:spPr>
+          <a:xfrm>
+            <a:off x="152400" y="87771"/>
+            <a:ext cx="10515600" cy="670461"/>
+          </a:xfrm>
+        </p:spPr>
+        <p:txBody>
+          <a:bodyPr>
+            <a:normAutofit fontScale="90000"/>
+          </a:bodyPr>
+          <a:lstStyle/>
+          <a:p>
+            <a:r>
+              <a:rPr lang="en-US" dirty="0"/>
+              <a:t>Base Bot Circuit Diagram</a:t>
+            </a:r>
+          </a:p>
+        </p:txBody>
+      </p:sp>
+      <p:pic>
+        <p:nvPicPr>
+          <p:cNvPr id="4" name="Picture 3">
+            <a:extLst>
+              <a:ext uri="{FF2B5EF4-FFF2-40B4-BE49-F238E27FC236}">
+                <a16:creationId xmlns:a16="http://schemas.microsoft.com/office/drawing/2014/main" id="{281C427F-3E9F-EB48-A44C-BE51345DC1F1}"/>
+              </a:ext>
+            </a:extLst>
+          </p:cNvPr>
+          <p:cNvPicPr>
+            <a:picLocks noChangeAspect="1"/>
+          </p:cNvPicPr>
+          <p:nvPr/>
+        </p:nvPicPr>
+        <p:blipFill>
+          <a:blip r:embed="rId2"/>
+          <a:stretch>
+            <a:fillRect/>
+          </a:stretch>
+        </p:blipFill>
+        <p:spPr>
+          <a:xfrm>
+            <a:off x="3926579" y="758232"/>
+            <a:ext cx="2337061" cy="5861808"/>
+          </a:xfrm>
+          <a:prstGeom prst="rect">
+            <a:avLst/>
+          </a:prstGeom>
+        </p:spPr>
+      </p:pic>
+    </p:spTree>
+    <p:extLst>
+      <p:ext uri="{BB962C8B-B14F-4D97-AF65-F5344CB8AC3E}">
+        <p14:creationId xmlns:p14="http://schemas.microsoft.com/office/powerpoint/2010/main" val="438934724"/>
+      </p:ext>
+    </p:extLst>
+  </p:cSld>
+  <p:clrMapOvr>
+    <a:masterClrMapping/>
+  </p:clrMapOvr>
+</p:sld>
+</file>
+
+<file path=ppt/slides/slide5.xml><?xml version="1.0" encoding="utf-8"?>
+<p:sld xmlns:a="http://schemas.openxmlformats.org/drawingml/2006/main" xmlns:r="http://schemas.openxmlformats.org/officeDocument/2006/relationships" xmlns:p="http://schemas.openxmlformats.org/presentationml/2006/main">
+  <p:cSld>
+    <p:spTree>
+      <p:nvGrpSpPr>
+        <p:cNvPr id="1" name=""/>
+        <p:cNvGrpSpPr/>
+        <p:nvPr/>
+      </p:nvGrpSpPr>
+      <p:grpSpPr>
+        <a:xfrm>
+          <a:off x="0" y="0"/>
+          <a:ext cx="0" cy="0"/>
+          <a:chOff x="0" y="0"/>
+          <a:chExt cx="0" cy="0"/>
+        </a:xfrm>
+      </p:grpSpPr>
+      <p:sp>
+        <p:nvSpPr>
+          <p:cNvPr id="2" name="Title 1">
+            <a:extLst>
+              <a:ext uri="{FF2B5EF4-FFF2-40B4-BE49-F238E27FC236}">
+                <a16:creationId xmlns:a16="http://schemas.microsoft.com/office/drawing/2014/main" id="{38977F6B-07B5-BA49-8810-745106D167EF}"/>
+              </a:ext>
+            </a:extLst>
+          </p:cNvPr>
+          <p:cNvSpPr>
+            <a:spLocks noGrp="1"/>
+          </p:cNvSpPr>
+          <p:nvPr>
+            <p:ph type="title"/>
+          </p:nvPr>
+        </p:nvSpPr>
+        <p:spPr/>
+        <p:txBody>
+          <a:bodyPr/>
+          <a:lstStyle/>
+          <a:p>
+            <a:endParaRPr lang="en-US"/>
+          </a:p>
+        </p:txBody>
+      </p:sp>
+      <p:sp>
+        <p:nvSpPr>
+          <p:cNvPr id="3" name="Content Placeholder 2">
+            <a:extLst>
+              <a:ext uri="{FF2B5EF4-FFF2-40B4-BE49-F238E27FC236}">
+                <a16:creationId xmlns:a16="http://schemas.microsoft.com/office/drawing/2014/main" id="{DA78C6A0-755A-1E4F-B525-91A60C99B206}"/>
+              </a:ext>
+            </a:extLst>
+          </p:cNvPr>
+          <p:cNvSpPr>
+            <a:spLocks noGrp="1"/>
+          </p:cNvSpPr>
+          <p:nvPr>
+            <p:ph idx="1"/>
+          </p:nvPr>
+        </p:nvSpPr>
+        <p:spPr/>
+        <p:txBody>
+          <a:bodyPr/>
+          <a:lstStyle/>
+          <a:p>
+            <a:endParaRPr lang="en-US"/>
+          </a:p>
+        </p:txBody>
+      </p:sp>
+      <p:pic>
+        <p:nvPicPr>
+          <p:cNvPr id="4" name="Picture 3">
+            <a:extLst>
+              <a:ext uri="{FF2B5EF4-FFF2-40B4-BE49-F238E27FC236}">
+                <a16:creationId xmlns:a16="http://schemas.microsoft.com/office/drawing/2014/main" id="{CAE99699-3187-EB42-B03C-57E42C224092}"/>
+              </a:ext>
+            </a:extLst>
+          </p:cNvPr>
+          <p:cNvPicPr>
+            <a:picLocks noChangeAspect="1"/>
+          </p:cNvPicPr>
+          <p:nvPr/>
+        </p:nvPicPr>
+        <p:blipFill>
+          <a:blip r:embed="rId2"/>
+          <a:stretch>
+            <a:fillRect/>
+          </a:stretch>
+        </p:blipFill>
+        <p:spPr>
+          <a:xfrm rot="5400000">
+            <a:off x="-592898" y="1872900"/>
+            <a:ext cx="5481411" cy="3507263"/>
+          </a:xfrm>
+          <a:prstGeom prst="rect">
+            <a:avLst/>
+          </a:prstGeom>
+        </p:spPr>
+      </p:pic>
+    </p:spTree>
+    <p:extLst>
+      <p:ext uri="{BB962C8B-B14F-4D97-AF65-F5344CB8AC3E}">
+        <p14:creationId xmlns:p14="http://schemas.microsoft.com/office/powerpoint/2010/main" val="658624676"/>
+      </p:ext>
+    </p:extLst>
+  </p:cSld>
+  <p:clrMapOvr>
+    <a:masterClrMapping/>
+  </p:clrMapOvr>
+</p:sld>
+</file>
+
+<file path=ppt/slides/slide6.xml><?xml version="1.0" encoding="utf-8"?>
+<p:sld xmlns:a="http://schemas.openxmlformats.org/drawingml/2006/main" xmlns:r="http://schemas.openxmlformats.org/officeDocument/2006/relationships" xmlns:p="http://schemas.openxmlformats.org/presentationml/2006/main">
+  <p:cSld>
+    <p:spTree>
+      <p:nvGrpSpPr>
+        <p:cNvPr id="1" name=""/>
+        <p:cNvGrpSpPr/>
+        <p:nvPr/>
+      </p:nvGrpSpPr>
+      <p:grpSpPr>
+        <a:xfrm>
+          <a:off x="0" y="0"/>
+          <a:ext cx="0" cy="0"/>
+          <a:chOff x="0" y="0"/>
+          <a:chExt cx="0" cy="0"/>
+        </a:xfrm>
+      </p:grpSpPr>
+      <p:sp>
+        <p:nvSpPr>
+          <p:cNvPr id="2" name="Title 1">
+            <a:extLst>
+              <a:ext uri="{FF2B5EF4-FFF2-40B4-BE49-F238E27FC236}">
+                <a16:creationId xmlns:a16="http://schemas.microsoft.com/office/drawing/2014/main" id="{2800AB51-55E6-2C4D-B3CC-A4DAE7A02025}"/>
+              </a:ext>
+            </a:extLst>
+          </p:cNvPr>
+          <p:cNvSpPr>
+            <a:spLocks noGrp="1"/>
+          </p:cNvSpPr>
+          <p:nvPr>
+            <p:ph type="title"/>
+          </p:nvPr>
+        </p:nvSpPr>
+        <p:spPr>
+          <a:xfrm>
+            <a:off x="0" y="1"/>
+            <a:ext cx="10515600" cy="502920"/>
+          </a:xfrm>
+        </p:spPr>
+        <p:txBody>
+          <a:bodyPr>
+            <a:normAutofit fontScale="90000"/>
+          </a:bodyPr>
+          <a:lstStyle/>
+          <a:p>
+            <a:r>
+              <a:rPr lang="en-US" dirty="0"/>
+              <a:t>Base Bot Breadboard Connections</a:t>
+            </a:r>
+          </a:p>
+        </p:txBody>
+      </p:sp>
+      <p:pic>
+        <p:nvPicPr>
+          <p:cNvPr id="4" name="Picture 3">
+            <a:extLst>
+              <a:ext uri="{FF2B5EF4-FFF2-40B4-BE49-F238E27FC236}">
+                <a16:creationId xmlns:a16="http://schemas.microsoft.com/office/drawing/2014/main" id="{FC4F7588-DEFD-E248-B332-B2336AC5FF3A}"/>
+              </a:ext>
+            </a:extLst>
+          </p:cNvPr>
+          <p:cNvPicPr>
+            <a:picLocks noChangeAspect="1"/>
+          </p:cNvPicPr>
+          <p:nvPr/>
+        </p:nvPicPr>
+        <p:blipFill rotWithShape="1">
+          <a:blip r:embed="rId2"/>
+          <a:srcRect r="32223"/>
+          <a:stretch/>
+        </p:blipFill>
+        <p:spPr>
+          <a:xfrm rot="5400000">
+            <a:off x="297100" y="1034538"/>
+            <a:ext cx="5103497" cy="4817903"/>
+          </a:xfrm>
+          <a:prstGeom prst="rect">
+            <a:avLst/>
+          </a:prstGeom>
+        </p:spPr>
+      </p:pic>
+      <p:pic>
+        <p:nvPicPr>
+          <p:cNvPr id="5" name="Picture 4">
+            <a:extLst>
+              <a:ext uri="{FF2B5EF4-FFF2-40B4-BE49-F238E27FC236}">
+                <a16:creationId xmlns:a16="http://schemas.microsoft.com/office/drawing/2014/main" id="{75C8BD7A-77A5-1044-8B64-5FC7E0FBCF17}"/>
+              </a:ext>
+            </a:extLst>
+          </p:cNvPr>
+          <p:cNvPicPr>
+            <a:picLocks noChangeAspect="1"/>
+          </p:cNvPicPr>
+          <p:nvPr/>
+        </p:nvPicPr>
+        <p:blipFill rotWithShape="1">
+          <a:blip r:embed="rId3"/>
+          <a:srcRect l="626" r="-1"/>
+          <a:stretch/>
+        </p:blipFill>
+        <p:spPr>
+          <a:xfrm rot="10800000">
+            <a:off x="5668154" y="3038814"/>
+            <a:ext cx="2657036" cy="2394221"/>
+          </a:xfrm>
+          <a:prstGeom prst="rect">
+            <a:avLst/>
+          </a:prstGeom>
+        </p:spPr>
+      </p:pic>
+      <p:pic>
+        <p:nvPicPr>
+          <p:cNvPr id="10" name="Picture 9">
+            <a:extLst>
+              <a:ext uri="{FF2B5EF4-FFF2-40B4-BE49-F238E27FC236}">
+                <a16:creationId xmlns:a16="http://schemas.microsoft.com/office/drawing/2014/main" id="{8D525047-0E1D-124B-BD7F-B86B8E1EF172}"/>
+              </a:ext>
+            </a:extLst>
+          </p:cNvPr>
+          <p:cNvPicPr>
+            <a:picLocks noChangeAspect="1"/>
+          </p:cNvPicPr>
+          <p:nvPr/>
+        </p:nvPicPr>
+        <p:blipFill>
+          <a:blip r:embed="rId4"/>
+          <a:stretch>
+            <a:fillRect/>
+          </a:stretch>
+        </p:blipFill>
+        <p:spPr>
+          <a:xfrm>
+            <a:off x="6228200" y="1175385"/>
+            <a:ext cx="1770534" cy="1351197"/>
+          </a:xfrm>
+          <a:prstGeom prst="rect">
+            <a:avLst/>
+          </a:prstGeom>
+        </p:spPr>
+      </p:pic>
+      <p:pic>
+        <p:nvPicPr>
+          <p:cNvPr id="11" name="Picture 10">
+            <a:extLst>
+              <a:ext uri="{FF2B5EF4-FFF2-40B4-BE49-F238E27FC236}">
+                <a16:creationId xmlns:a16="http://schemas.microsoft.com/office/drawing/2014/main" id="{19922B64-828C-E34E-B4C6-C82C2F95E9FA}"/>
+              </a:ext>
+            </a:extLst>
+          </p:cNvPr>
+          <p:cNvPicPr>
+            <a:picLocks noChangeAspect="1"/>
+          </p:cNvPicPr>
+          <p:nvPr/>
+        </p:nvPicPr>
+        <p:blipFill rotWithShape="1">
+          <a:blip r:embed="rId5"/>
+          <a:srcRect r="3759"/>
+          <a:stretch/>
+        </p:blipFill>
+        <p:spPr>
+          <a:xfrm rot="16200000">
+            <a:off x="9521772" y="4968928"/>
+            <a:ext cx="1514585" cy="1666878"/>
+          </a:xfrm>
+          <a:prstGeom prst="rect">
+            <a:avLst/>
+          </a:prstGeom>
+        </p:spPr>
+      </p:pic>
+      <p:cxnSp>
+        <p:nvCxnSpPr>
+          <p:cNvPr id="14" name="Straight Connector 13">
+            <a:extLst>
+              <a:ext uri="{FF2B5EF4-FFF2-40B4-BE49-F238E27FC236}">
+                <a16:creationId xmlns:a16="http://schemas.microsoft.com/office/drawing/2014/main" id="{5BA9E6C6-0648-6A40-8DDE-86664EBF2B29}"/>
+              </a:ext>
+            </a:extLst>
+          </p:cNvPr>
+          <p:cNvCxnSpPr>
+            <a:cxnSpLocks/>
+            <a:stCxn id="12" idx="2"/>
+            <a:endCxn id="11" idx="3"/>
+          </p:cNvCxnSpPr>
+          <p:nvPr/>
+        </p:nvCxnSpPr>
+        <p:spPr>
+          <a:xfrm>
+            <a:off x="10279065" y="4756828"/>
+            <a:ext cx="0" cy="288247"/>
+          </a:xfrm>
+          <a:prstGeom prst="line">
+            <a:avLst/>
+          </a:prstGeom>
+          <a:ln w="38100">
+            <a:solidFill>
+              <a:srgbClr val="FF0000"/>
+            </a:solidFill>
+          </a:ln>
+        </p:spPr>
+        <p:style>
+          <a:lnRef idx="1">
+            <a:schemeClr val="accent1"/>
+          </a:lnRef>
+          <a:fillRef idx="0">
+            <a:schemeClr val="accent1"/>
+          </a:fillRef>
+          <a:effectRef idx="0">
+            <a:schemeClr val="accent1"/>
+          </a:effectRef>
+          <a:fontRef idx="minor">
+            <a:schemeClr val="tx1"/>
+          </a:fontRef>
+        </p:style>
+      </p:cxnSp>
+      <p:cxnSp>
+        <p:nvCxnSpPr>
+          <p:cNvPr id="15" name="Straight Connector 14">
+            <a:extLst>
+              <a:ext uri="{FF2B5EF4-FFF2-40B4-BE49-F238E27FC236}">
+                <a16:creationId xmlns:a16="http://schemas.microsoft.com/office/drawing/2014/main" id="{F4509F8E-877B-0F43-8C47-0281A0438081}"/>
+              </a:ext>
+            </a:extLst>
+          </p:cNvPr>
+          <p:cNvCxnSpPr>
+            <a:cxnSpLocks/>
+          </p:cNvCxnSpPr>
+          <p:nvPr/>
+        </p:nvCxnSpPr>
+        <p:spPr>
+          <a:xfrm>
+            <a:off x="9688743" y="3861013"/>
+            <a:ext cx="0" cy="1184062"/>
+          </a:xfrm>
+          <a:prstGeom prst="line">
+            <a:avLst/>
+          </a:prstGeom>
+          <a:ln w="38100" cap="sq">
+            <a:solidFill>
+              <a:schemeClr val="tx1"/>
+            </a:solidFill>
+          </a:ln>
+        </p:spPr>
+        <p:style>
+          <a:lnRef idx="1">
+            <a:schemeClr val="accent1"/>
+          </a:lnRef>
+          <a:fillRef idx="0">
+            <a:schemeClr val="accent1"/>
+          </a:fillRef>
+          <a:effectRef idx="0">
+            <a:schemeClr val="accent1"/>
+          </a:effectRef>
+          <a:fontRef idx="minor">
+            <a:schemeClr val="tx1"/>
+          </a:fontRef>
+        </p:style>
+      </p:cxnSp>
+      <p:grpSp>
+        <p:nvGrpSpPr>
+          <p:cNvPr id="28" name="Group 27">
+            <a:extLst>
+              <a:ext uri="{FF2B5EF4-FFF2-40B4-BE49-F238E27FC236}">
+                <a16:creationId xmlns:a16="http://schemas.microsoft.com/office/drawing/2014/main" id="{DAED3579-6EB6-0A4F-823D-85EA6EF4EF95}"/>
+              </a:ext>
+            </a:extLst>
+          </p:cNvPr>
+          <p:cNvGrpSpPr/>
+          <p:nvPr/>
+        </p:nvGrpSpPr>
+        <p:grpSpPr>
+          <a:xfrm>
+            <a:off x="9948865" y="4020228"/>
+            <a:ext cx="660400" cy="736600"/>
+            <a:chOff x="9948865" y="4020228"/>
+            <a:chExt cx="660400" cy="736600"/>
+          </a:xfrm>
+        </p:grpSpPr>
+        <p:pic>
+          <p:nvPicPr>
+            <p:cNvPr id="12" name="Picture 11">
+              <a:extLst>
+                <a:ext uri="{FF2B5EF4-FFF2-40B4-BE49-F238E27FC236}">
+                  <a16:creationId xmlns:a16="http://schemas.microsoft.com/office/drawing/2014/main" id="{375F397F-F92B-B548-9D9F-D52049DECC09}"/>
+                </a:ext>
+              </a:extLst>
+            </p:cNvPr>
+            <p:cNvPicPr>
+              <a:picLocks noChangeAspect="1"/>
+            </p:cNvPicPr>
+            <p:nvPr/>
+          </p:nvPicPr>
+          <p:blipFill>
+            <a:blip r:embed="rId6"/>
+            <a:stretch>
+              <a:fillRect/>
+            </a:stretch>
+          </p:blipFill>
+          <p:spPr>
+            <a:xfrm>
+              <a:off x="9948865" y="4020228"/>
+              <a:ext cx="660400" cy="736600"/>
+            </a:xfrm>
+            <a:prstGeom prst="rect">
+              <a:avLst/>
+            </a:prstGeom>
+          </p:spPr>
+        </p:pic>
+        <p:cxnSp>
+          <p:nvCxnSpPr>
+            <p:cNvPr id="19" name="Straight Connector 18">
+              <a:extLst>
+                <a:ext uri="{FF2B5EF4-FFF2-40B4-BE49-F238E27FC236}">
+                  <a16:creationId xmlns:a16="http://schemas.microsoft.com/office/drawing/2014/main" id="{E20EF850-2854-1745-BFCA-72F6863215A1}"/>
+                </a:ext>
+              </a:extLst>
+            </p:cNvPr>
+            <p:cNvCxnSpPr>
+              <a:cxnSpLocks/>
+              <a:endCxn id="12" idx="2"/>
+            </p:cNvCxnSpPr>
+            <p:nvPr/>
+          </p:nvCxnSpPr>
+          <p:spPr>
+            <a:xfrm>
+              <a:off x="10279064" y="4634590"/>
+              <a:ext cx="1" cy="122238"/>
+            </a:xfrm>
+            <a:prstGeom prst="line">
+              <a:avLst/>
+            </a:prstGeom>
+            <a:ln w="38100">
+              <a:solidFill>
+                <a:srgbClr val="FF0000"/>
+              </a:solidFill>
+            </a:ln>
+          </p:spPr>
+          <p:style>
+            <a:lnRef idx="1">
+              <a:schemeClr val="accent1"/>
+            </a:lnRef>
+            <a:fillRef idx="0">
+              <a:schemeClr val="accent1"/>
+            </a:fillRef>
+            <a:effectRef idx="0">
+              <a:schemeClr val="accent1"/>
+            </a:effectRef>
+            <a:fontRef idx="minor">
+              <a:schemeClr val="tx1"/>
+            </a:fontRef>
+          </p:style>
+        </p:cxnSp>
+        <p:cxnSp>
+          <p:nvCxnSpPr>
+            <p:cNvPr id="22" name="Straight Connector 21">
+              <a:extLst>
+                <a:ext uri="{FF2B5EF4-FFF2-40B4-BE49-F238E27FC236}">
+                  <a16:creationId xmlns:a16="http://schemas.microsoft.com/office/drawing/2014/main" id="{AF4F87DF-F5A1-E14E-9363-8C568FB8D5EE}"/>
+                </a:ext>
+              </a:extLst>
+            </p:cNvPr>
+            <p:cNvCxnSpPr>
+              <a:cxnSpLocks/>
+            </p:cNvCxnSpPr>
+            <p:nvPr/>
+          </p:nvCxnSpPr>
+          <p:spPr>
+            <a:xfrm flipH="1">
+              <a:off x="9948865" y="4634590"/>
+              <a:ext cx="153986" cy="0"/>
+            </a:xfrm>
+            <a:prstGeom prst="line">
+              <a:avLst/>
+            </a:prstGeom>
+            <a:ln w="38100">
+              <a:solidFill>
+                <a:srgbClr val="FF0000"/>
+              </a:solidFill>
+            </a:ln>
+          </p:spPr>
+          <p:style>
+            <a:lnRef idx="1">
+              <a:schemeClr val="accent1"/>
+            </a:lnRef>
+            <a:fillRef idx="0">
+              <a:schemeClr val="accent1"/>
+            </a:fillRef>
+            <a:effectRef idx="0">
+              <a:schemeClr val="accent1"/>
+            </a:effectRef>
+            <a:fontRef idx="minor">
+              <a:schemeClr val="tx1"/>
+            </a:fontRef>
+          </p:style>
+        </p:cxnSp>
+      </p:grpSp>
+      <p:grpSp>
+        <p:nvGrpSpPr>
+          <p:cNvPr id="46" name="Group 45">
+            <a:extLst>
+              <a:ext uri="{FF2B5EF4-FFF2-40B4-BE49-F238E27FC236}">
+                <a16:creationId xmlns:a16="http://schemas.microsoft.com/office/drawing/2014/main" id="{E6C38A29-8DFA-DF4E-A620-A6360F3AEB17}"/>
+              </a:ext>
+            </a:extLst>
+          </p:cNvPr>
+          <p:cNvGrpSpPr/>
+          <p:nvPr/>
+        </p:nvGrpSpPr>
+        <p:grpSpPr>
+          <a:xfrm>
+            <a:off x="8258074" y="3679723"/>
+            <a:ext cx="218602" cy="1179332"/>
+            <a:chOff x="8773741" y="3837665"/>
+            <a:chExt cx="218602" cy="1179332"/>
+          </a:xfrm>
+        </p:grpSpPr>
+        <p:cxnSp>
+          <p:nvCxnSpPr>
+            <p:cNvPr id="31" name="Straight Connector 30">
+              <a:extLst>
+                <a:ext uri="{FF2B5EF4-FFF2-40B4-BE49-F238E27FC236}">
+                  <a16:creationId xmlns:a16="http://schemas.microsoft.com/office/drawing/2014/main" id="{DF1509A6-C1CE-CD48-B36F-041AE83FCFCD}"/>
+                </a:ext>
+              </a:extLst>
+            </p:cNvPr>
+            <p:cNvCxnSpPr>
+              <a:cxnSpLocks/>
+            </p:cNvCxnSpPr>
+            <p:nvPr/>
+          </p:nvCxnSpPr>
+          <p:spPr>
+            <a:xfrm>
+              <a:off x="8778875" y="4020228"/>
+              <a:ext cx="213468" cy="0"/>
+            </a:xfrm>
+            <a:prstGeom prst="line">
+              <a:avLst/>
+            </a:prstGeom>
+            <a:ln w="38100">
+              <a:solidFill>
+                <a:schemeClr val="tx1"/>
+              </a:solidFill>
+            </a:ln>
+          </p:spPr>
+          <p:style>
+            <a:lnRef idx="1">
+              <a:schemeClr val="accent1"/>
+            </a:lnRef>
+            <a:fillRef idx="0">
+              <a:schemeClr val="accent1"/>
+            </a:fillRef>
+            <a:effectRef idx="0">
+              <a:schemeClr val="accent1"/>
+            </a:effectRef>
+            <a:fontRef idx="minor">
+              <a:schemeClr val="tx1"/>
+            </a:fontRef>
+          </p:style>
+        </p:cxnSp>
+        <p:cxnSp>
+          <p:nvCxnSpPr>
+            <p:cNvPr id="34" name="Straight Connector 33">
+              <a:extLst>
+                <a:ext uri="{FF2B5EF4-FFF2-40B4-BE49-F238E27FC236}">
+                  <a16:creationId xmlns:a16="http://schemas.microsoft.com/office/drawing/2014/main" id="{78448BC9-84CD-5E4B-8C8F-95F5DB8CAFFF}"/>
+                </a:ext>
+              </a:extLst>
+            </p:cNvPr>
+            <p:cNvCxnSpPr>
+              <a:cxnSpLocks/>
+            </p:cNvCxnSpPr>
+            <p:nvPr/>
+          </p:nvCxnSpPr>
+          <p:spPr>
+            <a:xfrm flipH="1">
+              <a:off x="8778875" y="3837665"/>
+              <a:ext cx="213468" cy="0"/>
+            </a:xfrm>
+            <a:prstGeom prst="line">
+              <a:avLst/>
+            </a:prstGeom>
+            <a:ln w="38100">
+              <a:solidFill>
+                <a:srgbClr val="FF0000"/>
+              </a:solidFill>
+            </a:ln>
+          </p:spPr>
+          <p:style>
+            <a:lnRef idx="1">
+              <a:schemeClr val="accent1"/>
+            </a:lnRef>
+            <a:fillRef idx="0">
+              <a:schemeClr val="accent1"/>
+            </a:fillRef>
+            <a:effectRef idx="0">
+              <a:schemeClr val="accent1"/>
+            </a:effectRef>
+            <a:fontRef idx="minor">
+              <a:schemeClr val="tx1"/>
+            </a:fontRef>
+          </p:style>
+        </p:cxnSp>
+        <p:cxnSp>
+          <p:nvCxnSpPr>
+            <p:cNvPr id="36" name="Straight Connector 35">
+              <a:extLst>
+                <a:ext uri="{FF2B5EF4-FFF2-40B4-BE49-F238E27FC236}">
+                  <a16:creationId xmlns:a16="http://schemas.microsoft.com/office/drawing/2014/main" id="{3B0193CD-1DE0-7944-B113-3CBAE5354E4D}"/>
+                </a:ext>
+              </a:extLst>
+            </p:cNvPr>
+            <p:cNvCxnSpPr>
+              <a:cxnSpLocks/>
+            </p:cNvCxnSpPr>
+            <p:nvPr/>
+          </p:nvCxnSpPr>
+          <p:spPr>
+            <a:xfrm>
+              <a:off x="8773741" y="4495845"/>
+              <a:ext cx="213468" cy="0"/>
+            </a:xfrm>
+            <a:prstGeom prst="line">
+              <a:avLst/>
+            </a:prstGeom>
+            <a:ln w="38100">
+              <a:solidFill>
+                <a:schemeClr val="tx1"/>
+              </a:solidFill>
+            </a:ln>
+          </p:spPr>
+          <p:style>
+            <a:lnRef idx="1">
+              <a:schemeClr val="accent1"/>
+            </a:lnRef>
+            <a:fillRef idx="0">
+              <a:schemeClr val="accent1"/>
+            </a:fillRef>
+            <a:effectRef idx="0">
+              <a:schemeClr val="accent1"/>
+            </a:effectRef>
+            <a:fontRef idx="minor">
+              <a:schemeClr val="tx1"/>
+            </a:fontRef>
+          </p:style>
+        </p:cxnSp>
+        <p:cxnSp>
+          <p:nvCxnSpPr>
+            <p:cNvPr id="37" name="Straight Connector 36">
+              <a:extLst>
+                <a:ext uri="{FF2B5EF4-FFF2-40B4-BE49-F238E27FC236}">
+                  <a16:creationId xmlns:a16="http://schemas.microsoft.com/office/drawing/2014/main" id="{4470E5F1-8D05-9449-8B3C-EE1EDC88D6FC}"/>
+                </a:ext>
+              </a:extLst>
+            </p:cNvPr>
+            <p:cNvCxnSpPr>
+              <a:cxnSpLocks/>
+            </p:cNvCxnSpPr>
+            <p:nvPr/>
+          </p:nvCxnSpPr>
+          <p:spPr>
+            <a:xfrm flipH="1">
+              <a:off x="8784009" y="4319204"/>
+              <a:ext cx="203200" cy="0"/>
+            </a:xfrm>
+            <a:prstGeom prst="line">
+              <a:avLst/>
+            </a:prstGeom>
+            <a:ln w="38100">
+              <a:solidFill>
+                <a:srgbClr val="FF0000"/>
+              </a:solidFill>
+            </a:ln>
+          </p:spPr>
+          <p:style>
+            <a:lnRef idx="1">
+              <a:schemeClr val="accent1"/>
+            </a:lnRef>
+            <a:fillRef idx="0">
+              <a:schemeClr val="accent1"/>
+            </a:fillRef>
+            <a:effectRef idx="0">
+              <a:schemeClr val="accent1"/>
+            </a:effectRef>
+            <a:fontRef idx="minor">
+              <a:schemeClr val="tx1"/>
+            </a:fontRef>
+          </p:style>
+        </p:cxnSp>
+        <p:cxnSp>
+          <p:nvCxnSpPr>
+            <p:cNvPr id="38" name="Straight Connector 37">
+              <a:extLst>
+                <a:ext uri="{FF2B5EF4-FFF2-40B4-BE49-F238E27FC236}">
+                  <a16:creationId xmlns:a16="http://schemas.microsoft.com/office/drawing/2014/main" id="{CD6D4C82-EC8A-394D-A830-5D584B83FDB5}"/>
+                </a:ext>
+              </a:extLst>
+            </p:cNvPr>
+            <p:cNvCxnSpPr>
+              <a:cxnSpLocks/>
+            </p:cNvCxnSpPr>
+            <p:nvPr/>
+          </p:nvCxnSpPr>
+          <p:spPr>
+            <a:xfrm flipH="1">
+              <a:off x="8773741" y="4837637"/>
+              <a:ext cx="213468" cy="0"/>
+            </a:xfrm>
+            <a:prstGeom prst="line">
+              <a:avLst/>
+            </a:prstGeom>
+            <a:ln w="38100">
+              <a:solidFill>
+                <a:srgbClr val="FF0000"/>
+              </a:solidFill>
+            </a:ln>
+          </p:spPr>
+          <p:style>
+            <a:lnRef idx="1">
+              <a:schemeClr val="accent1"/>
+            </a:lnRef>
+            <a:fillRef idx="0">
+              <a:schemeClr val="accent1"/>
+            </a:fillRef>
+            <a:effectRef idx="0">
+              <a:schemeClr val="accent1"/>
+            </a:effectRef>
+            <a:fontRef idx="minor">
+              <a:schemeClr val="tx1"/>
+            </a:fontRef>
+          </p:style>
+        </p:cxnSp>
+        <p:cxnSp>
+          <p:nvCxnSpPr>
+            <p:cNvPr id="39" name="Straight Connector 38">
+              <a:extLst>
+                <a:ext uri="{FF2B5EF4-FFF2-40B4-BE49-F238E27FC236}">
+                  <a16:creationId xmlns:a16="http://schemas.microsoft.com/office/drawing/2014/main" id="{BAE35401-72E9-684B-BC33-A15B359F74BC}"/>
+                </a:ext>
+              </a:extLst>
+            </p:cNvPr>
+            <p:cNvCxnSpPr>
+              <a:cxnSpLocks/>
+            </p:cNvCxnSpPr>
+            <p:nvPr/>
+          </p:nvCxnSpPr>
+          <p:spPr>
+            <a:xfrm>
+              <a:off x="8773741" y="5016997"/>
+              <a:ext cx="213468" cy="0"/>
+            </a:xfrm>
+            <a:prstGeom prst="line">
+              <a:avLst/>
+            </a:prstGeom>
+            <a:ln w="38100">
+              <a:solidFill>
+                <a:schemeClr val="tx1"/>
+              </a:solidFill>
+            </a:ln>
+          </p:spPr>
+          <p:style>
+            <a:lnRef idx="1">
+              <a:schemeClr val="accent1"/>
+            </a:lnRef>
+            <a:fillRef idx="0">
+              <a:schemeClr val="accent1"/>
+            </a:fillRef>
+            <a:effectRef idx="0">
+              <a:schemeClr val="accent1"/>
+            </a:effectRef>
+            <a:fontRef idx="minor">
+              <a:schemeClr val="tx1"/>
+            </a:fontRef>
+          </p:style>
+        </p:cxnSp>
+      </p:grpSp>
+      <p:cxnSp>
+        <p:nvCxnSpPr>
+          <p:cNvPr id="48" name="Straight Connector 47">
+            <a:extLst>
+              <a:ext uri="{FF2B5EF4-FFF2-40B4-BE49-F238E27FC236}">
+                <a16:creationId xmlns:a16="http://schemas.microsoft.com/office/drawing/2014/main" id="{E4A94111-5DA2-2545-8B94-3360AA2514F9}"/>
+              </a:ext>
+            </a:extLst>
+          </p:cNvPr>
+          <p:cNvCxnSpPr>
+            <a:cxnSpLocks/>
+          </p:cNvCxnSpPr>
+          <p:nvPr/>
+        </p:nvCxnSpPr>
+        <p:spPr>
+          <a:xfrm flipV="1">
+            <a:off x="8471542" y="3861013"/>
+            <a:ext cx="1217201" cy="2549"/>
+          </a:xfrm>
+          <a:prstGeom prst="line">
+            <a:avLst/>
+          </a:prstGeom>
+          <a:ln w="38100">
+            <a:solidFill>
+              <a:schemeClr val="tx1"/>
+            </a:solidFill>
+          </a:ln>
+        </p:spPr>
+        <p:style>
+          <a:lnRef idx="1">
+            <a:schemeClr val="accent1"/>
+          </a:lnRef>
+          <a:fillRef idx="0">
+            <a:schemeClr val="accent1"/>
+          </a:fillRef>
+          <a:effectRef idx="0">
+            <a:schemeClr val="accent1"/>
+          </a:effectRef>
+          <a:fontRef idx="minor">
+            <a:schemeClr val="tx1"/>
+          </a:fontRef>
+        </p:style>
+      </p:cxnSp>
+      <p:cxnSp>
+        <p:nvCxnSpPr>
+          <p:cNvPr id="52" name="Elbow Connector 51">
+            <a:extLst>
+              <a:ext uri="{FF2B5EF4-FFF2-40B4-BE49-F238E27FC236}">
+                <a16:creationId xmlns:a16="http://schemas.microsoft.com/office/drawing/2014/main" id="{7BE68EC5-873B-7648-9646-C2B3F542FAA8}"/>
+              </a:ext>
+            </a:extLst>
+          </p:cNvPr>
+          <p:cNvCxnSpPr>
+            <a:cxnSpLocks/>
+          </p:cNvCxnSpPr>
+          <p:nvPr/>
+        </p:nvCxnSpPr>
+        <p:spPr>
+          <a:xfrm>
+            <a:off x="8461892" y="3679723"/>
+            <a:ext cx="1486972" cy="954465"/>
+          </a:xfrm>
+          <a:prstGeom prst="bentConnector3">
+            <a:avLst>
+              <a:gd name="adj1" fmla="val 93046"/>
+            </a:avLst>
+          </a:prstGeom>
+          <a:ln w="38100">
+            <a:solidFill>
+              <a:srgbClr val="FF0000"/>
+            </a:solidFill>
+          </a:ln>
+        </p:spPr>
+        <p:style>
+          <a:lnRef idx="1">
+            <a:schemeClr val="accent1"/>
+          </a:lnRef>
+          <a:fillRef idx="0">
+            <a:schemeClr val="accent1"/>
+          </a:fillRef>
+          <a:effectRef idx="0">
+            <a:schemeClr val="accent1"/>
+          </a:effectRef>
+          <a:fontRef idx="minor">
+            <a:schemeClr val="tx1"/>
+          </a:fontRef>
+        </p:style>
+      </p:cxnSp>
+      <p:grpSp>
+        <p:nvGrpSpPr>
+          <p:cNvPr id="67" name="Group 66">
+            <a:extLst>
+              <a:ext uri="{FF2B5EF4-FFF2-40B4-BE49-F238E27FC236}">
+                <a16:creationId xmlns:a16="http://schemas.microsoft.com/office/drawing/2014/main" id="{4D145954-B826-BA46-A586-23E3ED9EB2CF}"/>
+              </a:ext>
+            </a:extLst>
+          </p:cNvPr>
+          <p:cNvGrpSpPr/>
+          <p:nvPr/>
+        </p:nvGrpSpPr>
+        <p:grpSpPr>
+          <a:xfrm>
+            <a:off x="8465065" y="4026548"/>
+            <a:ext cx="898525" cy="474237"/>
+            <a:chOff x="9985375" y="1504963"/>
+            <a:chExt cx="898525" cy="502920"/>
+          </a:xfrm>
+        </p:grpSpPr>
+        <p:cxnSp>
+          <p:nvCxnSpPr>
+            <p:cNvPr id="65" name="Straight Connector 64">
+              <a:extLst>
+                <a:ext uri="{FF2B5EF4-FFF2-40B4-BE49-F238E27FC236}">
+                  <a16:creationId xmlns:a16="http://schemas.microsoft.com/office/drawing/2014/main" id="{C97E1447-30BB-914E-ADA4-45CC18BED33D}"/>
+                </a:ext>
+              </a:extLst>
+            </p:cNvPr>
+            <p:cNvCxnSpPr/>
+            <p:nvPr/>
+          </p:nvCxnSpPr>
+          <p:spPr>
+            <a:xfrm>
+              <a:off x="9985375" y="1647825"/>
+              <a:ext cx="177800" cy="0"/>
+            </a:xfrm>
+            <a:prstGeom prst="line">
+              <a:avLst/>
+            </a:prstGeom>
+            <a:ln w="38100">
+              <a:solidFill>
+                <a:srgbClr val="FF0000"/>
+              </a:solidFill>
+            </a:ln>
+          </p:spPr>
+          <p:style>
+            <a:lnRef idx="1">
+              <a:schemeClr val="accent1"/>
+            </a:lnRef>
+            <a:fillRef idx="0">
+              <a:schemeClr val="accent1"/>
+            </a:fillRef>
+            <a:effectRef idx="0">
+              <a:schemeClr val="accent1"/>
+            </a:effectRef>
+            <a:fontRef idx="minor">
+              <a:schemeClr val="tx1"/>
+            </a:fontRef>
+          </p:style>
+        </p:cxnSp>
+        <p:cxnSp>
+          <p:nvCxnSpPr>
+            <p:cNvPr id="66" name="Straight Connector 65">
+              <a:extLst>
+                <a:ext uri="{FF2B5EF4-FFF2-40B4-BE49-F238E27FC236}">
+                  <a16:creationId xmlns:a16="http://schemas.microsoft.com/office/drawing/2014/main" id="{1E93E6A5-FC1C-004E-A41F-378DB8067116}"/>
+                </a:ext>
+              </a:extLst>
+            </p:cNvPr>
+            <p:cNvCxnSpPr/>
+            <p:nvPr/>
+          </p:nvCxnSpPr>
+          <p:spPr>
+            <a:xfrm>
+              <a:off x="9985912" y="1835150"/>
+              <a:ext cx="177800" cy="0"/>
+            </a:xfrm>
+            <a:prstGeom prst="line">
+              <a:avLst/>
+            </a:prstGeom>
+            <a:ln w="38100">
+              <a:solidFill>
+                <a:schemeClr val="tx1"/>
+              </a:solidFill>
+            </a:ln>
+          </p:spPr>
+          <p:style>
+            <a:lnRef idx="1">
+              <a:schemeClr val="accent1"/>
+            </a:lnRef>
+            <a:fillRef idx="0">
+              <a:schemeClr val="accent1"/>
+            </a:fillRef>
+            <a:effectRef idx="0">
+              <a:schemeClr val="accent1"/>
+            </a:effectRef>
+            <a:fontRef idx="minor">
+              <a:schemeClr val="tx1"/>
+            </a:fontRef>
+          </p:style>
+        </p:cxnSp>
+        <p:sp>
+          <p:nvSpPr>
+            <p:cNvPr id="61" name="Rounded Rectangle 60">
+              <a:extLst>
+                <a:ext uri="{FF2B5EF4-FFF2-40B4-BE49-F238E27FC236}">
+                  <a16:creationId xmlns:a16="http://schemas.microsoft.com/office/drawing/2014/main" id="{CBFB3E72-67B9-8C41-8A7C-EA3FA14E0900}"/>
+                </a:ext>
+              </a:extLst>
+            </p:cNvPr>
+            <p:cNvSpPr/>
+            <p:nvPr/>
+          </p:nvSpPr>
+          <p:spPr>
+            <a:xfrm>
+              <a:off x="10107062" y="1504963"/>
+              <a:ext cx="660400" cy="502920"/>
+            </a:xfrm>
+            <a:prstGeom prst="roundRect">
+              <a:avLst/>
+            </a:prstGeom>
+            <a:solidFill>
+              <a:srgbClr val="FFFF00"/>
+            </a:solidFill>
+            <a:ln>
+              <a:solidFill>
+                <a:schemeClr val="tx1"/>
+              </a:solidFill>
+            </a:ln>
+          </p:spPr>
+          <p:style>
+            <a:lnRef idx="2">
+              <a:schemeClr val="accent1">
+                <a:shade val="50000"/>
+              </a:schemeClr>
+            </a:lnRef>
+            <a:fillRef idx="1">
+              <a:schemeClr val="accent1"/>
+            </a:fillRef>
+            <a:effectRef idx="0">
+              <a:schemeClr val="accent1"/>
+            </a:effectRef>
+            <a:fontRef idx="minor">
+              <a:schemeClr val="lt1"/>
+            </a:fontRef>
+          </p:style>
+          <p:txBody>
+            <a:bodyPr rtlCol="0" anchor="ctr"/>
+            <a:lstStyle/>
+            <a:p>
+              <a:pPr algn="ctr"/>
+              <a:endParaRPr lang="en-US"/>
+            </a:p>
+          </p:txBody>
+        </p:sp>
+        <p:sp>
+          <p:nvSpPr>
+            <p:cNvPr id="62" name="Rectangle 61">
+              <a:extLst>
+                <a:ext uri="{FF2B5EF4-FFF2-40B4-BE49-F238E27FC236}">
+                  <a16:creationId xmlns:a16="http://schemas.microsoft.com/office/drawing/2014/main" id="{30D70692-39C5-5C45-AE97-70ACE2E40864}"/>
+                </a:ext>
+              </a:extLst>
+            </p:cNvPr>
+            <p:cNvSpPr/>
+            <p:nvPr/>
+          </p:nvSpPr>
+          <p:spPr>
+            <a:xfrm>
+              <a:off x="10763251" y="1684655"/>
+              <a:ext cx="120649" cy="120650"/>
+            </a:xfrm>
+            <a:prstGeom prst="rect">
+              <a:avLst/>
+            </a:prstGeom>
+            <a:solidFill>
+              <a:schemeClr val="tx1"/>
+            </a:solidFill>
+            <a:ln>
+              <a:noFill/>
+            </a:ln>
+          </p:spPr>
+          <p:style>
+            <a:lnRef idx="2">
+              <a:schemeClr val="accent1">
+                <a:shade val="50000"/>
+              </a:schemeClr>
+            </a:lnRef>
+            <a:fillRef idx="1">
+              <a:schemeClr val="accent1"/>
+            </a:fillRef>
+            <a:effectRef idx="0">
+              <a:schemeClr val="accent1"/>
+            </a:effectRef>
+            <a:fontRef idx="minor">
+              <a:schemeClr val="lt1"/>
+            </a:fontRef>
+          </p:style>
+          <p:txBody>
+            <a:bodyPr rtlCol="0" anchor="ctr"/>
+            <a:lstStyle/>
+            <a:p>
+              <a:pPr algn="ctr"/>
+              <a:endParaRPr lang="en-US"/>
+            </a:p>
+          </p:txBody>
+        </p:sp>
+        <p:sp>
+          <p:nvSpPr>
+            <p:cNvPr id="63" name="TextBox 62">
+              <a:extLst>
+                <a:ext uri="{FF2B5EF4-FFF2-40B4-BE49-F238E27FC236}">
+                  <a16:creationId xmlns:a16="http://schemas.microsoft.com/office/drawing/2014/main" id="{E76C1CFD-A6B8-BB43-9A6F-7290BF629F95}"/>
+                </a:ext>
+              </a:extLst>
+            </p:cNvPr>
+            <p:cNvSpPr txBox="1"/>
+            <p:nvPr/>
+          </p:nvSpPr>
+          <p:spPr>
+            <a:xfrm>
+              <a:off x="10074812" y="1561098"/>
+              <a:ext cx="716478" cy="338554"/>
+            </a:xfrm>
+            <a:prstGeom prst="rect">
+              <a:avLst/>
+            </a:prstGeom>
+            <a:noFill/>
+          </p:spPr>
+          <p:txBody>
+            <a:bodyPr wrap="none" rtlCol="0">
+              <a:spAutoFit/>
+            </a:bodyPr>
+            <a:lstStyle/>
+            <a:p>
+              <a:r>
+                <a:rPr lang="en-US" sz="1600" dirty="0"/>
+                <a:t>Motor</a:t>
+              </a:r>
+            </a:p>
+          </p:txBody>
+        </p:sp>
+      </p:grpSp>
+      <p:grpSp>
+        <p:nvGrpSpPr>
+          <p:cNvPr id="68" name="Group 67">
+            <a:extLst>
+              <a:ext uri="{FF2B5EF4-FFF2-40B4-BE49-F238E27FC236}">
+                <a16:creationId xmlns:a16="http://schemas.microsoft.com/office/drawing/2014/main" id="{581149A7-24C2-F04F-B47F-D0551EC0C181}"/>
+              </a:ext>
+            </a:extLst>
+          </p:cNvPr>
+          <p:cNvGrpSpPr/>
+          <p:nvPr/>
+        </p:nvGrpSpPr>
+        <p:grpSpPr>
+          <a:xfrm>
+            <a:off x="8465065" y="4542908"/>
+            <a:ext cx="898525" cy="481535"/>
+            <a:chOff x="9985375" y="1504963"/>
+            <a:chExt cx="898525" cy="502920"/>
+          </a:xfrm>
+        </p:grpSpPr>
+        <p:cxnSp>
+          <p:nvCxnSpPr>
+            <p:cNvPr id="69" name="Straight Connector 68">
+              <a:extLst>
+                <a:ext uri="{FF2B5EF4-FFF2-40B4-BE49-F238E27FC236}">
+                  <a16:creationId xmlns:a16="http://schemas.microsoft.com/office/drawing/2014/main" id="{4664BCE4-E3E2-9A4B-93EB-6DF6337EC3D4}"/>
+                </a:ext>
+              </a:extLst>
+            </p:cNvPr>
+            <p:cNvCxnSpPr/>
+            <p:nvPr/>
+          </p:nvCxnSpPr>
+          <p:spPr>
+            <a:xfrm>
+              <a:off x="9985375" y="1647825"/>
+              <a:ext cx="177800" cy="0"/>
+            </a:xfrm>
+            <a:prstGeom prst="line">
+              <a:avLst/>
+            </a:prstGeom>
+            <a:ln w="38100">
+              <a:solidFill>
+                <a:srgbClr val="FF0000"/>
+              </a:solidFill>
+            </a:ln>
+          </p:spPr>
+          <p:style>
+            <a:lnRef idx="1">
+              <a:schemeClr val="accent1"/>
+            </a:lnRef>
+            <a:fillRef idx="0">
+              <a:schemeClr val="accent1"/>
+            </a:fillRef>
+            <a:effectRef idx="0">
+              <a:schemeClr val="accent1"/>
+            </a:effectRef>
+            <a:fontRef idx="minor">
+              <a:schemeClr val="tx1"/>
+            </a:fontRef>
+          </p:style>
+        </p:cxnSp>
+        <p:cxnSp>
+          <p:nvCxnSpPr>
+            <p:cNvPr id="70" name="Straight Connector 69">
+              <a:extLst>
+                <a:ext uri="{FF2B5EF4-FFF2-40B4-BE49-F238E27FC236}">
+                  <a16:creationId xmlns:a16="http://schemas.microsoft.com/office/drawing/2014/main" id="{486E57D6-54A1-A543-8D1B-1FA69879BB0B}"/>
+                </a:ext>
+              </a:extLst>
+            </p:cNvPr>
+            <p:cNvCxnSpPr/>
+            <p:nvPr/>
+          </p:nvCxnSpPr>
+          <p:spPr>
+            <a:xfrm>
+              <a:off x="9985912" y="1835150"/>
+              <a:ext cx="177800" cy="0"/>
+            </a:xfrm>
+            <a:prstGeom prst="line">
+              <a:avLst/>
+            </a:prstGeom>
+            <a:ln w="38100">
+              <a:solidFill>
+                <a:schemeClr val="tx1"/>
+              </a:solidFill>
+            </a:ln>
+          </p:spPr>
+          <p:style>
+            <a:lnRef idx="1">
+              <a:schemeClr val="accent1"/>
+            </a:lnRef>
+            <a:fillRef idx="0">
+              <a:schemeClr val="accent1"/>
+            </a:fillRef>
+            <a:effectRef idx="0">
+              <a:schemeClr val="accent1"/>
+            </a:effectRef>
+            <a:fontRef idx="minor">
+              <a:schemeClr val="tx1"/>
+            </a:fontRef>
+          </p:style>
+        </p:cxnSp>
+        <p:sp>
+          <p:nvSpPr>
+            <p:cNvPr id="71" name="Rounded Rectangle 70">
+              <a:extLst>
+                <a:ext uri="{FF2B5EF4-FFF2-40B4-BE49-F238E27FC236}">
+                  <a16:creationId xmlns:a16="http://schemas.microsoft.com/office/drawing/2014/main" id="{86942D37-937D-FA46-9731-69D98EE252F7}"/>
+                </a:ext>
+              </a:extLst>
+            </p:cNvPr>
+            <p:cNvSpPr/>
+            <p:nvPr/>
+          </p:nvSpPr>
+          <p:spPr>
+            <a:xfrm>
+              <a:off x="10107062" y="1504963"/>
+              <a:ext cx="660400" cy="502920"/>
+            </a:xfrm>
+            <a:prstGeom prst="roundRect">
+              <a:avLst/>
+            </a:prstGeom>
+            <a:solidFill>
+              <a:srgbClr val="FFFF00"/>
+            </a:solidFill>
+            <a:ln>
+              <a:solidFill>
+                <a:schemeClr val="tx1"/>
+              </a:solidFill>
+            </a:ln>
+          </p:spPr>
+          <p:style>
+            <a:lnRef idx="2">
+              <a:schemeClr val="accent1">
+                <a:shade val="50000"/>
+              </a:schemeClr>
+            </a:lnRef>
+            <a:fillRef idx="1">
+              <a:schemeClr val="accent1"/>
+            </a:fillRef>
+            <a:effectRef idx="0">
+              <a:schemeClr val="accent1"/>
+            </a:effectRef>
+            <a:fontRef idx="minor">
+              <a:schemeClr val="lt1"/>
+            </a:fontRef>
+          </p:style>
+          <p:txBody>
+            <a:bodyPr rtlCol="0" anchor="ctr"/>
+            <a:lstStyle/>
+            <a:p>
+              <a:pPr algn="ctr"/>
+              <a:endParaRPr lang="en-US"/>
+            </a:p>
+          </p:txBody>
+        </p:sp>
+        <p:sp>
+          <p:nvSpPr>
+            <p:cNvPr id="72" name="Rectangle 71">
+              <a:extLst>
+                <a:ext uri="{FF2B5EF4-FFF2-40B4-BE49-F238E27FC236}">
+                  <a16:creationId xmlns:a16="http://schemas.microsoft.com/office/drawing/2014/main" id="{32573D0B-CDF6-DE4C-9C9A-E5BFA65446DF}"/>
+                </a:ext>
+              </a:extLst>
+            </p:cNvPr>
+            <p:cNvSpPr/>
+            <p:nvPr/>
+          </p:nvSpPr>
+          <p:spPr>
+            <a:xfrm>
+              <a:off x="10763251" y="1684655"/>
+              <a:ext cx="120649" cy="120650"/>
+            </a:xfrm>
+            <a:prstGeom prst="rect">
+              <a:avLst/>
+            </a:prstGeom>
+            <a:solidFill>
+              <a:schemeClr val="tx1"/>
+            </a:solidFill>
+            <a:ln>
+              <a:noFill/>
+            </a:ln>
+          </p:spPr>
+          <p:style>
+            <a:lnRef idx="2">
+              <a:schemeClr val="accent1">
+                <a:shade val="50000"/>
+              </a:schemeClr>
+            </a:lnRef>
+            <a:fillRef idx="1">
+              <a:schemeClr val="accent1"/>
+            </a:fillRef>
+            <a:effectRef idx="0">
+              <a:schemeClr val="accent1"/>
+            </a:effectRef>
+            <a:fontRef idx="minor">
+              <a:schemeClr val="lt1"/>
+            </a:fontRef>
+          </p:style>
+          <p:txBody>
+            <a:bodyPr rtlCol="0" anchor="ctr"/>
+            <a:lstStyle/>
+            <a:p>
+              <a:pPr algn="ctr"/>
+              <a:endParaRPr lang="en-US"/>
+            </a:p>
+          </p:txBody>
+        </p:sp>
+        <p:sp>
+          <p:nvSpPr>
+            <p:cNvPr id="73" name="TextBox 72">
+              <a:extLst>
+                <a:ext uri="{FF2B5EF4-FFF2-40B4-BE49-F238E27FC236}">
+                  <a16:creationId xmlns:a16="http://schemas.microsoft.com/office/drawing/2014/main" id="{B8282442-F385-194E-86E6-F63D2E509238}"/>
+                </a:ext>
+              </a:extLst>
+            </p:cNvPr>
+            <p:cNvSpPr txBox="1"/>
+            <p:nvPr/>
+          </p:nvSpPr>
+          <p:spPr>
+            <a:xfrm>
+              <a:off x="10074812" y="1561098"/>
+              <a:ext cx="716478" cy="338554"/>
+            </a:xfrm>
+            <a:prstGeom prst="rect">
+              <a:avLst/>
+            </a:prstGeom>
+            <a:noFill/>
+          </p:spPr>
+          <p:txBody>
+            <a:bodyPr wrap="none" rtlCol="0">
+              <a:spAutoFit/>
+            </a:bodyPr>
+            <a:lstStyle/>
+            <a:p>
+              <a:r>
+                <a:rPr lang="en-US" sz="1600" dirty="0"/>
+                <a:t>Motor</a:t>
+              </a:r>
+            </a:p>
+          </p:txBody>
+        </p:sp>
+      </p:grpSp>
+      <p:cxnSp>
+        <p:nvCxnSpPr>
+          <p:cNvPr id="80" name="Straight Connector 79">
+            <a:extLst>
+              <a:ext uri="{FF2B5EF4-FFF2-40B4-BE49-F238E27FC236}">
+                <a16:creationId xmlns:a16="http://schemas.microsoft.com/office/drawing/2014/main" id="{72364A57-710A-8244-A810-16D855E3CC40}"/>
+              </a:ext>
+            </a:extLst>
+          </p:cNvPr>
+          <p:cNvCxnSpPr>
+            <a:cxnSpLocks/>
+          </p:cNvCxnSpPr>
+          <p:nvPr/>
+        </p:nvCxnSpPr>
+        <p:spPr>
+          <a:xfrm>
+            <a:off x="5421826" y="4859055"/>
+            <a:ext cx="246327" cy="0"/>
+          </a:xfrm>
+          <a:prstGeom prst="line">
+            <a:avLst/>
+          </a:prstGeom>
+          <a:ln w="38100">
+            <a:solidFill>
+              <a:srgbClr val="FF0000"/>
+            </a:solidFill>
+          </a:ln>
+        </p:spPr>
+        <p:style>
+          <a:lnRef idx="1">
+            <a:schemeClr val="accent1"/>
+          </a:lnRef>
+          <a:fillRef idx="0">
+            <a:schemeClr val="accent1"/>
+          </a:fillRef>
+          <a:effectRef idx="0">
+            <a:schemeClr val="accent1"/>
+          </a:effectRef>
+          <a:fontRef idx="minor">
+            <a:schemeClr val="tx1"/>
+          </a:fontRef>
+        </p:style>
+      </p:cxnSp>
+      <p:sp>
+        <p:nvSpPr>
+          <p:cNvPr id="82" name="Rectangle 81">
+            <a:extLst>
+              <a:ext uri="{FF2B5EF4-FFF2-40B4-BE49-F238E27FC236}">
+                <a16:creationId xmlns:a16="http://schemas.microsoft.com/office/drawing/2014/main" id="{3A5C2864-B391-4649-94C9-09D81CACBE39}"/>
+              </a:ext>
+            </a:extLst>
+          </p:cNvPr>
+          <p:cNvSpPr/>
+          <p:nvPr/>
+        </p:nvSpPr>
+        <p:spPr>
+          <a:xfrm>
+            <a:off x="3545378" y="5137267"/>
+            <a:ext cx="203662" cy="133003"/>
+          </a:xfrm>
+          <a:prstGeom prst="rect">
+            <a:avLst/>
+          </a:prstGeom>
+          <a:solidFill>
+            <a:schemeClr val="tx1"/>
+          </a:solidFill>
+          <a:ln>
+            <a:noFill/>
+          </a:ln>
+        </p:spPr>
+        <p:style>
+          <a:lnRef idx="2">
+            <a:schemeClr val="accent1">
+              <a:shade val="50000"/>
+            </a:schemeClr>
+          </a:lnRef>
+          <a:fillRef idx="1">
+            <a:schemeClr val="accent1"/>
+          </a:fillRef>
+          <a:effectRef idx="0">
+            <a:schemeClr val="accent1"/>
+          </a:effectRef>
+          <a:fontRef idx="minor">
+            <a:schemeClr val="lt1"/>
+          </a:fontRef>
+        </p:style>
+        <p:txBody>
+          <a:bodyPr rtlCol="0" anchor="ctr"/>
+          <a:lstStyle/>
+          <a:p>
+            <a:pPr algn="ctr"/>
+            <a:endParaRPr lang="en-US"/>
+          </a:p>
+        </p:txBody>
+      </p:sp>
+      <p:sp>
+        <p:nvSpPr>
+          <p:cNvPr id="83" name="Rectangle 82">
+            <a:extLst>
+              <a:ext uri="{FF2B5EF4-FFF2-40B4-BE49-F238E27FC236}">
+                <a16:creationId xmlns:a16="http://schemas.microsoft.com/office/drawing/2014/main" id="{FB5BCCDA-3ECD-EE4A-8425-24F8C1D6B0F6}"/>
+              </a:ext>
+            </a:extLst>
+          </p:cNvPr>
+          <p:cNvSpPr/>
+          <p:nvPr/>
+        </p:nvSpPr>
+        <p:spPr>
+          <a:xfrm>
+            <a:off x="3545378" y="4041958"/>
+            <a:ext cx="203662" cy="133003"/>
+          </a:xfrm>
+          <a:prstGeom prst="rect">
+            <a:avLst/>
+          </a:prstGeom>
+          <a:solidFill>
+            <a:schemeClr val="tx1"/>
+          </a:solidFill>
+          <a:ln>
+            <a:noFill/>
+          </a:ln>
+        </p:spPr>
+        <p:style>
+          <a:lnRef idx="2">
+            <a:schemeClr val="accent1">
+              <a:shade val="50000"/>
+            </a:schemeClr>
+          </a:lnRef>
+          <a:fillRef idx="1">
+            <a:schemeClr val="accent1"/>
+          </a:fillRef>
+          <a:effectRef idx="0">
+            <a:schemeClr val="accent1"/>
+          </a:effectRef>
+          <a:fontRef idx="minor">
+            <a:schemeClr val="lt1"/>
+          </a:fontRef>
+        </p:style>
+        <p:txBody>
+          <a:bodyPr rtlCol="0" anchor="ctr"/>
+          <a:lstStyle/>
+          <a:p>
+            <a:pPr algn="ctr"/>
+            <a:endParaRPr lang="en-US"/>
+          </a:p>
+        </p:txBody>
+      </p:sp>
+      <p:sp>
+        <p:nvSpPr>
+          <p:cNvPr id="84" name="Rectangle 83">
+            <a:extLst>
+              <a:ext uri="{FF2B5EF4-FFF2-40B4-BE49-F238E27FC236}">
+                <a16:creationId xmlns:a16="http://schemas.microsoft.com/office/drawing/2014/main" id="{771C96E3-D26F-A745-BC34-8FD7B847B6A2}"/>
+              </a:ext>
+            </a:extLst>
+          </p:cNvPr>
+          <p:cNvSpPr/>
+          <p:nvPr/>
+        </p:nvSpPr>
+        <p:spPr>
+          <a:xfrm>
+            <a:off x="3545378" y="2940520"/>
+            <a:ext cx="203662" cy="133003"/>
+          </a:xfrm>
+          <a:prstGeom prst="rect">
+            <a:avLst/>
+          </a:prstGeom>
+          <a:solidFill>
+            <a:schemeClr val="tx1"/>
+          </a:solidFill>
+          <a:ln>
+            <a:noFill/>
+          </a:ln>
+        </p:spPr>
+        <p:style>
+          <a:lnRef idx="2">
+            <a:schemeClr val="accent1">
+              <a:shade val="50000"/>
+            </a:schemeClr>
+          </a:lnRef>
+          <a:fillRef idx="1">
+            <a:schemeClr val="accent1"/>
+          </a:fillRef>
+          <a:effectRef idx="0">
+            <a:schemeClr val="accent1"/>
+          </a:effectRef>
+          <a:fontRef idx="minor">
+            <a:schemeClr val="lt1"/>
+          </a:fontRef>
+        </p:style>
+        <p:txBody>
+          <a:bodyPr rtlCol="0" anchor="ctr"/>
+          <a:lstStyle/>
+          <a:p>
+            <a:pPr algn="ctr"/>
+            <a:endParaRPr lang="en-US"/>
+          </a:p>
+        </p:txBody>
+      </p:sp>
+      <p:sp>
+        <p:nvSpPr>
+          <p:cNvPr id="85" name="Rectangle 84">
+            <a:extLst>
+              <a:ext uri="{FF2B5EF4-FFF2-40B4-BE49-F238E27FC236}">
+                <a16:creationId xmlns:a16="http://schemas.microsoft.com/office/drawing/2014/main" id="{2B23637D-0F1C-E646-A924-B9EF60C8537A}"/>
+              </a:ext>
+            </a:extLst>
+          </p:cNvPr>
+          <p:cNvSpPr/>
+          <p:nvPr/>
+        </p:nvSpPr>
+        <p:spPr>
+          <a:xfrm>
+            <a:off x="1950660" y="5137267"/>
+            <a:ext cx="203662" cy="133003"/>
+          </a:xfrm>
+          <a:prstGeom prst="rect">
+            <a:avLst/>
+          </a:prstGeom>
+          <a:solidFill>
+            <a:schemeClr val="tx1"/>
+          </a:solidFill>
+          <a:ln>
+            <a:noFill/>
+          </a:ln>
+        </p:spPr>
+        <p:style>
+          <a:lnRef idx="2">
+            <a:schemeClr val="accent1">
+              <a:shade val="50000"/>
+            </a:schemeClr>
+          </a:lnRef>
+          <a:fillRef idx="1">
+            <a:schemeClr val="accent1"/>
+          </a:fillRef>
+          <a:effectRef idx="0">
+            <a:schemeClr val="accent1"/>
+          </a:effectRef>
+          <a:fontRef idx="minor">
+            <a:schemeClr val="lt1"/>
+          </a:fontRef>
+        </p:style>
+        <p:txBody>
+          <a:bodyPr rtlCol="0" anchor="ctr"/>
+          <a:lstStyle/>
+          <a:p>
+            <a:pPr algn="ctr"/>
+            <a:endParaRPr lang="en-US"/>
+          </a:p>
+        </p:txBody>
+      </p:sp>
+      <p:sp>
+        <p:nvSpPr>
+          <p:cNvPr id="86" name="Rectangle 85">
+            <a:extLst>
+              <a:ext uri="{FF2B5EF4-FFF2-40B4-BE49-F238E27FC236}">
+                <a16:creationId xmlns:a16="http://schemas.microsoft.com/office/drawing/2014/main" id="{725CC071-032F-C742-9EC6-DD51079A688F}"/>
+              </a:ext>
+            </a:extLst>
+          </p:cNvPr>
+          <p:cNvSpPr/>
+          <p:nvPr/>
+        </p:nvSpPr>
+        <p:spPr>
+          <a:xfrm>
+            <a:off x="1950660" y="4041958"/>
+            <a:ext cx="203662" cy="133003"/>
+          </a:xfrm>
+          <a:prstGeom prst="rect">
+            <a:avLst/>
+          </a:prstGeom>
+          <a:solidFill>
+            <a:schemeClr val="tx1"/>
+          </a:solidFill>
+          <a:ln>
+            <a:noFill/>
+          </a:ln>
+        </p:spPr>
+        <p:style>
+          <a:lnRef idx="2">
+            <a:schemeClr val="accent1">
+              <a:shade val="50000"/>
+            </a:schemeClr>
+          </a:lnRef>
+          <a:fillRef idx="1">
+            <a:schemeClr val="accent1"/>
+          </a:fillRef>
+          <a:effectRef idx="0">
+            <a:schemeClr val="accent1"/>
+          </a:effectRef>
+          <a:fontRef idx="minor">
+            <a:schemeClr val="lt1"/>
+          </a:fontRef>
+        </p:style>
+        <p:txBody>
+          <a:bodyPr rtlCol="0" anchor="ctr"/>
+          <a:lstStyle/>
+          <a:p>
+            <a:pPr algn="ctr"/>
+            <a:endParaRPr lang="en-US"/>
+          </a:p>
+        </p:txBody>
+      </p:sp>
+      <p:sp>
+        <p:nvSpPr>
+          <p:cNvPr id="87" name="Rectangle 86">
+            <a:extLst>
+              <a:ext uri="{FF2B5EF4-FFF2-40B4-BE49-F238E27FC236}">
+                <a16:creationId xmlns:a16="http://schemas.microsoft.com/office/drawing/2014/main" id="{115CF580-D89A-B648-BB58-125F070656E6}"/>
+              </a:ext>
+            </a:extLst>
+          </p:cNvPr>
+          <p:cNvSpPr/>
+          <p:nvPr/>
+        </p:nvSpPr>
+        <p:spPr>
+          <a:xfrm>
+            <a:off x="1950660" y="2940520"/>
+            <a:ext cx="203662" cy="133003"/>
+          </a:xfrm>
+          <a:prstGeom prst="rect">
+            <a:avLst/>
+          </a:prstGeom>
+          <a:solidFill>
+            <a:schemeClr val="tx1"/>
+          </a:solidFill>
+          <a:ln>
+            <a:noFill/>
+          </a:ln>
+        </p:spPr>
+        <p:style>
+          <a:lnRef idx="2">
+            <a:schemeClr val="accent1">
+              <a:shade val="50000"/>
+            </a:schemeClr>
+          </a:lnRef>
+          <a:fillRef idx="1">
+            <a:schemeClr val="accent1"/>
+          </a:fillRef>
+          <a:effectRef idx="0">
+            <a:schemeClr val="accent1"/>
+          </a:effectRef>
+          <a:fontRef idx="minor">
+            <a:schemeClr val="lt1"/>
+          </a:fontRef>
+        </p:style>
+        <p:txBody>
+          <a:bodyPr rtlCol="0" anchor="ctr"/>
+          <a:lstStyle/>
+          <a:p>
+            <a:pPr algn="ctr"/>
+            <a:endParaRPr lang="en-US"/>
+          </a:p>
+        </p:txBody>
+      </p:sp>
+      <p:sp>
+        <p:nvSpPr>
+          <p:cNvPr id="88" name="Rectangle 87">
+            <a:extLst>
+              <a:ext uri="{FF2B5EF4-FFF2-40B4-BE49-F238E27FC236}">
+                <a16:creationId xmlns:a16="http://schemas.microsoft.com/office/drawing/2014/main" id="{86A12DA0-6B62-D045-A4D3-05BDE771467A}"/>
+              </a:ext>
+            </a:extLst>
+          </p:cNvPr>
+          <p:cNvSpPr/>
+          <p:nvPr/>
+        </p:nvSpPr>
+        <p:spPr>
+          <a:xfrm>
+            <a:off x="3545378" y="1849629"/>
+            <a:ext cx="203662" cy="133003"/>
+          </a:xfrm>
+          <a:prstGeom prst="rect">
+            <a:avLst/>
+          </a:prstGeom>
+          <a:solidFill>
+            <a:schemeClr val="tx1"/>
+          </a:solidFill>
+          <a:ln>
+            <a:noFill/>
+          </a:ln>
+        </p:spPr>
+        <p:style>
+          <a:lnRef idx="2">
+            <a:schemeClr val="accent1">
+              <a:shade val="50000"/>
+            </a:schemeClr>
+          </a:lnRef>
+          <a:fillRef idx="1">
+            <a:schemeClr val="accent1"/>
+          </a:fillRef>
+          <a:effectRef idx="0">
+            <a:schemeClr val="accent1"/>
+          </a:effectRef>
+          <a:fontRef idx="minor">
+            <a:schemeClr val="lt1"/>
+          </a:fontRef>
+        </p:style>
+        <p:txBody>
+          <a:bodyPr rtlCol="0" anchor="ctr"/>
+          <a:lstStyle/>
+          <a:p>
+            <a:pPr algn="ctr"/>
+            <a:endParaRPr lang="en-US"/>
+          </a:p>
+        </p:txBody>
+      </p:sp>
+      <p:sp>
+        <p:nvSpPr>
+          <p:cNvPr id="89" name="Rectangle 88">
+            <a:extLst>
+              <a:ext uri="{FF2B5EF4-FFF2-40B4-BE49-F238E27FC236}">
+                <a16:creationId xmlns:a16="http://schemas.microsoft.com/office/drawing/2014/main" id="{D3D34FC8-D941-064E-AA3E-880A4BBFA42E}"/>
+              </a:ext>
+            </a:extLst>
+          </p:cNvPr>
+          <p:cNvSpPr/>
+          <p:nvPr/>
+        </p:nvSpPr>
+        <p:spPr>
+          <a:xfrm>
+            <a:off x="1950660" y="1849629"/>
+            <a:ext cx="203662" cy="133003"/>
+          </a:xfrm>
+          <a:prstGeom prst="rect">
+            <a:avLst/>
+          </a:prstGeom>
+          <a:solidFill>
+            <a:schemeClr val="tx1"/>
+          </a:solidFill>
+          <a:ln>
+            <a:noFill/>
+          </a:ln>
+        </p:spPr>
+        <p:style>
+          <a:lnRef idx="2">
+            <a:schemeClr val="accent1">
+              <a:shade val="50000"/>
+            </a:schemeClr>
+          </a:lnRef>
+          <a:fillRef idx="1">
+            <a:schemeClr val="accent1"/>
+          </a:fillRef>
+          <a:effectRef idx="0">
+            <a:schemeClr val="accent1"/>
+          </a:effectRef>
+          <a:fontRef idx="minor">
+            <a:schemeClr val="lt1"/>
+          </a:fontRef>
+        </p:style>
+        <p:txBody>
+          <a:bodyPr rtlCol="0" anchor="ctr"/>
+          <a:lstStyle/>
+          <a:p>
+            <a:pPr algn="ctr"/>
+            <a:endParaRPr lang="en-US"/>
+          </a:p>
+        </p:txBody>
+      </p:sp>
+      <p:sp>
+        <p:nvSpPr>
+          <p:cNvPr id="92" name="Rectangle 91">
+            <a:extLst>
+              <a:ext uri="{FF2B5EF4-FFF2-40B4-BE49-F238E27FC236}">
+                <a16:creationId xmlns:a16="http://schemas.microsoft.com/office/drawing/2014/main" id="{CD1FE7CF-0904-164F-9E45-3AD27CBB83DD}"/>
+              </a:ext>
+            </a:extLst>
+          </p:cNvPr>
+          <p:cNvSpPr/>
+          <p:nvPr/>
+        </p:nvSpPr>
+        <p:spPr>
+          <a:xfrm>
+            <a:off x="3545378" y="1454727"/>
+            <a:ext cx="203662" cy="133003"/>
+          </a:xfrm>
+          <a:prstGeom prst="rect">
+            <a:avLst/>
+          </a:prstGeom>
+          <a:solidFill>
+            <a:schemeClr val="tx1"/>
+          </a:solidFill>
+          <a:ln>
+            <a:noFill/>
+          </a:ln>
+        </p:spPr>
+        <p:style>
+          <a:lnRef idx="2">
+            <a:schemeClr val="accent1">
+              <a:shade val="50000"/>
+            </a:schemeClr>
+          </a:lnRef>
+          <a:fillRef idx="1">
+            <a:schemeClr val="accent1"/>
+          </a:fillRef>
+          <a:effectRef idx="0">
+            <a:schemeClr val="accent1"/>
+          </a:effectRef>
+          <a:fontRef idx="minor">
+            <a:schemeClr val="lt1"/>
+          </a:fontRef>
+        </p:style>
+        <p:txBody>
+          <a:bodyPr rtlCol="0" anchor="ctr"/>
+          <a:lstStyle/>
+          <a:p>
+            <a:pPr algn="ctr"/>
+            <a:endParaRPr lang="en-US"/>
+          </a:p>
+        </p:txBody>
+      </p:sp>
+      <p:sp>
+        <p:nvSpPr>
+          <p:cNvPr id="93" name="Rectangle 92">
+            <a:extLst>
+              <a:ext uri="{FF2B5EF4-FFF2-40B4-BE49-F238E27FC236}">
+                <a16:creationId xmlns:a16="http://schemas.microsoft.com/office/drawing/2014/main" id="{521D2FCC-EAA5-1943-9BE2-79F4CD16529C}"/>
+              </a:ext>
+            </a:extLst>
+          </p:cNvPr>
+          <p:cNvSpPr/>
+          <p:nvPr/>
+        </p:nvSpPr>
+        <p:spPr>
+          <a:xfrm>
+            <a:off x="3474719" y="1450570"/>
+            <a:ext cx="270164" cy="133003"/>
+          </a:xfrm>
+          <a:prstGeom prst="rect">
+            <a:avLst/>
+          </a:prstGeom>
+          <a:solidFill>
+            <a:srgbClr val="FF0000"/>
+          </a:solidFill>
+          <a:ln>
+            <a:noFill/>
+          </a:ln>
+        </p:spPr>
+        <p:style>
+          <a:lnRef idx="2">
+            <a:schemeClr val="accent1">
+              <a:shade val="50000"/>
+            </a:schemeClr>
+          </a:lnRef>
+          <a:fillRef idx="1">
+            <a:schemeClr val="accent1"/>
+          </a:fillRef>
+          <a:effectRef idx="0">
+            <a:schemeClr val="accent1"/>
+          </a:effectRef>
+          <a:fontRef idx="minor">
+            <a:schemeClr val="lt1"/>
+          </a:fontRef>
+        </p:style>
+        <p:txBody>
+          <a:bodyPr wrap="none" rtlCol="0" anchor="ctr"/>
+          <a:lstStyle/>
+          <a:p>
+            <a:pPr algn="ctr"/>
+            <a:r>
+              <a:rPr lang="en-US" sz="800" dirty="0"/>
+              <a:t>VBUS</a:t>
+            </a:r>
+          </a:p>
+        </p:txBody>
+      </p:sp>
+      <p:sp>
+        <p:nvSpPr>
+          <p:cNvPr id="94" name="Rectangle 93">
+            <a:extLst>
+              <a:ext uri="{FF2B5EF4-FFF2-40B4-BE49-F238E27FC236}">
+                <a16:creationId xmlns:a16="http://schemas.microsoft.com/office/drawing/2014/main" id="{29BDDFA1-BE7A-DD48-9596-7036AF886B9A}"/>
+              </a:ext>
+            </a:extLst>
+          </p:cNvPr>
+          <p:cNvSpPr/>
+          <p:nvPr/>
+        </p:nvSpPr>
+        <p:spPr>
+          <a:xfrm>
+            <a:off x="3474719" y="1637864"/>
+            <a:ext cx="270164" cy="133003"/>
+          </a:xfrm>
+          <a:prstGeom prst="rect">
+            <a:avLst/>
+          </a:prstGeom>
+          <a:solidFill>
+            <a:srgbClr val="FF0000"/>
+          </a:solidFill>
+          <a:ln>
+            <a:noFill/>
+          </a:ln>
+        </p:spPr>
+        <p:style>
+          <a:lnRef idx="2">
+            <a:schemeClr val="accent1">
+              <a:shade val="50000"/>
+            </a:schemeClr>
+          </a:lnRef>
+          <a:fillRef idx="1">
+            <a:schemeClr val="accent1"/>
+          </a:fillRef>
+          <a:effectRef idx="0">
+            <a:schemeClr val="accent1"/>
+          </a:effectRef>
+          <a:fontRef idx="minor">
+            <a:schemeClr val="lt1"/>
+          </a:fontRef>
+        </p:style>
+        <p:txBody>
+          <a:bodyPr wrap="none" rtlCol="0" anchor="ctr"/>
+          <a:lstStyle/>
+          <a:p>
+            <a:pPr algn="ctr"/>
+            <a:r>
+              <a:rPr lang="en-US" sz="800" dirty="0"/>
+              <a:t>VSYS</a:t>
+            </a:r>
+          </a:p>
+        </p:txBody>
+      </p:sp>
+      <p:sp>
+        <p:nvSpPr>
+          <p:cNvPr id="95" name="Rectangle 94">
+            <a:extLst>
+              <a:ext uri="{FF2B5EF4-FFF2-40B4-BE49-F238E27FC236}">
+                <a16:creationId xmlns:a16="http://schemas.microsoft.com/office/drawing/2014/main" id="{869F47F1-E2DC-214A-ADCE-F577FCBD881B}"/>
+              </a:ext>
+            </a:extLst>
+          </p:cNvPr>
+          <p:cNvSpPr/>
+          <p:nvPr/>
+        </p:nvSpPr>
+        <p:spPr>
+          <a:xfrm>
+            <a:off x="3408218" y="2296540"/>
+            <a:ext cx="365759" cy="133003"/>
+          </a:xfrm>
+          <a:prstGeom prst="rect">
+            <a:avLst/>
+          </a:prstGeom>
+          <a:solidFill>
+            <a:srgbClr val="FF0000"/>
+          </a:solidFill>
+          <a:ln>
+            <a:noFill/>
+          </a:ln>
+        </p:spPr>
+        <p:style>
+          <a:lnRef idx="2">
+            <a:schemeClr val="accent1">
+              <a:shade val="50000"/>
+            </a:schemeClr>
+          </a:lnRef>
+          <a:fillRef idx="1">
+            <a:schemeClr val="accent1"/>
+          </a:fillRef>
+          <a:effectRef idx="0">
+            <a:schemeClr val="accent1"/>
+          </a:effectRef>
+          <a:fontRef idx="minor">
+            <a:schemeClr val="lt1"/>
+          </a:fontRef>
+        </p:style>
+        <p:txBody>
+          <a:bodyPr wrap="none" rtlCol="0" anchor="ctr"/>
+          <a:lstStyle/>
+          <a:p>
+            <a:pPr algn="ctr"/>
+            <a:r>
+              <a:rPr lang="en-US" sz="800" dirty="0"/>
+              <a:t>3.3 OUT</a:t>
+            </a:r>
+          </a:p>
+        </p:txBody>
+      </p:sp>
+      <p:cxnSp>
+        <p:nvCxnSpPr>
+          <p:cNvPr id="97" name="Straight Connector 96">
+            <a:extLst>
+              <a:ext uri="{FF2B5EF4-FFF2-40B4-BE49-F238E27FC236}">
+                <a16:creationId xmlns:a16="http://schemas.microsoft.com/office/drawing/2014/main" id="{FC55E8EC-3031-5943-B794-E589107AC0EC}"/>
+              </a:ext>
+            </a:extLst>
+          </p:cNvPr>
+          <p:cNvCxnSpPr>
+            <a:cxnSpLocks/>
+          </p:cNvCxnSpPr>
+          <p:nvPr/>
+        </p:nvCxnSpPr>
+        <p:spPr>
+          <a:xfrm flipV="1">
+            <a:off x="3885216" y="1325880"/>
+            <a:ext cx="2342984" cy="1034870"/>
+          </a:xfrm>
+          <a:prstGeom prst="line">
+            <a:avLst/>
+          </a:prstGeom>
+          <a:ln w="38100">
+            <a:solidFill>
+              <a:srgbClr val="FF0000"/>
+            </a:solidFill>
+          </a:ln>
+        </p:spPr>
+        <p:style>
+          <a:lnRef idx="1">
+            <a:schemeClr val="accent1"/>
+          </a:lnRef>
+          <a:fillRef idx="0">
+            <a:schemeClr val="accent1"/>
+          </a:fillRef>
+          <a:effectRef idx="0">
+            <a:schemeClr val="accent1"/>
+          </a:effectRef>
+          <a:fontRef idx="minor">
+            <a:schemeClr val="tx1"/>
+          </a:fontRef>
+        </p:style>
+      </p:cxnSp>
+      <p:cxnSp>
+        <p:nvCxnSpPr>
+          <p:cNvPr id="98" name="Straight Connector 97">
+            <a:extLst>
+              <a:ext uri="{FF2B5EF4-FFF2-40B4-BE49-F238E27FC236}">
+                <a16:creationId xmlns:a16="http://schemas.microsoft.com/office/drawing/2014/main" id="{A9D527FC-374E-FF4B-AEC9-18F51A7FDBB0}"/>
+              </a:ext>
+            </a:extLst>
+          </p:cNvPr>
+          <p:cNvCxnSpPr>
+            <a:cxnSpLocks/>
+          </p:cNvCxnSpPr>
+          <p:nvPr/>
+        </p:nvCxnSpPr>
+        <p:spPr>
+          <a:xfrm flipV="1">
+            <a:off x="4921135" y="1637864"/>
+            <a:ext cx="1332002" cy="614885"/>
+          </a:xfrm>
+          <a:prstGeom prst="line">
+            <a:avLst/>
+          </a:prstGeom>
+          <a:ln w="63500">
+            <a:solidFill>
+              <a:schemeClr val="tx1"/>
+            </a:solidFill>
+          </a:ln>
+        </p:spPr>
+        <p:style>
+          <a:lnRef idx="1">
+            <a:schemeClr val="accent1"/>
+          </a:lnRef>
+          <a:fillRef idx="0">
+            <a:schemeClr val="accent1"/>
+          </a:fillRef>
+          <a:effectRef idx="0">
+            <a:schemeClr val="accent1"/>
+          </a:effectRef>
+          <a:fontRef idx="minor">
+            <a:schemeClr val="tx1"/>
+          </a:fontRef>
+        </p:style>
+      </p:cxnSp>
+      <p:cxnSp>
+        <p:nvCxnSpPr>
+          <p:cNvPr id="101" name="Straight Connector 100">
+            <a:extLst>
+              <a:ext uri="{FF2B5EF4-FFF2-40B4-BE49-F238E27FC236}">
+                <a16:creationId xmlns:a16="http://schemas.microsoft.com/office/drawing/2014/main" id="{BB597C3E-FAC3-8B4A-AF33-16E3D1925F29}"/>
+              </a:ext>
+            </a:extLst>
+          </p:cNvPr>
+          <p:cNvCxnSpPr>
+            <a:cxnSpLocks/>
+          </p:cNvCxnSpPr>
+          <p:nvPr/>
+        </p:nvCxnSpPr>
+        <p:spPr>
+          <a:xfrm flipV="1">
+            <a:off x="3862877" y="2011578"/>
+            <a:ext cx="2501499" cy="3421457"/>
+          </a:xfrm>
+          <a:prstGeom prst="line">
+            <a:avLst/>
+          </a:prstGeom>
+          <a:ln w="57150">
+            <a:solidFill>
+              <a:srgbClr val="00B050"/>
+            </a:solidFill>
+          </a:ln>
+        </p:spPr>
+        <p:style>
+          <a:lnRef idx="1">
+            <a:schemeClr val="accent1"/>
+          </a:lnRef>
+          <a:fillRef idx="0">
+            <a:schemeClr val="accent1"/>
+          </a:fillRef>
+          <a:effectRef idx="0">
+            <a:schemeClr val="accent1"/>
+          </a:effectRef>
+          <a:fontRef idx="minor">
+            <a:schemeClr val="tx1"/>
+          </a:fontRef>
+        </p:style>
+      </p:cxnSp>
+      <p:sp>
+        <p:nvSpPr>
+          <p:cNvPr id="103" name="Rectangle 102">
+            <a:extLst>
+              <a:ext uri="{FF2B5EF4-FFF2-40B4-BE49-F238E27FC236}">
+                <a16:creationId xmlns:a16="http://schemas.microsoft.com/office/drawing/2014/main" id="{DBAD07BE-F208-C14C-927E-41037C460492}"/>
+              </a:ext>
+            </a:extLst>
+          </p:cNvPr>
+          <p:cNvSpPr/>
+          <p:nvPr/>
+        </p:nvSpPr>
+        <p:spPr>
+          <a:xfrm>
+            <a:off x="3343795" y="5366534"/>
+            <a:ext cx="403166" cy="133003"/>
+          </a:xfrm>
+          <a:prstGeom prst="rect">
+            <a:avLst/>
+          </a:prstGeom>
+          <a:solidFill>
+            <a:schemeClr val="accent1"/>
+          </a:solidFill>
+          <a:ln>
+            <a:noFill/>
+          </a:ln>
+        </p:spPr>
+        <p:style>
+          <a:lnRef idx="2">
+            <a:schemeClr val="accent1">
+              <a:shade val="50000"/>
+            </a:schemeClr>
+          </a:lnRef>
+          <a:fillRef idx="1">
+            <a:schemeClr val="accent1"/>
+          </a:fillRef>
+          <a:effectRef idx="0">
+            <a:schemeClr val="accent1"/>
+          </a:effectRef>
+          <a:fontRef idx="minor">
+            <a:schemeClr val="lt1"/>
+          </a:fontRef>
+        </p:style>
+        <p:txBody>
+          <a:bodyPr wrap="none" rtlCol="0" anchor="ctr"/>
+          <a:lstStyle/>
+          <a:p>
+            <a:pPr algn="ctr"/>
+            <a:r>
+              <a:rPr lang="en-US" sz="800" dirty="0">
+                <a:solidFill>
+                  <a:schemeClr val="bg1"/>
+                </a:solidFill>
+              </a:rPr>
+              <a:t>I2C0 SCL</a:t>
+            </a:r>
+          </a:p>
+        </p:txBody>
+      </p:sp>
+      <p:sp>
+        <p:nvSpPr>
+          <p:cNvPr id="104" name="Rectangle 103">
+            <a:extLst>
+              <a:ext uri="{FF2B5EF4-FFF2-40B4-BE49-F238E27FC236}">
+                <a16:creationId xmlns:a16="http://schemas.microsoft.com/office/drawing/2014/main" id="{EF46731A-3543-2942-BD9C-382BC292F480}"/>
+              </a:ext>
+            </a:extLst>
+          </p:cNvPr>
+          <p:cNvSpPr/>
+          <p:nvPr/>
+        </p:nvSpPr>
+        <p:spPr>
+          <a:xfrm>
+            <a:off x="3352107" y="5566252"/>
+            <a:ext cx="403166" cy="133003"/>
+          </a:xfrm>
+          <a:prstGeom prst="rect">
+            <a:avLst/>
+          </a:prstGeom>
+          <a:solidFill>
+            <a:schemeClr val="accent1"/>
+          </a:solidFill>
+          <a:ln>
+            <a:noFill/>
+          </a:ln>
+        </p:spPr>
+        <p:style>
+          <a:lnRef idx="2">
+            <a:schemeClr val="accent1">
+              <a:shade val="50000"/>
+            </a:schemeClr>
+          </a:lnRef>
+          <a:fillRef idx="1">
+            <a:schemeClr val="accent1"/>
+          </a:fillRef>
+          <a:effectRef idx="0">
+            <a:schemeClr val="accent1"/>
+          </a:effectRef>
+          <a:fontRef idx="minor">
+            <a:schemeClr val="lt1"/>
+          </a:fontRef>
+        </p:style>
+        <p:txBody>
+          <a:bodyPr wrap="none" rtlCol="0" anchor="ctr"/>
+          <a:lstStyle/>
+          <a:p>
+            <a:pPr algn="ctr"/>
+            <a:r>
+              <a:rPr lang="en-US" sz="800" dirty="0">
+                <a:solidFill>
+                  <a:schemeClr val="bg1"/>
+                </a:solidFill>
+              </a:rPr>
+              <a:t>I2C0 SDA</a:t>
+            </a:r>
+          </a:p>
+        </p:txBody>
+      </p:sp>
+      <p:cxnSp>
+        <p:nvCxnSpPr>
+          <p:cNvPr id="108" name="Straight Connector 107">
+            <a:extLst>
+              <a:ext uri="{FF2B5EF4-FFF2-40B4-BE49-F238E27FC236}">
+                <a16:creationId xmlns:a16="http://schemas.microsoft.com/office/drawing/2014/main" id="{A579D09F-C505-F44C-B5A9-A4CBAF416790}"/>
+              </a:ext>
+            </a:extLst>
+          </p:cNvPr>
+          <p:cNvCxnSpPr>
+            <a:cxnSpLocks/>
+          </p:cNvCxnSpPr>
+          <p:nvPr/>
+        </p:nvCxnSpPr>
+        <p:spPr>
+          <a:xfrm flipV="1">
+            <a:off x="3886836" y="2351997"/>
+            <a:ext cx="2517577" cy="3280756"/>
+          </a:xfrm>
+          <a:prstGeom prst="line">
+            <a:avLst/>
+          </a:prstGeom>
+          <a:ln w="57150">
+            <a:solidFill>
+              <a:srgbClr val="FFFF00"/>
+            </a:solidFill>
+          </a:ln>
+        </p:spPr>
+        <p:style>
+          <a:lnRef idx="1">
+            <a:schemeClr val="accent1"/>
+          </a:lnRef>
+          <a:fillRef idx="0">
+            <a:schemeClr val="accent1"/>
+          </a:fillRef>
+          <a:effectRef idx="0">
+            <a:schemeClr val="accent1"/>
+          </a:effectRef>
+          <a:fontRef idx="minor">
+            <a:schemeClr val="tx1"/>
+          </a:fontRef>
+        </p:style>
+      </p:cxnSp>
+      <p:cxnSp>
+        <p:nvCxnSpPr>
+          <p:cNvPr id="112" name="Straight Connector 111">
+            <a:extLst>
+              <a:ext uri="{FF2B5EF4-FFF2-40B4-BE49-F238E27FC236}">
+                <a16:creationId xmlns:a16="http://schemas.microsoft.com/office/drawing/2014/main" id="{23E3BFC3-FE51-D349-9514-2342FD9C6822}"/>
+              </a:ext>
+            </a:extLst>
+          </p:cNvPr>
+          <p:cNvCxnSpPr>
+            <a:cxnSpLocks/>
+          </p:cNvCxnSpPr>
+          <p:nvPr/>
+        </p:nvCxnSpPr>
+        <p:spPr>
+          <a:xfrm flipV="1">
+            <a:off x="5421827" y="4859055"/>
+            <a:ext cx="1732" cy="1493550"/>
+          </a:xfrm>
+          <a:prstGeom prst="line">
+            <a:avLst/>
+          </a:prstGeom>
+          <a:ln w="38100" cap="sq">
+            <a:solidFill>
+              <a:srgbClr val="FF0000"/>
+            </a:solidFill>
+          </a:ln>
+        </p:spPr>
+        <p:style>
+          <a:lnRef idx="1">
+            <a:schemeClr val="accent1"/>
+          </a:lnRef>
+          <a:fillRef idx="0">
+            <a:schemeClr val="accent1"/>
+          </a:fillRef>
+          <a:effectRef idx="0">
+            <a:schemeClr val="accent1"/>
+          </a:effectRef>
+          <a:fontRef idx="minor">
+            <a:schemeClr val="tx1"/>
+          </a:fontRef>
+        </p:style>
+      </p:cxnSp>
+      <p:cxnSp>
+        <p:nvCxnSpPr>
+          <p:cNvPr id="118" name="Straight Connector 117">
+            <a:extLst>
+              <a:ext uri="{FF2B5EF4-FFF2-40B4-BE49-F238E27FC236}">
+                <a16:creationId xmlns:a16="http://schemas.microsoft.com/office/drawing/2014/main" id="{197BFDB6-5B1D-334B-93DE-89D3B607149C}"/>
+              </a:ext>
+            </a:extLst>
+          </p:cNvPr>
+          <p:cNvCxnSpPr>
+            <a:cxnSpLocks/>
+          </p:cNvCxnSpPr>
+          <p:nvPr/>
+        </p:nvCxnSpPr>
+        <p:spPr>
+          <a:xfrm flipH="1">
+            <a:off x="775612" y="6352605"/>
+            <a:ext cx="4646215" cy="0"/>
+          </a:xfrm>
+          <a:prstGeom prst="line">
+            <a:avLst/>
+          </a:prstGeom>
+          <a:ln w="38100" cap="sq">
+            <a:solidFill>
+              <a:srgbClr val="FF0000"/>
+            </a:solidFill>
+          </a:ln>
+        </p:spPr>
+        <p:style>
+          <a:lnRef idx="1">
+            <a:schemeClr val="accent1"/>
+          </a:lnRef>
+          <a:fillRef idx="0">
+            <a:schemeClr val="accent1"/>
+          </a:fillRef>
+          <a:effectRef idx="0">
+            <a:schemeClr val="accent1"/>
+          </a:effectRef>
+          <a:fontRef idx="minor">
+            <a:schemeClr val="tx1"/>
+          </a:fontRef>
+        </p:style>
+      </p:cxnSp>
+      <p:cxnSp>
+        <p:nvCxnSpPr>
+          <p:cNvPr id="122" name="Straight Connector 121">
+            <a:extLst>
+              <a:ext uri="{FF2B5EF4-FFF2-40B4-BE49-F238E27FC236}">
+                <a16:creationId xmlns:a16="http://schemas.microsoft.com/office/drawing/2014/main" id="{8D6F0A19-08BE-D344-A4C9-8565DF58682A}"/>
+              </a:ext>
+            </a:extLst>
+          </p:cNvPr>
+          <p:cNvCxnSpPr>
+            <a:cxnSpLocks/>
+          </p:cNvCxnSpPr>
+          <p:nvPr/>
+        </p:nvCxnSpPr>
+        <p:spPr>
+          <a:xfrm flipV="1">
+            <a:off x="775612" y="5746085"/>
+            <a:ext cx="0" cy="606520"/>
+          </a:xfrm>
+          <a:prstGeom prst="line">
+            <a:avLst/>
+          </a:prstGeom>
+          <a:ln w="38100" cap="sq">
+            <a:solidFill>
+              <a:srgbClr val="FF0000"/>
+            </a:solidFill>
+          </a:ln>
+        </p:spPr>
+        <p:style>
+          <a:lnRef idx="1">
+            <a:schemeClr val="accent1"/>
+          </a:lnRef>
+          <a:fillRef idx="0">
+            <a:schemeClr val="accent1"/>
+          </a:fillRef>
+          <a:effectRef idx="0">
+            <a:schemeClr val="accent1"/>
+          </a:effectRef>
+          <a:fontRef idx="minor">
+            <a:schemeClr val="tx1"/>
+          </a:fontRef>
+        </p:style>
+      </p:cxnSp>
+      <p:cxnSp>
+        <p:nvCxnSpPr>
+          <p:cNvPr id="125" name="Straight Connector 124">
+            <a:extLst>
+              <a:ext uri="{FF2B5EF4-FFF2-40B4-BE49-F238E27FC236}">
+                <a16:creationId xmlns:a16="http://schemas.microsoft.com/office/drawing/2014/main" id="{44F90F0E-4297-8442-9448-CD6E2D96CCF9}"/>
+              </a:ext>
+            </a:extLst>
+          </p:cNvPr>
+          <p:cNvCxnSpPr>
+            <a:cxnSpLocks/>
+          </p:cNvCxnSpPr>
+          <p:nvPr/>
+        </p:nvCxnSpPr>
+        <p:spPr>
+          <a:xfrm flipV="1">
+            <a:off x="4921135" y="4687151"/>
+            <a:ext cx="763023" cy="205325"/>
+          </a:xfrm>
+          <a:prstGeom prst="line">
+            <a:avLst/>
+          </a:prstGeom>
+          <a:ln w="63500">
+            <a:solidFill>
+              <a:schemeClr val="tx1"/>
+            </a:solidFill>
+          </a:ln>
+        </p:spPr>
+        <p:style>
+          <a:lnRef idx="1">
+            <a:schemeClr val="accent1"/>
+          </a:lnRef>
+          <a:fillRef idx="0">
+            <a:schemeClr val="accent1"/>
+          </a:fillRef>
+          <a:effectRef idx="0">
+            <a:schemeClr val="accent1"/>
+          </a:effectRef>
+          <a:fontRef idx="minor">
+            <a:schemeClr val="tx1"/>
+          </a:fontRef>
+        </p:style>
+      </p:cxnSp>
+      <p:cxnSp>
+        <p:nvCxnSpPr>
+          <p:cNvPr id="131" name="Straight Connector 130">
+            <a:extLst>
+              <a:ext uri="{FF2B5EF4-FFF2-40B4-BE49-F238E27FC236}">
+                <a16:creationId xmlns:a16="http://schemas.microsoft.com/office/drawing/2014/main" id="{200DAC38-0E3D-3242-9111-09739D24CA36}"/>
+              </a:ext>
+            </a:extLst>
+          </p:cNvPr>
+          <p:cNvCxnSpPr>
+            <a:cxnSpLocks/>
+          </p:cNvCxnSpPr>
+          <p:nvPr/>
+        </p:nvCxnSpPr>
+        <p:spPr>
+          <a:xfrm flipV="1">
+            <a:off x="3838477" y="3992375"/>
+            <a:ext cx="1947256" cy="325938"/>
+          </a:xfrm>
+          <a:prstGeom prst="line">
+            <a:avLst/>
+          </a:prstGeom>
+          <a:ln w="57150">
+            <a:solidFill>
+              <a:srgbClr val="7030A0"/>
+            </a:solidFill>
+          </a:ln>
+        </p:spPr>
+        <p:style>
+          <a:lnRef idx="1">
+            <a:schemeClr val="accent1"/>
+          </a:lnRef>
+          <a:fillRef idx="0">
+            <a:schemeClr val="accent1"/>
+          </a:fillRef>
+          <a:effectRef idx="0">
+            <a:schemeClr val="accent1"/>
+          </a:effectRef>
+          <a:fontRef idx="minor">
+            <a:schemeClr val="tx1"/>
+          </a:fontRef>
+        </p:style>
+      </p:cxnSp>
+      <p:cxnSp>
+        <p:nvCxnSpPr>
+          <p:cNvPr id="134" name="Straight Connector 133">
+            <a:extLst>
+              <a:ext uri="{FF2B5EF4-FFF2-40B4-BE49-F238E27FC236}">
+                <a16:creationId xmlns:a16="http://schemas.microsoft.com/office/drawing/2014/main" id="{5859C4BD-7F77-4F47-AA4E-3F70E833B6B3}"/>
+              </a:ext>
+            </a:extLst>
+          </p:cNvPr>
+          <p:cNvCxnSpPr>
+            <a:cxnSpLocks/>
+          </p:cNvCxnSpPr>
+          <p:nvPr/>
+        </p:nvCxnSpPr>
+        <p:spPr>
+          <a:xfrm flipV="1">
+            <a:off x="3839049" y="4153550"/>
+            <a:ext cx="1933084" cy="389358"/>
+          </a:xfrm>
+          <a:prstGeom prst="line">
+            <a:avLst/>
+          </a:prstGeom>
+          <a:ln w="57150">
+            <a:solidFill>
+              <a:schemeClr val="accent3"/>
+            </a:solidFill>
+          </a:ln>
+        </p:spPr>
+        <p:style>
+          <a:lnRef idx="1">
+            <a:schemeClr val="accent1"/>
+          </a:lnRef>
+          <a:fillRef idx="0">
+            <a:schemeClr val="accent1"/>
+          </a:fillRef>
+          <a:effectRef idx="0">
+            <a:schemeClr val="accent1"/>
+          </a:effectRef>
+          <a:fontRef idx="minor">
+            <a:schemeClr val="tx1"/>
+          </a:fontRef>
+        </p:style>
+      </p:cxnSp>
+      <p:cxnSp>
+        <p:nvCxnSpPr>
+          <p:cNvPr id="142" name="Straight Connector 141">
+            <a:extLst>
+              <a:ext uri="{FF2B5EF4-FFF2-40B4-BE49-F238E27FC236}">
+                <a16:creationId xmlns:a16="http://schemas.microsoft.com/office/drawing/2014/main" id="{CCBCFB8E-1646-824F-B65F-E39F1BA1AEF9}"/>
+              </a:ext>
+            </a:extLst>
+          </p:cNvPr>
+          <p:cNvCxnSpPr>
+            <a:cxnSpLocks/>
+          </p:cNvCxnSpPr>
+          <p:nvPr/>
+        </p:nvCxnSpPr>
+        <p:spPr>
+          <a:xfrm flipV="1">
+            <a:off x="3862876" y="4337903"/>
+            <a:ext cx="1884701" cy="434817"/>
+          </a:xfrm>
+          <a:prstGeom prst="line">
+            <a:avLst/>
+          </a:prstGeom>
+          <a:ln w="57150">
+            <a:solidFill>
+              <a:srgbClr val="AB7942"/>
+            </a:solidFill>
+          </a:ln>
+        </p:spPr>
+        <p:style>
+          <a:lnRef idx="1">
+            <a:schemeClr val="accent1"/>
+          </a:lnRef>
+          <a:fillRef idx="0">
+            <a:schemeClr val="accent1"/>
+          </a:fillRef>
+          <a:effectRef idx="0">
+            <a:schemeClr val="accent1"/>
+          </a:effectRef>
+          <a:fontRef idx="minor">
+            <a:schemeClr val="tx1"/>
+          </a:fontRef>
+        </p:style>
+      </p:cxnSp>
+      <p:cxnSp>
+        <p:nvCxnSpPr>
+          <p:cNvPr id="145" name="Straight Connector 144">
+            <a:extLst>
+              <a:ext uri="{FF2B5EF4-FFF2-40B4-BE49-F238E27FC236}">
+                <a16:creationId xmlns:a16="http://schemas.microsoft.com/office/drawing/2014/main" id="{7DB3B8DD-1CCF-CE43-B7BA-340D744806FA}"/>
+              </a:ext>
+            </a:extLst>
+          </p:cNvPr>
+          <p:cNvCxnSpPr>
+            <a:cxnSpLocks/>
+          </p:cNvCxnSpPr>
+          <p:nvPr/>
+        </p:nvCxnSpPr>
+        <p:spPr>
+          <a:xfrm flipV="1">
+            <a:off x="3873418" y="4542908"/>
+            <a:ext cx="1884701" cy="434817"/>
+          </a:xfrm>
+          <a:prstGeom prst="line">
+            <a:avLst/>
+          </a:prstGeom>
+          <a:ln w="57150">
+            <a:solidFill>
+              <a:srgbClr val="0432FF"/>
+            </a:solidFill>
+          </a:ln>
+        </p:spPr>
+        <p:style>
+          <a:lnRef idx="1">
+            <a:schemeClr val="accent1"/>
+          </a:lnRef>
+          <a:fillRef idx="0">
+            <a:schemeClr val="accent1"/>
+          </a:fillRef>
+          <a:effectRef idx="0">
+            <a:schemeClr val="accent1"/>
+          </a:effectRef>
+          <a:fontRef idx="minor">
+            <a:schemeClr val="tx1"/>
+          </a:fontRef>
+        </p:style>
+      </p:cxnSp>
+      <p:sp>
+        <p:nvSpPr>
+          <p:cNvPr id="146" name="TextBox 145">
+            <a:extLst>
+              <a:ext uri="{FF2B5EF4-FFF2-40B4-BE49-F238E27FC236}">
+                <a16:creationId xmlns:a16="http://schemas.microsoft.com/office/drawing/2014/main" id="{54DC7D75-2F76-2F47-97E8-43BD84B5345F}"/>
+              </a:ext>
+            </a:extLst>
+          </p:cNvPr>
+          <p:cNvSpPr txBox="1"/>
+          <p:nvPr/>
+        </p:nvSpPr>
+        <p:spPr>
+          <a:xfrm>
+            <a:off x="9990313" y="3373896"/>
+            <a:ext cx="800284" cy="646331"/>
+          </a:xfrm>
+          <a:prstGeom prst="rect">
+            <a:avLst/>
+          </a:prstGeom>
+          <a:noFill/>
+        </p:spPr>
+        <p:txBody>
+          <a:bodyPr wrap="none" rtlCol="0">
+            <a:spAutoFit/>
+          </a:bodyPr>
+          <a:lstStyle/>
+          <a:p>
+            <a:r>
+              <a:rPr lang="en-US" dirty="0"/>
+              <a:t>Power</a:t>
+            </a:r>
+          </a:p>
+          <a:p>
+            <a:r>
+              <a:rPr lang="en-US" dirty="0"/>
+              <a:t>Switch</a:t>
+            </a:r>
+          </a:p>
+        </p:txBody>
+      </p:sp>
+      <p:cxnSp>
+        <p:nvCxnSpPr>
+          <p:cNvPr id="147" name="Straight Connector 146">
+            <a:extLst>
+              <a:ext uri="{FF2B5EF4-FFF2-40B4-BE49-F238E27FC236}">
+                <a16:creationId xmlns:a16="http://schemas.microsoft.com/office/drawing/2014/main" id="{D07F656B-F766-C24C-AF03-FD4DE6921BE5}"/>
+              </a:ext>
+            </a:extLst>
+          </p:cNvPr>
+          <p:cNvCxnSpPr>
+            <a:cxnSpLocks/>
+          </p:cNvCxnSpPr>
+          <p:nvPr/>
+        </p:nvCxnSpPr>
+        <p:spPr>
+          <a:xfrm flipH="1">
+            <a:off x="821664" y="829219"/>
+            <a:ext cx="3265594" cy="0"/>
+          </a:xfrm>
+          <a:prstGeom prst="line">
+            <a:avLst/>
+          </a:prstGeom>
+          <a:ln w="38100">
+            <a:solidFill>
+              <a:srgbClr val="FF0000"/>
+            </a:solidFill>
+          </a:ln>
+        </p:spPr>
+        <p:style>
+          <a:lnRef idx="1">
+            <a:schemeClr val="accent1"/>
+          </a:lnRef>
+          <a:fillRef idx="0">
+            <a:schemeClr val="accent1"/>
+          </a:fillRef>
+          <a:effectRef idx="0">
+            <a:schemeClr val="accent1"/>
+          </a:effectRef>
+          <a:fontRef idx="minor">
+            <a:schemeClr val="tx1"/>
+          </a:fontRef>
+        </p:style>
+      </p:cxnSp>
+      <p:cxnSp>
+        <p:nvCxnSpPr>
+          <p:cNvPr id="149" name="Straight Connector 148">
+            <a:extLst>
+              <a:ext uri="{FF2B5EF4-FFF2-40B4-BE49-F238E27FC236}">
+                <a16:creationId xmlns:a16="http://schemas.microsoft.com/office/drawing/2014/main" id="{2019F1AB-3590-0D42-B84E-2A77C56C8C30}"/>
+              </a:ext>
+            </a:extLst>
+          </p:cNvPr>
+          <p:cNvCxnSpPr>
+            <a:cxnSpLocks/>
+          </p:cNvCxnSpPr>
+          <p:nvPr/>
+        </p:nvCxnSpPr>
+        <p:spPr>
+          <a:xfrm>
+            <a:off x="4087258" y="829219"/>
+            <a:ext cx="0" cy="912177"/>
+          </a:xfrm>
+          <a:prstGeom prst="line">
+            <a:avLst/>
+          </a:prstGeom>
+          <a:ln w="38100" cap="sq">
+            <a:solidFill>
+              <a:srgbClr val="FF0000"/>
+            </a:solidFill>
+          </a:ln>
+        </p:spPr>
+        <p:style>
+          <a:lnRef idx="1">
+            <a:schemeClr val="accent1"/>
+          </a:lnRef>
+          <a:fillRef idx="0">
+            <a:schemeClr val="accent1"/>
+          </a:fillRef>
+          <a:effectRef idx="0">
+            <a:schemeClr val="accent1"/>
+          </a:effectRef>
+          <a:fontRef idx="minor">
+            <a:schemeClr val="tx1"/>
+          </a:fontRef>
+        </p:style>
+      </p:cxnSp>
+      <p:cxnSp>
+        <p:nvCxnSpPr>
+          <p:cNvPr id="154" name="Straight Connector 153">
+            <a:extLst>
+              <a:ext uri="{FF2B5EF4-FFF2-40B4-BE49-F238E27FC236}">
+                <a16:creationId xmlns:a16="http://schemas.microsoft.com/office/drawing/2014/main" id="{51B2928D-379F-9E44-8B56-9AF9F7927235}"/>
+              </a:ext>
+            </a:extLst>
+          </p:cNvPr>
+          <p:cNvCxnSpPr>
+            <a:cxnSpLocks/>
+          </p:cNvCxnSpPr>
+          <p:nvPr/>
+        </p:nvCxnSpPr>
+        <p:spPr>
+          <a:xfrm>
+            <a:off x="821664" y="829219"/>
+            <a:ext cx="0" cy="754354"/>
+          </a:xfrm>
+          <a:prstGeom prst="line">
+            <a:avLst/>
+          </a:prstGeom>
+          <a:ln w="38100" cap="sq">
+            <a:solidFill>
+              <a:srgbClr val="FF0000"/>
+            </a:solidFill>
+          </a:ln>
+        </p:spPr>
+        <p:style>
+          <a:lnRef idx="1">
+            <a:schemeClr val="accent1"/>
+          </a:lnRef>
+          <a:fillRef idx="0">
+            <a:schemeClr val="accent1"/>
+          </a:fillRef>
+          <a:effectRef idx="0">
+            <a:schemeClr val="accent1"/>
+          </a:effectRef>
+          <a:fontRef idx="minor">
+            <a:schemeClr val="tx1"/>
+          </a:fontRef>
+        </p:style>
+      </p:cxnSp>
+      <p:sp>
+        <p:nvSpPr>
+          <p:cNvPr id="156" name="TextBox 155">
+            <a:extLst>
+              <a:ext uri="{FF2B5EF4-FFF2-40B4-BE49-F238E27FC236}">
+                <a16:creationId xmlns:a16="http://schemas.microsoft.com/office/drawing/2014/main" id="{7F62C529-5089-974D-8B65-082145005F6B}"/>
+              </a:ext>
+            </a:extLst>
+          </p:cNvPr>
+          <p:cNvSpPr txBox="1"/>
+          <p:nvPr/>
+        </p:nvSpPr>
+        <p:spPr>
+          <a:xfrm>
+            <a:off x="797837" y="6045642"/>
+            <a:ext cx="1473930" cy="369332"/>
+          </a:xfrm>
+          <a:prstGeom prst="rect">
+            <a:avLst/>
+          </a:prstGeom>
+          <a:noFill/>
+        </p:spPr>
+        <p:txBody>
+          <a:bodyPr wrap="none" rtlCol="0">
+            <a:spAutoFit/>
+          </a:bodyPr>
+          <a:lstStyle/>
+          <a:p>
+            <a:r>
+              <a:rPr lang="en-US" dirty="0"/>
+              <a:t>5V Power Rail</a:t>
+            </a:r>
+          </a:p>
+        </p:txBody>
+      </p:sp>
+      <p:sp>
+        <p:nvSpPr>
+          <p:cNvPr id="166" name="TextBox 165">
+            <a:extLst>
+              <a:ext uri="{FF2B5EF4-FFF2-40B4-BE49-F238E27FC236}">
+                <a16:creationId xmlns:a16="http://schemas.microsoft.com/office/drawing/2014/main" id="{BFE02BC7-F8D5-7146-8CD0-A946D1AB3A22}"/>
+              </a:ext>
+            </a:extLst>
+          </p:cNvPr>
+          <p:cNvSpPr txBox="1"/>
+          <p:nvPr/>
+        </p:nvSpPr>
+        <p:spPr>
+          <a:xfrm>
+            <a:off x="8800363" y="3309989"/>
+            <a:ext cx="433132" cy="369332"/>
+          </a:xfrm>
+          <a:prstGeom prst="rect">
+            <a:avLst/>
+          </a:prstGeom>
+          <a:noFill/>
+        </p:spPr>
+        <p:txBody>
+          <a:bodyPr wrap="none" rtlCol="0">
+            <a:spAutoFit/>
+          </a:bodyPr>
+          <a:lstStyle/>
+          <a:p>
+            <a:r>
+              <a:rPr lang="en-US" dirty="0"/>
+              <a:t>6V</a:t>
+            </a:r>
+          </a:p>
+        </p:txBody>
+      </p:sp>
+      <p:sp>
+        <p:nvSpPr>
+          <p:cNvPr id="167" name="TextBox 166">
+            <a:extLst>
+              <a:ext uri="{FF2B5EF4-FFF2-40B4-BE49-F238E27FC236}">
+                <a16:creationId xmlns:a16="http://schemas.microsoft.com/office/drawing/2014/main" id="{1CE7AC0F-8415-EC4C-B76A-6ED7490DD161}"/>
+              </a:ext>
+            </a:extLst>
+          </p:cNvPr>
+          <p:cNvSpPr txBox="1"/>
+          <p:nvPr/>
+        </p:nvSpPr>
+        <p:spPr>
+          <a:xfrm>
+            <a:off x="5322847" y="1083172"/>
+            <a:ext cx="607859" cy="369332"/>
+          </a:xfrm>
+          <a:prstGeom prst="rect">
+            <a:avLst/>
+          </a:prstGeom>
+          <a:noFill/>
+        </p:spPr>
+        <p:txBody>
+          <a:bodyPr wrap="none" rtlCol="0">
+            <a:spAutoFit/>
+          </a:bodyPr>
+          <a:lstStyle/>
+          <a:p>
+            <a:r>
+              <a:rPr lang="en-US" dirty="0"/>
+              <a:t>3.3V</a:t>
+            </a:r>
+          </a:p>
+        </p:txBody>
+      </p:sp>
+      <p:cxnSp>
+        <p:nvCxnSpPr>
+          <p:cNvPr id="168" name="Straight Connector 167">
+            <a:extLst>
+              <a:ext uri="{FF2B5EF4-FFF2-40B4-BE49-F238E27FC236}">
+                <a16:creationId xmlns:a16="http://schemas.microsoft.com/office/drawing/2014/main" id="{510FB839-088D-7C46-A1AF-213931CD9779}"/>
+              </a:ext>
+            </a:extLst>
+          </p:cNvPr>
+          <p:cNvCxnSpPr>
+            <a:cxnSpLocks/>
+          </p:cNvCxnSpPr>
+          <p:nvPr/>
+        </p:nvCxnSpPr>
+        <p:spPr>
+          <a:xfrm flipV="1">
+            <a:off x="3888915" y="2899315"/>
+            <a:ext cx="1032220" cy="139499"/>
+          </a:xfrm>
+          <a:prstGeom prst="line">
+            <a:avLst/>
+          </a:prstGeom>
+          <a:ln w="63500">
+            <a:solidFill>
+              <a:schemeClr val="tx1"/>
+            </a:solidFill>
+          </a:ln>
+        </p:spPr>
+        <p:style>
+          <a:lnRef idx="1">
+            <a:schemeClr val="accent1"/>
+          </a:lnRef>
+          <a:fillRef idx="0">
+            <a:schemeClr val="accent1"/>
+          </a:fillRef>
+          <a:effectRef idx="0">
+            <a:schemeClr val="accent1"/>
+          </a:effectRef>
+          <a:fontRef idx="minor">
+            <a:schemeClr val="tx1"/>
+          </a:fontRef>
+        </p:style>
+      </p:cxnSp>
+      <p:sp>
+        <p:nvSpPr>
+          <p:cNvPr id="170" name="TextBox 169">
+            <a:extLst>
+              <a:ext uri="{FF2B5EF4-FFF2-40B4-BE49-F238E27FC236}">
+                <a16:creationId xmlns:a16="http://schemas.microsoft.com/office/drawing/2014/main" id="{027DA886-E971-4A4B-9075-6916CE5C73AC}"/>
+              </a:ext>
+            </a:extLst>
+          </p:cNvPr>
+          <p:cNvSpPr txBox="1"/>
+          <p:nvPr/>
+        </p:nvSpPr>
+        <p:spPr>
+          <a:xfrm>
+            <a:off x="5668152" y="5464769"/>
+            <a:ext cx="2739707" cy="646331"/>
+          </a:xfrm>
+          <a:prstGeom prst="rect">
+            <a:avLst/>
+          </a:prstGeom>
+          <a:noFill/>
+        </p:spPr>
+        <p:txBody>
+          <a:bodyPr wrap="square" rtlCol="0">
+            <a:spAutoFit/>
+          </a:bodyPr>
+          <a:lstStyle/>
+          <a:p>
+            <a:pPr algn="ctr"/>
+            <a:r>
+              <a:rPr lang="en-US" dirty="0"/>
+              <a:t>L293 Mini 4 Channel</a:t>
+            </a:r>
+          </a:p>
+          <a:p>
+            <a:pPr algn="ctr"/>
+            <a:r>
+              <a:rPr lang="en-US" dirty="0"/>
+              <a:t>Motor Driver</a:t>
+            </a:r>
+          </a:p>
+        </p:txBody>
+      </p:sp>
+      <p:sp>
+        <p:nvSpPr>
+          <p:cNvPr id="171" name="TextBox 170">
+            <a:extLst>
+              <a:ext uri="{FF2B5EF4-FFF2-40B4-BE49-F238E27FC236}">
+                <a16:creationId xmlns:a16="http://schemas.microsoft.com/office/drawing/2014/main" id="{A1DBDE4D-0D7E-7F47-A313-311D0A695E59}"/>
+              </a:ext>
+            </a:extLst>
+          </p:cNvPr>
+          <p:cNvSpPr txBox="1"/>
+          <p:nvPr/>
+        </p:nvSpPr>
+        <p:spPr>
+          <a:xfrm>
+            <a:off x="6106089" y="771246"/>
+            <a:ext cx="3032882" cy="369332"/>
+          </a:xfrm>
+          <a:prstGeom prst="rect">
+            <a:avLst/>
+          </a:prstGeom>
+          <a:noFill/>
+        </p:spPr>
+        <p:txBody>
+          <a:bodyPr wrap="none" rtlCol="0">
+            <a:spAutoFit/>
+          </a:bodyPr>
+          <a:lstStyle/>
+          <a:p>
+            <a:r>
+              <a:rPr lang="en-US" dirty="0"/>
+              <a:t>VL53L0X Time-of-Flight Sensor</a:t>
+            </a:r>
+          </a:p>
+        </p:txBody>
+      </p:sp>
+    </p:spTree>
+    <p:extLst>
+      <p:ext uri="{BB962C8B-B14F-4D97-AF65-F5344CB8AC3E}">
+        <p14:creationId xmlns:p14="http://schemas.microsoft.com/office/powerpoint/2010/main" val="941945181"/>
+      </p:ext>
+    </p:extLst>
+  </p:cSld>
+  <p:clrMapOvr>
+    <a:masterClrMapping/>
+  </p:clrMapOvr>
+</p:sld>
+</file>
+
+<file path=ppt/slides/slide7.xml><?xml version="1.0" encoding="utf-8"?>
+<p:sld xmlns:a="http://schemas.openxmlformats.org/drawingml/2006/main" xmlns:r="http://schemas.openxmlformats.org/officeDocument/2006/relationships" xmlns:p="http://schemas.openxmlformats.org/presentationml/2006/main">
+  <p:cSld>
+    <p:spTree>
+      <p:nvGrpSpPr>
+        <p:cNvPr id="1" name=""/>
+        <p:cNvGrpSpPr/>
+        <p:nvPr/>
+      </p:nvGrpSpPr>
+      <p:grpSpPr>
+        <a:xfrm>
+          <a:off x="0" y="0"/>
+          <a:ext cx="0" cy="0"/>
+          <a:chOff x="0" y="0"/>
+          <a:chExt cx="0" cy="0"/>
+        </a:xfrm>
+      </p:grpSpPr>
+      <p:sp>
+        <p:nvSpPr>
+          <p:cNvPr id="2" name="Title 1">
+            <a:extLst>
+              <a:ext uri="{FF2B5EF4-FFF2-40B4-BE49-F238E27FC236}">
+                <a16:creationId xmlns:a16="http://schemas.microsoft.com/office/drawing/2014/main" id="{CF67F57F-7EC1-8A47-978D-9E2BF64A330C}"/>
+              </a:ext>
+            </a:extLst>
+          </p:cNvPr>
+          <p:cNvSpPr>
+            <a:spLocks noGrp="1"/>
+          </p:cNvSpPr>
+          <p:nvPr>
+            <p:ph type="title"/>
+          </p:nvPr>
+        </p:nvSpPr>
+        <p:spPr/>
+        <p:txBody>
+          <a:bodyPr/>
+          <a:lstStyle/>
+          <a:p>
+            <a:r>
+              <a:rPr lang="en-US" dirty="0"/>
+              <a:t>Voltage Regulator Input/Output Curve</a:t>
+            </a:r>
+          </a:p>
+        </p:txBody>
+      </p:sp>
+      <p:sp>
+        <p:nvSpPr>
+          <p:cNvPr id="3" name="Content Placeholder 2">
+            <a:extLst>
+              <a:ext uri="{FF2B5EF4-FFF2-40B4-BE49-F238E27FC236}">
+                <a16:creationId xmlns:a16="http://schemas.microsoft.com/office/drawing/2014/main" id="{265335BE-6F93-534C-9089-1CAB2C2B28C6}"/>
+              </a:ext>
+            </a:extLst>
+          </p:cNvPr>
+          <p:cNvSpPr>
+            <a:spLocks noGrp="1"/>
+          </p:cNvSpPr>
+          <p:nvPr>
+            <p:ph idx="1"/>
+          </p:nvPr>
+        </p:nvSpPr>
+        <p:spPr>
+          <a:xfrm>
+            <a:off x="838200" y="5394959"/>
+            <a:ext cx="10515600" cy="782003"/>
+          </a:xfrm>
+        </p:spPr>
+        <p:txBody>
+          <a:bodyPr/>
+          <a:lstStyle/>
+          <a:p>
+            <a:r>
+              <a:rPr lang="en-US" dirty="0"/>
+              <a:t>http://</a:t>
+            </a:r>
+            <a:r>
+              <a:rPr lang="en-US" dirty="0" err="1"/>
+              <a:t>solarbotics.net</a:t>
+            </a:r>
+            <a:r>
+              <a:rPr lang="en-US" dirty="0"/>
+              <a:t>/library/datasheets/78M05.pdf</a:t>
+            </a:r>
+          </a:p>
+        </p:txBody>
+      </p:sp>
+      <p:pic>
+        <p:nvPicPr>
+          <p:cNvPr id="4" name="Picture 3">
+            <a:extLst>
+              <a:ext uri="{FF2B5EF4-FFF2-40B4-BE49-F238E27FC236}">
+                <a16:creationId xmlns:a16="http://schemas.microsoft.com/office/drawing/2014/main" id="{21B59CAD-9BD8-7342-A922-6D38CF565936}"/>
+              </a:ext>
+            </a:extLst>
+          </p:cNvPr>
+          <p:cNvPicPr>
+            <a:picLocks noChangeAspect="1"/>
+          </p:cNvPicPr>
+          <p:nvPr/>
+        </p:nvPicPr>
+        <p:blipFill>
+          <a:blip r:embed="rId2"/>
+          <a:stretch>
+            <a:fillRect/>
+          </a:stretch>
+        </p:blipFill>
+        <p:spPr>
+          <a:xfrm>
+            <a:off x="2288539" y="2209800"/>
+            <a:ext cx="6672125" cy="2847340"/>
+          </a:xfrm>
+          <a:prstGeom prst="rect">
+            <a:avLst/>
+          </a:prstGeom>
+        </p:spPr>
+      </p:pic>
+    </p:spTree>
+    <p:extLst>
+      <p:ext uri="{BB962C8B-B14F-4D97-AF65-F5344CB8AC3E}">
+        <p14:creationId xmlns:p14="http://schemas.microsoft.com/office/powerpoint/2010/main" val="3061798682"/>
+      </p:ext>
+    </p:extLst>
+  </p:cSld>
+  <p:clrMapOvr>
+    <a:masterClrMapping/>
+  </p:clrMapOvr>
+</p:sld>
+</file>
+
+<file path=ppt/slides/slide8.xml><?xml version="1.0" encoding="utf-8"?>
+<p:sld xmlns:a="http://schemas.openxmlformats.org/drawingml/2006/main" xmlns:r="http://schemas.openxmlformats.org/officeDocument/2006/relationships" xmlns:p="http://schemas.openxmlformats.org/presentationml/2006/main">
+  <p:cSld>
+    <p:spTree>
+      <p:nvGrpSpPr>
+        <p:cNvPr id="1" name=""/>
+        <p:cNvGrpSpPr/>
+        <p:nvPr/>
+      </p:nvGrpSpPr>
+      <p:grpSpPr>
+        <a:xfrm>
+          <a:off x="0" y="0"/>
+          <a:ext cx="0" cy="0"/>
+          <a:chOff x="0" y="0"/>
+          <a:chExt cx="0" cy="0"/>
+        </a:xfrm>
+      </p:grpSpPr>
+      <p:sp>
+        <p:nvSpPr>
+          <p:cNvPr id="2" name="Title 1">
+            <a:extLst>
+              <a:ext uri="{FF2B5EF4-FFF2-40B4-BE49-F238E27FC236}">
+                <a16:creationId xmlns:a16="http://schemas.microsoft.com/office/drawing/2014/main" id="{A5AAC76D-0841-7E4E-BFAF-FBEE70D03660}"/>
+              </a:ext>
+            </a:extLst>
+          </p:cNvPr>
+          <p:cNvSpPr>
+            <a:spLocks noGrp="1"/>
+          </p:cNvSpPr>
+          <p:nvPr>
+            <p:ph type="title"/>
+          </p:nvPr>
+        </p:nvSpPr>
+        <p:spPr>
+          <a:xfrm>
+            <a:off x="259080" y="227965"/>
+            <a:ext cx="10515600" cy="640715"/>
+          </a:xfrm>
+        </p:spPr>
+        <p:txBody>
+          <a:bodyPr>
+            <a:normAutofit fontScale="90000"/>
+          </a:bodyPr>
+          <a:lstStyle/>
+          <a:p>
+            <a:r>
+              <a:rPr lang="en-US" dirty="0"/>
+              <a:t>Voltage Curve Close Up</a:t>
+            </a:r>
+          </a:p>
+        </p:txBody>
+      </p:sp>
+      <p:sp>
+        <p:nvSpPr>
+          <p:cNvPr id="3" name="Content Placeholder 2">
+            <a:extLst>
+              <a:ext uri="{FF2B5EF4-FFF2-40B4-BE49-F238E27FC236}">
+                <a16:creationId xmlns:a16="http://schemas.microsoft.com/office/drawing/2014/main" id="{B6EBC2D5-9BFE-9248-B0F0-913768E043DF}"/>
+              </a:ext>
+            </a:extLst>
+          </p:cNvPr>
+          <p:cNvSpPr>
+            <a:spLocks noGrp="1"/>
+          </p:cNvSpPr>
+          <p:nvPr>
+            <p:ph idx="1"/>
+          </p:nvPr>
+        </p:nvSpPr>
+        <p:spPr>
+          <a:xfrm>
+            <a:off x="1097280" y="6038124"/>
+            <a:ext cx="10515600" cy="919163"/>
+          </a:xfrm>
+        </p:spPr>
+        <p:txBody>
+          <a:bodyPr/>
+          <a:lstStyle/>
+          <a:p>
+            <a:r>
+              <a:rPr lang="en-US" dirty="0"/>
+              <a:t>Voltage Curve</a:t>
+            </a:r>
+          </a:p>
+        </p:txBody>
+      </p:sp>
+      <p:pic>
+        <p:nvPicPr>
+          <p:cNvPr id="4" name="Picture 3">
+            <a:extLst>
+              <a:ext uri="{FF2B5EF4-FFF2-40B4-BE49-F238E27FC236}">
+                <a16:creationId xmlns:a16="http://schemas.microsoft.com/office/drawing/2014/main" id="{D6805BC2-B582-7842-A951-2A04D65604D1}"/>
+              </a:ext>
+            </a:extLst>
+          </p:cNvPr>
+          <p:cNvPicPr>
+            <a:picLocks noChangeAspect="1"/>
+          </p:cNvPicPr>
+          <p:nvPr/>
+        </p:nvPicPr>
+        <p:blipFill rotWithShape="1">
+          <a:blip r:embed="rId2"/>
+          <a:srcRect l="3388" t="14988" r="67832" b="18108"/>
+          <a:stretch/>
+        </p:blipFill>
+        <p:spPr>
+          <a:xfrm>
+            <a:off x="3482340" y="1041914"/>
+            <a:ext cx="4861560" cy="4822976"/>
+          </a:xfrm>
+          <a:prstGeom prst="rect">
+            <a:avLst/>
+          </a:prstGeom>
+        </p:spPr>
+      </p:pic>
+      <p:grpSp>
+        <p:nvGrpSpPr>
+          <p:cNvPr id="19" name="Group 18">
+            <a:extLst>
+              <a:ext uri="{FF2B5EF4-FFF2-40B4-BE49-F238E27FC236}">
+                <a16:creationId xmlns:a16="http://schemas.microsoft.com/office/drawing/2014/main" id="{02ECFAF2-E1B3-CC45-AF07-D8BC978CA894}"/>
+              </a:ext>
+            </a:extLst>
+          </p:cNvPr>
+          <p:cNvGrpSpPr/>
+          <p:nvPr/>
+        </p:nvGrpSpPr>
+        <p:grpSpPr>
+          <a:xfrm>
+            <a:off x="4282440" y="1615440"/>
+            <a:ext cx="3596640" cy="3429000"/>
+            <a:chOff x="4282440" y="1615440"/>
+            <a:chExt cx="3596640" cy="3429000"/>
+          </a:xfrm>
+        </p:grpSpPr>
+        <p:cxnSp>
+          <p:nvCxnSpPr>
+            <p:cNvPr id="6" name="Straight Connector 5">
+              <a:extLst>
+                <a:ext uri="{FF2B5EF4-FFF2-40B4-BE49-F238E27FC236}">
+                  <a16:creationId xmlns:a16="http://schemas.microsoft.com/office/drawing/2014/main" id="{97A0D28F-E1A3-6148-8B3A-12AA8F05B930}"/>
+                </a:ext>
+              </a:extLst>
+            </p:cNvPr>
+            <p:cNvCxnSpPr>
+              <a:cxnSpLocks/>
+            </p:cNvCxnSpPr>
+            <p:nvPr/>
+          </p:nvCxnSpPr>
+          <p:spPr>
+            <a:xfrm>
+              <a:off x="6080760" y="1615440"/>
+              <a:ext cx="0" cy="3429000"/>
+            </a:xfrm>
+            <a:prstGeom prst="line">
+              <a:avLst/>
+            </a:prstGeom>
+          </p:spPr>
+          <p:style>
+            <a:lnRef idx="1">
+              <a:schemeClr val="accent1"/>
+            </a:lnRef>
+            <a:fillRef idx="0">
+              <a:schemeClr val="accent1"/>
+            </a:fillRef>
+            <a:effectRef idx="0">
+              <a:schemeClr val="accent1"/>
+            </a:effectRef>
+            <a:fontRef idx="minor">
+              <a:schemeClr val="tx1"/>
+            </a:fontRef>
+          </p:style>
+        </p:cxnSp>
+        <p:cxnSp>
+          <p:nvCxnSpPr>
+            <p:cNvPr id="8" name="Straight Connector 7">
+              <a:extLst>
+                <a:ext uri="{FF2B5EF4-FFF2-40B4-BE49-F238E27FC236}">
+                  <a16:creationId xmlns:a16="http://schemas.microsoft.com/office/drawing/2014/main" id="{DE67827F-DCA5-2B4C-AE01-684B4E2522AB}"/>
+                </a:ext>
+              </a:extLst>
+            </p:cNvPr>
+            <p:cNvCxnSpPr>
+              <a:cxnSpLocks/>
+            </p:cNvCxnSpPr>
+            <p:nvPr/>
+          </p:nvCxnSpPr>
+          <p:spPr>
+            <a:xfrm>
+              <a:off x="5721096" y="1615440"/>
+              <a:ext cx="0" cy="3429000"/>
+            </a:xfrm>
+            <a:prstGeom prst="line">
+              <a:avLst/>
+            </a:prstGeom>
+          </p:spPr>
+          <p:style>
+            <a:lnRef idx="1">
+              <a:schemeClr val="accent1"/>
+            </a:lnRef>
+            <a:fillRef idx="0">
+              <a:schemeClr val="accent1"/>
+            </a:fillRef>
+            <a:effectRef idx="0">
+              <a:schemeClr val="accent1"/>
+            </a:effectRef>
+            <a:fontRef idx="minor">
+              <a:schemeClr val="tx1"/>
+            </a:fontRef>
+          </p:style>
+        </p:cxnSp>
+        <p:cxnSp>
+          <p:nvCxnSpPr>
+            <p:cNvPr id="9" name="Straight Connector 8">
+              <a:extLst>
+                <a:ext uri="{FF2B5EF4-FFF2-40B4-BE49-F238E27FC236}">
+                  <a16:creationId xmlns:a16="http://schemas.microsoft.com/office/drawing/2014/main" id="{CCE2E43F-7338-064D-9D18-03484C591EE1}"/>
+                </a:ext>
+              </a:extLst>
+            </p:cNvPr>
+            <p:cNvCxnSpPr>
+              <a:cxnSpLocks/>
+            </p:cNvCxnSpPr>
+            <p:nvPr/>
+          </p:nvCxnSpPr>
+          <p:spPr>
+            <a:xfrm>
+              <a:off x="5361432" y="1615440"/>
+              <a:ext cx="0" cy="3429000"/>
+            </a:xfrm>
+            <a:prstGeom prst="line">
+              <a:avLst/>
+            </a:prstGeom>
+          </p:spPr>
+          <p:style>
+            <a:lnRef idx="1">
+              <a:schemeClr val="accent1"/>
+            </a:lnRef>
+            <a:fillRef idx="0">
+              <a:schemeClr val="accent1"/>
+            </a:fillRef>
+            <a:effectRef idx="0">
+              <a:schemeClr val="accent1"/>
+            </a:effectRef>
+            <a:fontRef idx="minor">
+              <a:schemeClr val="tx1"/>
+            </a:fontRef>
+          </p:style>
+        </p:cxnSp>
+        <p:cxnSp>
+          <p:nvCxnSpPr>
+            <p:cNvPr id="10" name="Straight Connector 9">
+              <a:extLst>
+                <a:ext uri="{FF2B5EF4-FFF2-40B4-BE49-F238E27FC236}">
+                  <a16:creationId xmlns:a16="http://schemas.microsoft.com/office/drawing/2014/main" id="{EA028C04-4A69-B842-944B-1957E4EE138D}"/>
+                </a:ext>
+              </a:extLst>
+            </p:cNvPr>
+            <p:cNvCxnSpPr>
+              <a:cxnSpLocks/>
+            </p:cNvCxnSpPr>
+            <p:nvPr/>
+          </p:nvCxnSpPr>
+          <p:spPr>
+            <a:xfrm>
+              <a:off x="5001768" y="1615440"/>
+              <a:ext cx="0" cy="3429000"/>
+            </a:xfrm>
+            <a:prstGeom prst="line">
+              <a:avLst/>
+            </a:prstGeom>
+          </p:spPr>
+          <p:style>
+            <a:lnRef idx="1">
+              <a:schemeClr val="accent1"/>
+            </a:lnRef>
+            <a:fillRef idx="0">
+              <a:schemeClr val="accent1"/>
+            </a:fillRef>
+            <a:effectRef idx="0">
+              <a:schemeClr val="accent1"/>
+            </a:effectRef>
+            <a:fontRef idx="minor">
+              <a:schemeClr val="tx1"/>
+            </a:fontRef>
+          </p:style>
+        </p:cxnSp>
+        <p:cxnSp>
+          <p:nvCxnSpPr>
+            <p:cNvPr id="11" name="Straight Connector 10">
+              <a:extLst>
+                <a:ext uri="{FF2B5EF4-FFF2-40B4-BE49-F238E27FC236}">
+                  <a16:creationId xmlns:a16="http://schemas.microsoft.com/office/drawing/2014/main" id="{B768B53E-E8A4-0140-A4D2-8325DFC6DE63}"/>
+                </a:ext>
+              </a:extLst>
+            </p:cNvPr>
+            <p:cNvCxnSpPr>
+              <a:cxnSpLocks/>
+            </p:cNvCxnSpPr>
+            <p:nvPr/>
+          </p:nvCxnSpPr>
+          <p:spPr>
+            <a:xfrm>
+              <a:off x="4282440" y="1615440"/>
+              <a:ext cx="0" cy="3429000"/>
+            </a:xfrm>
+            <a:prstGeom prst="line">
+              <a:avLst/>
+            </a:prstGeom>
+          </p:spPr>
+          <p:style>
+            <a:lnRef idx="1">
+              <a:schemeClr val="accent1"/>
+            </a:lnRef>
+            <a:fillRef idx="0">
+              <a:schemeClr val="accent1"/>
+            </a:fillRef>
+            <a:effectRef idx="0">
+              <a:schemeClr val="accent1"/>
+            </a:effectRef>
+            <a:fontRef idx="minor">
+              <a:schemeClr val="tx1"/>
+            </a:fontRef>
+          </p:style>
+        </p:cxnSp>
+        <p:cxnSp>
+          <p:nvCxnSpPr>
+            <p:cNvPr id="12" name="Straight Connector 11">
+              <a:extLst>
+                <a:ext uri="{FF2B5EF4-FFF2-40B4-BE49-F238E27FC236}">
+                  <a16:creationId xmlns:a16="http://schemas.microsoft.com/office/drawing/2014/main" id="{DA55EDFC-3F50-1D4A-80F4-24D26BC2F1C5}"/>
+                </a:ext>
+              </a:extLst>
+            </p:cNvPr>
+            <p:cNvCxnSpPr>
+              <a:cxnSpLocks/>
+            </p:cNvCxnSpPr>
+            <p:nvPr/>
+          </p:nvCxnSpPr>
+          <p:spPr>
+            <a:xfrm>
+              <a:off x="4642104" y="1615440"/>
+              <a:ext cx="0" cy="3429000"/>
+            </a:xfrm>
+            <a:prstGeom prst="line">
+              <a:avLst/>
+            </a:prstGeom>
+          </p:spPr>
+          <p:style>
+            <a:lnRef idx="1">
+              <a:schemeClr val="accent1"/>
+            </a:lnRef>
+            <a:fillRef idx="0">
+              <a:schemeClr val="accent1"/>
+            </a:fillRef>
+            <a:effectRef idx="0">
+              <a:schemeClr val="accent1"/>
+            </a:effectRef>
+            <a:fontRef idx="minor">
+              <a:schemeClr val="tx1"/>
+            </a:fontRef>
+          </p:style>
+        </p:cxnSp>
+        <p:cxnSp>
+          <p:nvCxnSpPr>
+            <p:cNvPr id="14" name="Straight Connector 13">
+              <a:extLst>
+                <a:ext uri="{FF2B5EF4-FFF2-40B4-BE49-F238E27FC236}">
+                  <a16:creationId xmlns:a16="http://schemas.microsoft.com/office/drawing/2014/main" id="{AC2EDE5B-9AFE-F14B-B776-3AAE856754AC}"/>
+                </a:ext>
+              </a:extLst>
+            </p:cNvPr>
+            <p:cNvCxnSpPr>
+              <a:cxnSpLocks/>
+            </p:cNvCxnSpPr>
+            <p:nvPr/>
+          </p:nvCxnSpPr>
+          <p:spPr>
+            <a:xfrm>
+              <a:off x="7879080" y="1615440"/>
+              <a:ext cx="0" cy="3429000"/>
+            </a:xfrm>
+            <a:prstGeom prst="line">
+              <a:avLst/>
+            </a:prstGeom>
+          </p:spPr>
+          <p:style>
+            <a:lnRef idx="1">
+              <a:schemeClr val="accent1"/>
+            </a:lnRef>
+            <a:fillRef idx="0">
+              <a:schemeClr val="accent1"/>
+            </a:fillRef>
+            <a:effectRef idx="0">
+              <a:schemeClr val="accent1"/>
+            </a:effectRef>
+            <a:fontRef idx="minor">
+              <a:schemeClr val="tx1"/>
+            </a:fontRef>
+          </p:style>
+        </p:cxnSp>
+        <p:cxnSp>
+          <p:nvCxnSpPr>
+            <p:cNvPr id="15" name="Straight Connector 14">
+              <a:extLst>
+                <a:ext uri="{FF2B5EF4-FFF2-40B4-BE49-F238E27FC236}">
+                  <a16:creationId xmlns:a16="http://schemas.microsoft.com/office/drawing/2014/main" id="{634C78B2-7095-C646-9D82-722CF95ECC64}"/>
+                </a:ext>
+              </a:extLst>
+            </p:cNvPr>
+            <p:cNvCxnSpPr>
+              <a:cxnSpLocks/>
+            </p:cNvCxnSpPr>
+            <p:nvPr/>
+          </p:nvCxnSpPr>
+          <p:spPr>
+            <a:xfrm>
+              <a:off x="7519416" y="1615440"/>
+              <a:ext cx="0" cy="3429000"/>
+            </a:xfrm>
+            <a:prstGeom prst="line">
+              <a:avLst/>
+            </a:prstGeom>
+          </p:spPr>
+          <p:style>
+            <a:lnRef idx="1">
+              <a:schemeClr val="accent1"/>
+            </a:lnRef>
+            <a:fillRef idx="0">
+              <a:schemeClr val="accent1"/>
+            </a:fillRef>
+            <a:effectRef idx="0">
+              <a:schemeClr val="accent1"/>
+            </a:effectRef>
+            <a:fontRef idx="minor">
+              <a:schemeClr val="tx1"/>
+            </a:fontRef>
+          </p:style>
+        </p:cxnSp>
+        <p:cxnSp>
+          <p:nvCxnSpPr>
+            <p:cNvPr id="16" name="Straight Connector 15">
+              <a:extLst>
+                <a:ext uri="{FF2B5EF4-FFF2-40B4-BE49-F238E27FC236}">
+                  <a16:creationId xmlns:a16="http://schemas.microsoft.com/office/drawing/2014/main" id="{4F8FFBA1-9D9A-DC43-B02D-15C971970566}"/>
+                </a:ext>
+              </a:extLst>
+            </p:cNvPr>
+            <p:cNvCxnSpPr>
+              <a:cxnSpLocks/>
+            </p:cNvCxnSpPr>
+            <p:nvPr/>
+          </p:nvCxnSpPr>
+          <p:spPr>
+            <a:xfrm>
+              <a:off x="7159752" y="1615440"/>
+              <a:ext cx="0" cy="3429000"/>
+            </a:xfrm>
+            <a:prstGeom prst="line">
+              <a:avLst/>
+            </a:prstGeom>
+          </p:spPr>
+          <p:style>
+            <a:lnRef idx="1">
+              <a:schemeClr val="accent1"/>
+            </a:lnRef>
+            <a:fillRef idx="0">
+              <a:schemeClr val="accent1"/>
+            </a:fillRef>
+            <a:effectRef idx="0">
+              <a:schemeClr val="accent1"/>
+            </a:effectRef>
+            <a:fontRef idx="minor">
+              <a:schemeClr val="tx1"/>
+            </a:fontRef>
+          </p:style>
+        </p:cxnSp>
+        <p:cxnSp>
+          <p:nvCxnSpPr>
+            <p:cNvPr id="17" name="Straight Connector 16">
+              <a:extLst>
+                <a:ext uri="{FF2B5EF4-FFF2-40B4-BE49-F238E27FC236}">
+                  <a16:creationId xmlns:a16="http://schemas.microsoft.com/office/drawing/2014/main" id="{61D0204B-F6D8-264F-9AA5-9F1690B44FCE}"/>
+                </a:ext>
+              </a:extLst>
+            </p:cNvPr>
+            <p:cNvCxnSpPr>
+              <a:cxnSpLocks/>
+            </p:cNvCxnSpPr>
+            <p:nvPr/>
+          </p:nvCxnSpPr>
+          <p:spPr>
+            <a:xfrm>
+              <a:off x="6440424" y="1615440"/>
+              <a:ext cx="0" cy="3429000"/>
+            </a:xfrm>
+            <a:prstGeom prst="line">
+              <a:avLst/>
+            </a:prstGeom>
+          </p:spPr>
+          <p:style>
+            <a:lnRef idx="1">
+              <a:schemeClr val="accent1"/>
+            </a:lnRef>
+            <a:fillRef idx="0">
+              <a:schemeClr val="accent1"/>
+            </a:fillRef>
+            <a:effectRef idx="0">
+              <a:schemeClr val="accent1"/>
+            </a:effectRef>
+            <a:fontRef idx="minor">
+              <a:schemeClr val="tx1"/>
+            </a:fontRef>
+          </p:style>
+        </p:cxnSp>
+        <p:cxnSp>
+          <p:nvCxnSpPr>
+            <p:cNvPr id="18" name="Straight Connector 17">
+              <a:extLst>
+                <a:ext uri="{FF2B5EF4-FFF2-40B4-BE49-F238E27FC236}">
+                  <a16:creationId xmlns:a16="http://schemas.microsoft.com/office/drawing/2014/main" id="{C76C6103-799C-E449-8F17-F53E17D45FB9}"/>
+                </a:ext>
+              </a:extLst>
+            </p:cNvPr>
+            <p:cNvCxnSpPr>
+              <a:cxnSpLocks/>
+            </p:cNvCxnSpPr>
+            <p:nvPr/>
+          </p:nvCxnSpPr>
+          <p:spPr>
+            <a:xfrm>
+              <a:off x="6800088" y="1615440"/>
+              <a:ext cx="0" cy="3429000"/>
+            </a:xfrm>
+            <a:prstGeom prst="line">
+              <a:avLst/>
+            </a:prstGeom>
+          </p:spPr>
+          <p:style>
+            <a:lnRef idx="1">
+              <a:schemeClr val="accent1"/>
+            </a:lnRef>
+            <a:fillRef idx="0">
+              <a:schemeClr val="accent1"/>
+            </a:fillRef>
+            <a:effectRef idx="0">
+              <a:schemeClr val="accent1"/>
+            </a:effectRef>
+            <a:fontRef idx="minor">
+              <a:schemeClr val="tx1"/>
+            </a:fontRef>
+          </p:style>
+        </p:cxnSp>
+      </p:grpSp>
+      <p:sp>
+        <p:nvSpPr>
+          <p:cNvPr id="20" name="TextBox 19">
+            <a:extLst>
+              <a:ext uri="{FF2B5EF4-FFF2-40B4-BE49-F238E27FC236}">
+                <a16:creationId xmlns:a16="http://schemas.microsoft.com/office/drawing/2014/main" id="{37248786-4C86-FB42-ADBB-F8B7DB052D09}"/>
+              </a:ext>
+            </a:extLst>
+          </p:cNvPr>
+          <p:cNvSpPr txBox="1"/>
+          <p:nvPr/>
+        </p:nvSpPr>
+        <p:spPr>
+          <a:xfrm>
+            <a:off x="6237484" y="5445499"/>
+            <a:ext cx="405880" cy="369332"/>
+          </a:xfrm>
+          <a:prstGeom prst="rect">
+            <a:avLst/>
+          </a:prstGeom>
+          <a:noFill/>
+        </p:spPr>
+        <p:txBody>
+          <a:bodyPr wrap="none" rtlCol="0">
+            <a:spAutoFit/>
+          </a:bodyPr>
+          <a:lstStyle/>
+          <a:p>
+            <a:r>
+              <a:rPr lang="en-US" dirty="0"/>
+              <a:t>6v</a:t>
+            </a:r>
+          </a:p>
+        </p:txBody>
+      </p:sp>
+      <p:sp>
+        <p:nvSpPr>
+          <p:cNvPr id="21" name="TextBox 20">
+            <a:extLst>
+              <a:ext uri="{FF2B5EF4-FFF2-40B4-BE49-F238E27FC236}">
+                <a16:creationId xmlns:a16="http://schemas.microsoft.com/office/drawing/2014/main" id="{48B62E59-7C58-E948-83FE-9138E3373FAB}"/>
+              </a:ext>
+            </a:extLst>
+          </p:cNvPr>
+          <p:cNvSpPr txBox="1"/>
+          <p:nvPr/>
+        </p:nvSpPr>
+        <p:spPr>
+          <a:xfrm>
+            <a:off x="5886964" y="5445499"/>
+            <a:ext cx="405880" cy="369332"/>
+          </a:xfrm>
+          <a:prstGeom prst="rect">
+            <a:avLst/>
+          </a:prstGeom>
+          <a:noFill/>
+        </p:spPr>
+        <p:txBody>
+          <a:bodyPr wrap="none" rtlCol="0">
+            <a:spAutoFit/>
+          </a:bodyPr>
+          <a:lstStyle/>
+          <a:p>
+            <a:r>
+              <a:rPr lang="en-US" dirty="0"/>
+              <a:t>5v</a:t>
+            </a:r>
+          </a:p>
+        </p:txBody>
+      </p:sp>
+      <p:sp>
+        <p:nvSpPr>
+          <p:cNvPr id="22" name="TextBox 21">
+            <a:extLst>
+              <a:ext uri="{FF2B5EF4-FFF2-40B4-BE49-F238E27FC236}">
+                <a16:creationId xmlns:a16="http://schemas.microsoft.com/office/drawing/2014/main" id="{BEEFD327-3958-5645-8521-176DC153F712}"/>
+              </a:ext>
+            </a:extLst>
+          </p:cNvPr>
+          <p:cNvSpPr txBox="1"/>
+          <p:nvPr/>
+        </p:nvSpPr>
+        <p:spPr>
+          <a:xfrm>
+            <a:off x="7263260" y="5433300"/>
+            <a:ext cx="405880" cy="369332"/>
+          </a:xfrm>
+          <a:prstGeom prst="rect">
+            <a:avLst/>
+          </a:prstGeom>
+          <a:noFill/>
+        </p:spPr>
+        <p:txBody>
+          <a:bodyPr wrap="none" rtlCol="0">
+            <a:spAutoFit/>
+          </a:bodyPr>
+          <a:lstStyle/>
+          <a:p>
+            <a:r>
+              <a:rPr lang="en-US" dirty="0"/>
+              <a:t>9v</a:t>
+            </a:r>
+          </a:p>
+        </p:txBody>
+      </p:sp>
+    </p:spTree>
+    <p:extLst>
+      <p:ext uri="{BB962C8B-B14F-4D97-AF65-F5344CB8AC3E}">
+        <p14:creationId xmlns:p14="http://schemas.microsoft.com/office/powerpoint/2010/main" val="609067635"/>
+      </p:ext>
+    </p:extLst>
+  </p:cSld>
+  <p:clrMapOvr>
+    <a:masterClrMapping/>
+  </p:clrMapOvr>
+</p:sld>
+</file>
+
+<file path=ppt/slides/slide9.xml><?xml version="1.0" encoding="utf-8"?>
+<p:sld xmlns:a="http://schemas.openxmlformats.org/drawingml/2006/main" xmlns:r="http://schemas.openxmlformats.org/officeDocument/2006/relationships" xmlns:p="http://schemas.openxmlformats.org/presentationml/2006/main">
+  <p:cSld>
+    <p:spTree>
+      <p:nvGrpSpPr>
+        <p:cNvPr id="1" name=""/>
+        <p:cNvGrpSpPr/>
+        <p:nvPr/>
+      </p:nvGrpSpPr>
+      <p:grpSpPr>
+        <a:xfrm>
+          <a:off x="0" y="0"/>
+          <a:ext cx="0" cy="0"/>
+          <a:chOff x="0" y="0"/>
+          <a:chExt cx="0" cy="0"/>
+        </a:xfrm>
+      </p:grpSpPr>
+      <p:sp>
+        <p:nvSpPr>
+          <p:cNvPr id="2" name="Title 1">
+            <a:extLst>
+              <a:ext uri="{FF2B5EF4-FFF2-40B4-BE49-F238E27FC236}">
+                <a16:creationId xmlns:a16="http://schemas.microsoft.com/office/drawing/2014/main" id="{DFEFA16C-A157-F248-AFA1-440E69529FA7}"/>
+              </a:ext>
+            </a:extLst>
+          </p:cNvPr>
+          <p:cNvSpPr>
+            <a:spLocks noGrp="1"/>
+          </p:cNvSpPr>
+          <p:nvPr>
+            <p:ph type="title"/>
+          </p:nvPr>
+        </p:nvSpPr>
+        <p:spPr>
+          <a:xfrm>
+            <a:off x="411480" y="338773"/>
+            <a:ext cx="10515600" cy="644843"/>
+          </a:xfrm>
+        </p:spPr>
+        <p:txBody>
+          <a:bodyPr>
+            <a:normAutofit fontScale="90000"/>
+          </a:bodyPr>
+          <a:lstStyle/>
+          <a:p>
+            <a:r>
+              <a:rPr lang="en-US" dirty="0"/>
+              <a:t>Motor Driver Circuit</a:t>
+            </a:r>
+          </a:p>
+        </p:txBody>
+      </p:sp>
+      <p:sp>
+        <p:nvSpPr>
+          <p:cNvPr id="3" name="Content Placeholder 2">
+            <a:extLst>
+              <a:ext uri="{FF2B5EF4-FFF2-40B4-BE49-F238E27FC236}">
+                <a16:creationId xmlns:a16="http://schemas.microsoft.com/office/drawing/2014/main" id="{CA680DBB-1CEA-C34E-8B41-75C42D17D005}"/>
+              </a:ext>
+            </a:extLst>
+          </p:cNvPr>
+          <p:cNvSpPr>
+            <a:spLocks noGrp="1"/>
+          </p:cNvSpPr>
+          <p:nvPr>
+            <p:ph idx="1"/>
+          </p:nvPr>
+        </p:nvSpPr>
+        <p:spPr>
+          <a:xfrm>
+            <a:off x="838200" y="5770947"/>
+            <a:ext cx="10515600" cy="644843"/>
+          </a:xfrm>
+        </p:spPr>
+        <p:txBody>
+          <a:bodyPr/>
+          <a:lstStyle/>
+          <a:p>
+            <a:endParaRPr lang="en-US" dirty="0"/>
+          </a:p>
+        </p:txBody>
+      </p:sp>
+      <p:pic>
+        <p:nvPicPr>
+          <p:cNvPr id="1026" name="Picture 2" descr="Arduino Transistor DC Motor Control">
+            <a:extLst>
+              <a:ext uri="{FF2B5EF4-FFF2-40B4-BE49-F238E27FC236}">
+                <a16:creationId xmlns:a16="http://schemas.microsoft.com/office/drawing/2014/main" id="{33E51726-9330-E54B-9BC7-1C79773865D5}"/>
+              </a:ext>
+            </a:extLst>
+          </p:cNvPr>
+          <p:cNvPicPr>
+            <a:picLocks noChangeAspect="1" noChangeArrowheads="1"/>
+          </p:cNvPicPr>
+          <p:nvPr/>
+        </p:nvPicPr>
+        <p:blipFill rotWithShape="1">
+          <a:blip r:embed="rId2">
+            <a:extLst>
+              <a:ext uri="{28A0092B-C50C-407E-A947-70E740481C1C}">
+                <a14:useLocalDpi xmlns:a14="http://schemas.microsoft.com/office/drawing/2010/main" val="0"/>
+              </a:ext>
+            </a:extLst>
+          </a:blip>
+          <a:srcRect l="26680" t="8347"/>
+          <a:stretch/>
+        </p:blipFill>
+        <p:spPr bwMode="auto">
+          <a:xfrm>
+            <a:off x="4221479" y="1802523"/>
+            <a:ext cx="3487051" cy="3617760"/>
+          </a:xfrm>
+          <a:prstGeom prst="rect">
+            <a:avLst/>
+          </a:prstGeom>
+          <a:noFill/>
+          <a:extLst>
+            <a:ext uri="{909E8E84-426E-40DD-AFC4-6F175D3DCCD1}">
+              <a14:hiddenFill xmlns:a14="http://schemas.microsoft.com/office/drawing/2010/main">
+                <a:solidFill>
+                  <a:srgbClr val="FFFFFF"/>
+                </a:solidFill>
+              </a14:hiddenFill>
+            </a:ext>
+          </a:extLst>
+        </p:spPr>
+      </p:pic>
+      <p:pic>
+        <p:nvPicPr>
+          <p:cNvPr id="5" name="Picture 4">
+            <a:extLst>
+              <a:ext uri="{FF2B5EF4-FFF2-40B4-BE49-F238E27FC236}">
+                <a16:creationId xmlns:a16="http://schemas.microsoft.com/office/drawing/2014/main" id="{9E692AE7-C1FE-2C40-9678-9A6D3C7C28F4}"/>
+              </a:ext>
+            </a:extLst>
+          </p:cNvPr>
+          <p:cNvPicPr>
+            <a:picLocks noChangeAspect="1"/>
+          </p:cNvPicPr>
+          <p:nvPr/>
+        </p:nvPicPr>
+        <p:blipFill>
+          <a:blip r:embed="rId3"/>
+          <a:stretch>
+            <a:fillRect/>
+          </a:stretch>
+        </p:blipFill>
+        <p:spPr>
+          <a:xfrm>
+            <a:off x="1838699" y="1802523"/>
+            <a:ext cx="1442375" cy="3617760"/>
+          </a:xfrm>
+          <a:prstGeom prst="rect">
+            <a:avLst/>
+          </a:prstGeom>
+        </p:spPr>
+      </p:pic>
+      <p:cxnSp>
+        <p:nvCxnSpPr>
+          <p:cNvPr id="6" name="Straight Connector 5">
+            <a:extLst>
+              <a:ext uri="{FF2B5EF4-FFF2-40B4-BE49-F238E27FC236}">
+                <a16:creationId xmlns:a16="http://schemas.microsoft.com/office/drawing/2014/main" id="{F710BA68-9101-E245-9A8F-6B672CCA1A1D}"/>
+              </a:ext>
+            </a:extLst>
+          </p:cNvPr>
+          <p:cNvCxnSpPr/>
+          <p:nvPr/>
+        </p:nvCxnSpPr>
+        <p:spPr>
+          <a:xfrm>
+            <a:off x="3281074" y="4983480"/>
+            <a:ext cx="2921606" cy="320040"/>
+          </a:xfrm>
+          <a:prstGeom prst="line">
+            <a:avLst/>
+          </a:prstGeom>
+          <a:ln w="63500">
+            <a:solidFill>
+              <a:schemeClr val="tx1"/>
+            </a:solidFill>
+          </a:ln>
+        </p:spPr>
+        <p:style>
+          <a:lnRef idx="1">
+            <a:schemeClr val="accent1"/>
+          </a:lnRef>
+          <a:fillRef idx="0">
+            <a:schemeClr val="accent1"/>
+          </a:fillRef>
+          <a:effectRef idx="0">
+            <a:schemeClr val="accent1"/>
+          </a:effectRef>
+          <a:fontRef idx="minor">
+            <a:schemeClr val="tx1"/>
+          </a:fontRef>
+        </p:style>
+      </p:cxnSp>
+      <p:cxnSp>
+        <p:nvCxnSpPr>
+          <p:cNvPr id="8" name="Straight Connector 7">
+            <a:extLst>
+              <a:ext uri="{FF2B5EF4-FFF2-40B4-BE49-F238E27FC236}">
+                <a16:creationId xmlns:a16="http://schemas.microsoft.com/office/drawing/2014/main" id="{96C10E0D-8E37-D14F-B90D-BF5E763779D9}"/>
+              </a:ext>
+            </a:extLst>
+          </p:cNvPr>
+          <p:cNvCxnSpPr>
+            <a:cxnSpLocks/>
+          </p:cNvCxnSpPr>
+          <p:nvPr/>
+        </p:nvCxnSpPr>
+        <p:spPr>
+          <a:xfrm flipV="1">
+            <a:off x="3162341" y="1996911"/>
+            <a:ext cx="3040339" cy="45343"/>
+          </a:xfrm>
+          <a:prstGeom prst="line">
+            <a:avLst/>
+          </a:prstGeom>
+          <a:ln w="63500">
+            <a:solidFill>
+              <a:srgbClr val="FF0000"/>
+            </a:solidFill>
+          </a:ln>
+        </p:spPr>
+        <p:style>
+          <a:lnRef idx="1">
+            <a:schemeClr val="accent1"/>
+          </a:lnRef>
+          <a:fillRef idx="0">
+            <a:schemeClr val="accent1"/>
+          </a:fillRef>
+          <a:effectRef idx="0">
+            <a:schemeClr val="accent1"/>
+          </a:effectRef>
+          <a:fontRef idx="minor">
+            <a:schemeClr val="tx1"/>
+          </a:fontRef>
+        </p:style>
+      </p:cxnSp>
+      <p:cxnSp>
+        <p:nvCxnSpPr>
+          <p:cNvPr id="10" name="Straight Connector 9">
+            <a:extLst>
+              <a:ext uri="{FF2B5EF4-FFF2-40B4-BE49-F238E27FC236}">
+                <a16:creationId xmlns:a16="http://schemas.microsoft.com/office/drawing/2014/main" id="{CC39F5DB-6E80-3348-9ABC-FCE12E576711}"/>
+              </a:ext>
+            </a:extLst>
+          </p:cNvPr>
+          <p:cNvCxnSpPr>
+            <a:cxnSpLocks/>
+          </p:cNvCxnSpPr>
+          <p:nvPr/>
+        </p:nvCxnSpPr>
+        <p:spPr>
+          <a:xfrm flipV="1">
+            <a:off x="3267117" y="4164574"/>
+            <a:ext cx="954362" cy="128026"/>
+          </a:xfrm>
+          <a:prstGeom prst="line">
+            <a:avLst/>
+          </a:prstGeom>
+          <a:ln w="63500">
+            <a:solidFill>
+              <a:srgbClr val="0432FF"/>
+            </a:solidFill>
+          </a:ln>
+        </p:spPr>
+        <p:style>
+          <a:lnRef idx="1">
+            <a:schemeClr val="accent1"/>
+          </a:lnRef>
+          <a:fillRef idx="0">
+            <a:schemeClr val="accent1"/>
+          </a:fillRef>
+          <a:effectRef idx="0">
+            <a:schemeClr val="accent1"/>
+          </a:effectRef>
+          <a:fontRef idx="minor">
+            <a:schemeClr val="tx1"/>
+          </a:fontRef>
+        </p:style>
+      </p:cxnSp>
+      <p:sp>
+        <p:nvSpPr>
+          <p:cNvPr id="12" name="TextBox 11">
+            <a:extLst>
+              <a:ext uri="{FF2B5EF4-FFF2-40B4-BE49-F238E27FC236}">
+                <a16:creationId xmlns:a16="http://schemas.microsoft.com/office/drawing/2014/main" id="{2F2DE8DF-FAA1-344B-924E-E8DE9280131D}"/>
+              </a:ext>
+            </a:extLst>
+          </p:cNvPr>
+          <p:cNvSpPr txBox="1"/>
+          <p:nvPr/>
+        </p:nvSpPr>
+        <p:spPr>
+          <a:xfrm>
+            <a:off x="7708530" y="1920050"/>
+            <a:ext cx="2334630" cy="1754326"/>
+          </a:xfrm>
+          <a:prstGeom prst="rect">
+            <a:avLst/>
+          </a:prstGeom>
+          <a:noFill/>
+        </p:spPr>
+        <p:txBody>
+          <a:bodyPr wrap="square" rtlCol="0">
+            <a:spAutoFit/>
+          </a:bodyPr>
+          <a:lstStyle/>
+          <a:p>
+            <a:r>
+              <a:rPr lang="en-US" dirty="0"/>
+              <a:t>Flyback diode to prevent motor from generating current that will destroy the Pico GPIO circuits.</a:t>
+            </a:r>
+          </a:p>
+          <a:p>
+            <a:endParaRPr lang="en-US" dirty="0"/>
+          </a:p>
+        </p:txBody>
+      </p:sp>
+      <p:sp>
+        <p:nvSpPr>
+          <p:cNvPr id="13" name="Rectangle 12">
+            <a:extLst>
+              <a:ext uri="{FF2B5EF4-FFF2-40B4-BE49-F238E27FC236}">
+                <a16:creationId xmlns:a16="http://schemas.microsoft.com/office/drawing/2014/main" id="{02F6877E-6AF1-0F4C-B242-AF53955515E9}"/>
+              </a:ext>
+            </a:extLst>
+          </p:cNvPr>
+          <p:cNvSpPr/>
+          <p:nvPr/>
+        </p:nvSpPr>
+        <p:spPr>
+          <a:xfrm>
+            <a:off x="3095625" y="4924425"/>
+            <a:ext cx="185449" cy="111125"/>
+          </a:xfrm>
+          <a:prstGeom prst="rect">
+            <a:avLst/>
+          </a:prstGeom>
+          <a:solidFill>
+            <a:schemeClr val="tx1"/>
+          </a:solidFill>
+          <a:ln>
+            <a:noFill/>
+          </a:ln>
+        </p:spPr>
+        <p:style>
+          <a:lnRef idx="2">
+            <a:schemeClr val="accent1">
+              <a:shade val="50000"/>
+            </a:schemeClr>
+          </a:lnRef>
+          <a:fillRef idx="1">
+            <a:schemeClr val="accent1"/>
+          </a:fillRef>
+          <a:effectRef idx="0">
+            <a:schemeClr val="accent1"/>
+          </a:effectRef>
+          <a:fontRef idx="minor">
+            <a:schemeClr val="lt1"/>
+          </a:fontRef>
+        </p:style>
+        <p:txBody>
+          <a:bodyPr rtlCol="0" anchor="ctr"/>
+          <a:lstStyle/>
+          <a:p>
+            <a:pPr algn="ctr"/>
+            <a:endParaRPr lang="en-US"/>
+          </a:p>
+        </p:txBody>
+      </p:sp>
+      <p:sp>
+        <p:nvSpPr>
+          <p:cNvPr id="15" name="Rectangle 14">
+            <a:extLst>
+              <a:ext uri="{FF2B5EF4-FFF2-40B4-BE49-F238E27FC236}">
+                <a16:creationId xmlns:a16="http://schemas.microsoft.com/office/drawing/2014/main" id="{51951276-F1A8-6A43-8B72-9BBDC810BBED}"/>
+              </a:ext>
+            </a:extLst>
+          </p:cNvPr>
+          <p:cNvSpPr/>
+          <p:nvPr/>
+        </p:nvSpPr>
+        <p:spPr>
+          <a:xfrm>
+            <a:off x="3081669" y="4073613"/>
+            <a:ext cx="185449" cy="111125"/>
+          </a:xfrm>
+          <a:prstGeom prst="rect">
+            <a:avLst/>
+          </a:prstGeom>
+          <a:solidFill>
+            <a:schemeClr val="tx1"/>
+          </a:solidFill>
+          <a:ln>
+            <a:noFill/>
+          </a:ln>
+        </p:spPr>
+        <p:style>
+          <a:lnRef idx="2">
+            <a:schemeClr val="accent1">
+              <a:shade val="50000"/>
+            </a:schemeClr>
+          </a:lnRef>
+          <a:fillRef idx="1">
+            <a:schemeClr val="accent1"/>
+          </a:fillRef>
+          <a:effectRef idx="0">
+            <a:schemeClr val="accent1"/>
+          </a:effectRef>
+          <a:fontRef idx="minor">
+            <a:schemeClr val="lt1"/>
+          </a:fontRef>
+        </p:style>
+        <p:txBody>
+          <a:bodyPr rtlCol="0" anchor="ctr"/>
+          <a:lstStyle/>
+          <a:p>
+            <a:pPr algn="ctr"/>
+            <a:endParaRPr lang="en-US"/>
+          </a:p>
+        </p:txBody>
+      </p:sp>
+      <p:sp>
+        <p:nvSpPr>
+          <p:cNvPr id="16" name="Rectangle 15">
+            <a:extLst>
+              <a:ext uri="{FF2B5EF4-FFF2-40B4-BE49-F238E27FC236}">
+                <a16:creationId xmlns:a16="http://schemas.microsoft.com/office/drawing/2014/main" id="{2191F2AC-445E-5549-8720-222A4D573F5C}"/>
+              </a:ext>
+            </a:extLst>
+          </p:cNvPr>
+          <p:cNvSpPr/>
+          <p:nvPr/>
+        </p:nvSpPr>
+        <p:spPr>
+          <a:xfrm>
+            <a:off x="3081668" y="3201439"/>
+            <a:ext cx="185449" cy="111125"/>
+          </a:xfrm>
+          <a:prstGeom prst="rect">
+            <a:avLst/>
+          </a:prstGeom>
+          <a:solidFill>
+            <a:schemeClr val="tx1"/>
+          </a:solidFill>
+          <a:ln>
+            <a:noFill/>
+          </a:ln>
+        </p:spPr>
+        <p:style>
+          <a:lnRef idx="2">
+            <a:schemeClr val="accent1">
+              <a:shade val="50000"/>
+            </a:schemeClr>
+          </a:lnRef>
+          <a:fillRef idx="1">
+            <a:schemeClr val="accent1"/>
+          </a:fillRef>
+          <a:effectRef idx="0">
+            <a:schemeClr val="accent1"/>
+          </a:effectRef>
+          <a:fontRef idx="minor">
+            <a:schemeClr val="lt1"/>
+          </a:fontRef>
+        </p:style>
+        <p:txBody>
+          <a:bodyPr rtlCol="0" anchor="ctr"/>
+          <a:lstStyle/>
+          <a:p>
+            <a:pPr algn="ctr"/>
+            <a:endParaRPr lang="en-US"/>
+          </a:p>
+        </p:txBody>
+      </p:sp>
+      <p:sp>
+        <p:nvSpPr>
+          <p:cNvPr id="17" name="TextBox 16">
+            <a:extLst>
+              <a:ext uri="{FF2B5EF4-FFF2-40B4-BE49-F238E27FC236}">
+                <a16:creationId xmlns:a16="http://schemas.microsoft.com/office/drawing/2014/main" id="{297B7FDB-EF69-584A-B141-C36DEFA6FB98}"/>
+              </a:ext>
+            </a:extLst>
+          </p:cNvPr>
+          <p:cNvSpPr txBox="1"/>
+          <p:nvPr/>
+        </p:nvSpPr>
+        <p:spPr>
+          <a:xfrm>
+            <a:off x="3617199" y="2087403"/>
+            <a:ext cx="831190" cy="369332"/>
+          </a:xfrm>
+          <a:prstGeom prst="rect">
+            <a:avLst/>
+          </a:prstGeom>
+          <a:noFill/>
+        </p:spPr>
+        <p:txBody>
+          <a:bodyPr wrap="none" rtlCol="0">
+            <a:spAutoFit/>
+          </a:bodyPr>
+          <a:lstStyle/>
+          <a:p>
+            <a:r>
+              <a:rPr lang="en-US" b="1" dirty="0">
+                <a:solidFill>
+                  <a:srgbClr val="FF0000"/>
+                </a:solidFill>
+              </a:rPr>
+              <a:t>5 Volts</a:t>
+            </a:r>
+          </a:p>
+        </p:txBody>
+      </p:sp>
+      <p:sp>
+        <p:nvSpPr>
+          <p:cNvPr id="20" name="TextBox 19">
+            <a:extLst>
+              <a:ext uri="{FF2B5EF4-FFF2-40B4-BE49-F238E27FC236}">
+                <a16:creationId xmlns:a16="http://schemas.microsoft.com/office/drawing/2014/main" id="{206F3650-4CF5-1C4D-8D90-929FAF6DC195}"/>
+              </a:ext>
+            </a:extLst>
+          </p:cNvPr>
+          <p:cNvSpPr txBox="1"/>
+          <p:nvPr/>
+        </p:nvSpPr>
+        <p:spPr>
+          <a:xfrm>
+            <a:off x="3464832" y="5073526"/>
+            <a:ext cx="630301" cy="369332"/>
+          </a:xfrm>
+          <a:prstGeom prst="rect">
+            <a:avLst/>
+          </a:prstGeom>
+          <a:noFill/>
+        </p:spPr>
+        <p:txBody>
+          <a:bodyPr wrap="none" rtlCol="0">
+            <a:spAutoFit/>
+          </a:bodyPr>
+          <a:lstStyle/>
+          <a:p>
+            <a:r>
+              <a:rPr lang="en-US" b="1" dirty="0"/>
+              <a:t>GND</a:t>
+            </a:r>
+          </a:p>
+        </p:txBody>
+      </p:sp>
+      <p:sp>
+        <p:nvSpPr>
+          <p:cNvPr id="19" name="Rectangle 18">
+            <a:extLst>
+              <a:ext uri="{FF2B5EF4-FFF2-40B4-BE49-F238E27FC236}">
+                <a16:creationId xmlns:a16="http://schemas.microsoft.com/office/drawing/2014/main" id="{90E09ABD-7FD9-8D49-A0AB-88C7B0D9082F}"/>
+              </a:ext>
+            </a:extLst>
+          </p:cNvPr>
+          <p:cNvSpPr/>
+          <p:nvPr/>
+        </p:nvSpPr>
+        <p:spPr>
+          <a:xfrm>
+            <a:off x="4221479" y="3841729"/>
+            <a:ext cx="226910" cy="287446"/>
+          </a:xfrm>
+          <a:prstGeom prst="rect">
+            <a:avLst/>
+          </a:prstGeom>
+          <a:solidFill>
+            <a:schemeClr val="bg1"/>
+          </a:solidFill>
+          <a:ln>
+            <a:noFill/>
+          </a:ln>
+        </p:spPr>
+        <p:style>
+          <a:lnRef idx="2">
+            <a:schemeClr val="accent1">
+              <a:shade val="50000"/>
+            </a:schemeClr>
+          </a:lnRef>
+          <a:fillRef idx="1">
+            <a:schemeClr val="accent1"/>
+          </a:fillRef>
+          <a:effectRef idx="0">
+            <a:schemeClr val="accent1"/>
+          </a:effectRef>
+          <a:fontRef idx="minor">
+            <a:schemeClr val="lt1"/>
+          </a:fontRef>
+        </p:style>
+        <p:txBody>
+          <a:bodyPr rtlCol="0" anchor="ctr"/>
+          <a:lstStyle/>
+          <a:p>
+            <a:pPr algn="ctr"/>
+            <a:endParaRPr lang="en-US"/>
+          </a:p>
+        </p:txBody>
+      </p:sp>
+      <p:sp>
+        <p:nvSpPr>
+          <p:cNvPr id="22" name="TextBox 21">
+            <a:extLst>
+              <a:ext uri="{FF2B5EF4-FFF2-40B4-BE49-F238E27FC236}">
+                <a16:creationId xmlns:a16="http://schemas.microsoft.com/office/drawing/2014/main" id="{B8F23673-2323-074C-BB46-684BB0878A40}"/>
+              </a:ext>
+            </a:extLst>
+          </p:cNvPr>
+          <p:cNvSpPr txBox="1"/>
+          <p:nvPr/>
+        </p:nvSpPr>
+        <p:spPr>
+          <a:xfrm>
+            <a:off x="6386438" y="4309156"/>
+            <a:ext cx="2334630" cy="1200329"/>
+          </a:xfrm>
+          <a:prstGeom prst="rect">
+            <a:avLst/>
+          </a:prstGeom>
+          <a:noFill/>
+        </p:spPr>
+        <p:txBody>
+          <a:bodyPr wrap="square" rtlCol="0">
+            <a:spAutoFit/>
+          </a:bodyPr>
+          <a:lstStyle/>
+          <a:p>
+            <a:r>
+              <a:rPr lang="en-US" dirty="0"/>
+              <a:t>NPN Transistor used to</a:t>
+            </a:r>
+          </a:p>
+          <a:p>
+            <a:r>
+              <a:rPr lang="en-US" dirty="0"/>
+              <a:t>switch the the power to the motor</a:t>
+            </a:r>
+          </a:p>
+          <a:p>
+            <a:endParaRPr lang="en-US" dirty="0"/>
+          </a:p>
+        </p:txBody>
+      </p:sp>
+      <p:sp>
+        <p:nvSpPr>
+          <p:cNvPr id="21" name="TextBox 20">
+            <a:extLst>
+              <a:ext uri="{FF2B5EF4-FFF2-40B4-BE49-F238E27FC236}">
+                <a16:creationId xmlns:a16="http://schemas.microsoft.com/office/drawing/2014/main" id="{A2EF73F5-DB60-D14F-A9EB-A16AE0702B43}"/>
+              </a:ext>
+            </a:extLst>
+          </p:cNvPr>
+          <p:cNvSpPr txBox="1"/>
+          <p:nvPr/>
+        </p:nvSpPr>
+        <p:spPr>
+          <a:xfrm>
+            <a:off x="6417106" y="3616120"/>
+            <a:ext cx="2231829" cy="369332"/>
+          </a:xfrm>
+          <a:prstGeom prst="rect">
+            <a:avLst/>
+          </a:prstGeom>
+          <a:noFill/>
+        </p:spPr>
+        <p:txBody>
+          <a:bodyPr wrap="none" rtlCol="0">
+            <a:spAutoFit/>
+          </a:bodyPr>
+          <a:lstStyle/>
+          <a:p>
+            <a:r>
+              <a:rPr lang="en-US" dirty="0"/>
+              <a:t>200 milliamps current</a:t>
+            </a:r>
+          </a:p>
+        </p:txBody>
+      </p:sp>
+    </p:spTree>
+    <p:extLst>
+      <p:ext uri="{BB962C8B-B14F-4D97-AF65-F5344CB8AC3E}">
+        <p14:creationId xmlns:p14="http://schemas.microsoft.com/office/powerpoint/2010/main" val="2218377891"/>
+      </p:ext>
+    </p:extLst>
+  </p:cSld>
+  <p:clrMapOvr>
+    <a:masterClrMapping/>
+  </p:clrMapOvr>
+</p:sld>
+</file>
+
 <file path=ppt/theme/theme1.xml><?xml version="1.0" encoding="utf-8"?>
 <a:theme xmlns:a="http://schemas.openxmlformats.org/drawingml/2006/main" name="Office Theme">
   <a:themeElements>

</xml_diff>